<commit_message>
2020-05-02 edition 2 / PPT mostly accomplished
</commit_message>
<xml_diff>
--- a/Presentation.pptx
+++ b/Presentation.pptx
@@ -5,10 +5,10 @@
     <p:sldMasterId id="2147483648" r:id="rId1"/>
   </p:sldMasterIdLst>
   <p:notesMasterIdLst>
-    <p:notesMasterId r:id="rId20"/>
+    <p:notesMasterId r:id="rId25"/>
   </p:notesMasterIdLst>
   <p:handoutMasterIdLst>
-    <p:handoutMasterId r:id="rId21"/>
+    <p:handoutMasterId r:id="rId26"/>
   </p:handoutMasterIdLst>
   <p:sldIdLst>
     <p:sldId id="256" r:id="rId2"/>
@@ -28,7 +28,12 @@
     <p:sldId id="272" r:id="rId16"/>
     <p:sldId id="273" r:id="rId17"/>
     <p:sldId id="274" r:id="rId18"/>
-    <p:sldId id="259" r:id="rId19"/>
+    <p:sldId id="275" r:id="rId19"/>
+    <p:sldId id="276" r:id="rId20"/>
+    <p:sldId id="279" r:id="rId21"/>
+    <p:sldId id="280" r:id="rId22"/>
+    <p:sldId id="281" r:id="rId23"/>
+    <p:sldId id="259" r:id="rId24"/>
   </p:sldIdLst>
   <p:sldSz cx="12192000" cy="6858000"/>
   <p:notesSz cx="6858000" cy="9144000"/>
@@ -229,7 +234,7 @@
           <a:p>
             <a:fld id="{7A5EB188-8FE5-43AD-A84C-5450FFA3ADDA}" type="datetimeFigureOut">
               <a:rPr lang="zh-CN" altLang="en-US" smtClean="0"/>
-              <a:t>2020/5/1</a:t>
+              <a:t>2020/5/2</a:t>
             </a:fld>
             <a:endParaRPr lang="zh-CN" altLang="en-US"/>
           </a:p>
@@ -407,7 +412,7 @@
           <a:p>
             <a:fld id="{3867C63F-6C4B-41AF-85D6-ADE161ACD436}" type="datetime1">
               <a:rPr lang="zh-CN" altLang="en-US" smtClean="0"/>
-              <a:t>2020/5/1</a:t>
+              <a:t>2020/5/2</a:t>
             </a:fld>
             <a:endParaRPr lang="zh-CN" altLang="en-US"/>
           </a:p>
@@ -760,6 +765,174 @@
 </p:notes>
 </file>
 
+<file path=ppt/notesSlides/notesSlide2.xml><?xml version="1.0" encoding="utf-8"?>
+<p:notes xmlns:a="http://schemas.openxmlformats.org/drawingml/2006/main" xmlns:r="http://schemas.openxmlformats.org/officeDocument/2006/relationships" xmlns:p="http://schemas.openxmlformats.org/presentationml/2006/main">
+  <p:cSld>
+    <p:spTree>
+      <p:nvGrpSpPr>
+        <p:cNvPr id="1" name=""/>
+        <p:cNvGrpSpPr/>
+        <p:nvPr/>
+      </p:nvGrpSpPr>
+      <p:grpSpPr>
+        <a:xfrm>
+          <a:off x="0" y="0"/>
+          <a:ext cx="0" cy="0"/>
+          <a:chOff x="0" y="0"/>
+          <a:chExt cx="0" cy="0"/>
+        </a:xfrm>
+      </p:grpSpPr>
+      <p:sp>
+        <p:nvSpPr>
+          <p:cNvPr id="2" name="Slide Image Placeholder 1"/>
+          <p:cNvSpPr>
+            <a:spLocks noGrp="1" noRot="1" noChangeAspect="1"/>
+          </p:cNvSpPr>
+          <p:nvPr>
+            <p:ph type="sldImg"/>
+          </p:nvPr>
+        </p:nvSpPr>
+        <p:spPr/>
+      </p:sp>
+      <p:sp>
+        <p:nvSpPr>
+          <p:cNvPr id="3" name="Notes Placeholder 2"/>
+          <p:cNvSpPr>
+            <a:spLocks noGrp="1"/>
+          </p:cNvSpPr>
+          <p:nvPr>
+            <p:ph type="body" idx="1"/>
+          </p:nvPr>
+        </p:nvSpPr>
+        <p:spPr/>
+        <p:txBody>
+          <a:bodyPr/>
+          <a:lstStyle/>
+          <a:p>
+            <a:endParaRPr lang="zh-CN" altLang="en-US" dirty="0"/>
+          </a:p>
+        </p:txBody>
+      </p:sp>
+      <p:sp>
+        <p:nvSpPr>
+          <p:cNvPr id="4" name="Slide Number Placeholder 3"/>
+          <p:cNvSpPr>
+            <a:spLocks noGrp="1"/>
+          </p:cNvSpPr>
+          <p:nvPr>
+            <p:ph type="sldNum" sz="quarter" idx="5"/>
+          </p:nvPr>
+        </p:nvSpPr>
+        <p:spPr/>
+        <p:txBody>
+          <a:bodyPr/>
+          <a:lstStyle/>
+          <a:p>
+            <a:fld id="{3D705E91-C7E4-4164-B291-E20CD00EA241}" type="slidenum">
+              <a:rPr lang="zh-CN" altLang="en-US" smtClean="0"/>
+              <a:t>19</a:t>
+            </a:fld>
+            <a:endParaRPr lang="zh-CN" altLang="en-US"/>
+          </a:p>
+        </p:txBody>
+      </p:sp>
+    </p:spTree>
+    <p:extLst>
+      <p:ext uri="{BB962C8B-B14F-4D97-AF65-F5344CB8AC3E}">
+        <p14:creationId xmlns:p14="http://schemas.microsoft.com/office/powerpoint/2010/main" val="1891725352"/>
+      </p:ext>
+    </p:extLst>
+  </p:cSld>
+  <p:clrMapOvr>
+    <a:masterClrMapping/>
+  </p:clrMapOvr>
+</p:notes>
+</file>
+
+<file path=ppt/notesSlides/notesSlide3.xml><?xml version="1.0" encoding="utf-8"?>
+<p:notes xmlns:a="http://schemas.openxmlformats.org/drawingml/2006/main" xmlns:r="http://schemas.openxmlformats.org/officeDocument/2006/relationships" xmlns:p="http://schemas.openxmlformats.org/presentationml/2006/main">
+  <p:cSld>
+    <p:spTree>
+      <p:nvGrpSpPr>
+        <p:cNvPr id="1" name=""/>
+        <p:cNvGrpSpPr/>
+        <p:nvPr/>
+      </p:nvGrpSpPr>
+      <p:grpSpPr>
+        <a:xfrm>
+          <a:off x="0" y="0"/>
+          <a:ext cx="0" cy="0"/>
+          <a:chOff x="0" y="0"/>
+          <a:chExt cx="0" cy="0"/>
+        </a:xfrm>
+      </p:grpSpPr>
+      <p:sp>
+        <p:nvSpPr>
+          <p:cNvPr id="2" name="Slide Image Placeholder 1"/>
+          <p:cNvSpPr>
+            <a:spLocks noGrp="1" noRot="1" noChangeAspect="1"/>
+          </p:cNvSpPr>
+          <p:nvPr>
+            <p:ph type="sldImg"/>
+          </p:nvPr>
+        </p:nvSpPr>
+        <p:spPr/>
+      </p:sp>
+      <p:sp>
+        <p:nvSpPr>
+          <p:cNvPr id="3" name="Notes Placeholder 2"/>
+          <p:cNvSpPr>
+            <a:spLocks noGrp="1"/>
+          </p:cNvSpPr>
+          <p:nvPr>
+            <p:ph type="body" idx="1"/>
+          </p:nvPr>
+        </p:nvSpPr>
+        <p:spPr/>
+        <p:txBody>
+          <a:bodyPr/>
+          <a:lstStyle/>
+          <a:p>
+            <a:endParaRPr lang="zh-CN" altLang="en-US" dirty="0"/>
+          </a:p>
+        </p:txBody>
+      </p:sp>
+      <p:sp>
+        <p:nvSpPr>
+          <p:cNvPr id="4" name="Slide Number Placeholder 3"/>
+          <p:cNvSpPr>
+            <a:spLocks noGrp="1"/>
+          </p:cNvSpPr>
+          <p:nvPr>
+            <p:ph type="sldNum" sz="quarter" idx="5"/>
+          </p:nvPr>
+        </p:nvSpPr>
+        <p:spPr/>
+        <p:txBody>
+          <a:bodyPr/>
+          <a:lstStyle/>
+          <a:p>
+            <a:fld id="{3D705E91-C7E4-4164-B291-E20CD00EA241}" type="slidenum">
+              <a:rPr lang="zh-CN" altLang="en-US" smtClean="0"/>
+              <a:t>21</a:t>
+            </a:fld>
+            <a:endParaRPr lang="zh-CN" altLang="en-US"/>
+          </a:p>
+        </p:txBody>
+      </p:sp>
+    </p:spTree>
+    <p:extLst>
+      <p:ext uri="{BB962C8B-B14F-4D97-AF65-F5344CB8AC3E}">
+        <p14:creationId xmlns:p14="http://schemas.microsoft.com/office/powerpoint/2010/main" val="942481429"/>
+      </p:ext>
+    </p:extLst>
+  </p:cSld>
+  <p:clrMapOvr>
+    <a:masterClrMapping/>
+  </p:clrMapOvr>
+</p:notes>
+</file>
+
 <file path=ppt/slideLayouts/slideLayout1.xml><?xml version="1.0" encoding="utf-8"?>
 <p:sldLayout xmlns:a="http://schemas.openxmlformats.org/drawingml/2006/main" xmlns:r="http://schemas.openxmlformats.org/officeDocument/2006/relationships" xmlns:p="http://schemas.openxmlformats.org/presentationml/2006/main" type="title" preserve="1">
   <p:cSld name="Title Slide">
@@ -923,7 +1096,7 @@
           <a:p>
             <a:fld id="{0C9A9049-B398-4992-904A-E27AAA8FBF1F}" type="datetime1">
               <a:rPr lang="zh-CN" altLang="en-US" smtClean="0"/>
-              <a:t>2020/5/1</a:t>
+              <a:t>2020/5/2</a:t>
             </a:fld>
             <a:endParaRPr lang="zh-CN" altLang="en-US"/>
           </a:p>
@@ -6077,57 +6250,6 @@
           </a:p>
         </p:txBody>
       </p:sp>
-      <p:sp>
-        <p:nvSpPr>
-          <p:cNvPr id="10" name="Flowchart: Terminator 9">
-            <a:extLst>
-              <a:ext uri="{FF2B5EF4-FFF2-40B4-BE49-F238E27FC236}">
-                <a16:creationId xmlns:a16="http://schemas.microsoft.com/office/drawing/2014/main" id="{713125AB-F947-460F-9D7C-B24D25ED9A9D}"/>
-              </a:ext>
-            </a:extLst>
-          </p:cNvPr>
-          <p:cNvSpPr/>
-          <p:nvPr/>
-        </p:nvSpPr>
-        <p:spPr>
-          <a:xfrm>
-            <a:off x="2545108" y="6072013"/>
-            <a:ext cx="2639590" cy="523783"/>
-          </a:xfrm>
-          <a:prstGeom prst="flowChartTerminator">
-            <a:avLst/>
-          </a:prstGeom>
-        </p:spPr>
-        <p:style>
-          <a:lnRef idx="3">
-            <a:schemeClr val="lt1"/>
-          </a:lnRef>
-          <a:fillRef idx="1">
-            <a:schemeClr val="accent1"/>
-          </a:fillRef>
-          <a:effectRef idx="1">
-            <a:schemeClr val="accent1"/>
-          </a:effectRef>
-          <a:fontRef idx="minor">
-            <a:schemeClr val="lt1"/>
-          </a:fontRef>
-        </p:style>
-        <p:txBody>
-          <a:bodyPr rtlCol="0" anchor="ctr"/>
-          <a:lstStyle/>
-          <a:p>
-            <a:pPr algn="ctr"/>
-            <a:r>
-              <a:rPr lang="en-US" altLang="zh-CN" b="1" dirty="0"/>
-              <a:t>Microphone</a:t>
-            </a:r>
-            <a:r>
-              <a:rPr lang="zh-CN" altLang="en-US" b="1" dirty="0"/>
-              <a:t>实时输出</a:t>
-            </a:r>
-          </a:p>
-        </p:txBody>
-      </p:sp>
       <p:cxnSp>
         <p:nvCxnSpPr>
           <p:cNvPr id="12" name="Straight Arrow Connector 11">
@@ -6269,7 +6391,6 @@
           <p:cNvCxnSpPr>
             <a:cxnSpLocks/>
             <a:stCxn id="9" idx="2"/>
-            <a:endCxn id="10" idx="0"/>
           </p:cNvCxnSpPr>
           <p:nvPr/>
         </p:nvCxnSpPr>
@@ -6873,6 +6994,53 @@
           <a:p>
             <a:pPr algn="ctr"/>
             <a:endParaRPr lang="zh-CN" altLang="en-US"/>
+          </a:p>
+        </p:txBody>
+      </p:sp>
+      <p:sp>
+        <p:nvSpPr>
+          <p:cNvPr id="26" name="Flowchart: Terminator 25">
+            <a:extLst>
+              <a:ext uri="{FF2B5EF4-FFF2-40B4-BE49-F238E27FC236}">
+                <a16:creationId xmlns:a16="http://schemas.microsoft.com/office/drawing/2014/main" id="{58574F1C-4349-4994-8F50-C76D490D5EF0}"/>
+              </a:ext>
+            </a:extLst>
+          </p:cNvPr>
+          <p:cNvSpPr/>
+          <p:nvPr/>
+        </p:nvSpPr>
+        <p:spPr>
+          <a:xfrm>
+            <a:off x="2545108" y="6072013"/>
+            <a:ext cx="2639590" cy="523783"/>
+          </a:xfrm>
+          <a:prstGeom prst="flowChartTerminator">
+            <a:avLst/>
+          </a:prstGeom>
+        </p:spPr>
+        <p:style>
+          <a:lnRef idx="3">
+            <a:schemeClr val="lt1"/>
+          </a:lnRef>
+          <a:fillRef idx="1">
+            <a:schemeClr val="accent1"/>
+          </a:fillRef>
+          <a:effectRef idx="1">
+            <a:schemeClr val="accent1"/>
+          </a:effectRef>
+          <a:fontRef idx="minor">
+            <a:schemeClr val="lt1"/>
+          </a:fontRef>
+        </p:style>
+        <p:txBody>
+          <a:bodyPr rtlCol="0" anchor="ctr"/>
+          <a:lstStyle/>
+          <a:p>
+            <a:pPr algn="ctr"/>
+            <a:r>
+              <a:rPr lang="zh-CN" altLang="en-US" b="1" dirty="0"/>
+              <a:t>结果输出</a:t>
+            </a:r>
           </a:p>
         </p:txBody>
       </p:sp>
@@ -8782,57 +8950,6 @@
           </a:p>
         </p:txBody>
       </p:sp>
-      <p:sp>
-        <p:nvSpPr>
-          <p:cNvPr id="10" name="Flowchart: Terminator 9">
-            <a:extLst>
-              <a:ext uri="{FF2B5EF4-FFF2-40B4-BE49-F238E27FC236}">
-                <a16:creationId xmlns:a16="http://schemas.microsoft.com/office/drawing/2014/main" id="{713125AB-F947-460F-9D7C-B24D25ED9A9D}"/>
-              </a:ext>
-            </a:extLst>
-          </p:cNvPr>
-          <p:cNvSpPr/>
-          <p:nvPr/>
-        </p:nvSpPr>
-        <p:spPr>
-          <a:xfrm>
-            <a:off x="2545108" y="6072013"/>
-            <a:ext cx="2639590" cy="523783"/>
-          </a:xfrm>
-          <a:prstGeom prst="flowChartTerminator">
-            <a:avLst/>
-          </a:prstGeom>
-        </p:spPr>
-        <p:style>
-          <a:lnRef idx="3">
-            <a:schemeClr val="lt1"/>
-          </a:lnRef>
-          <a:fillRef idx="1">
-            <a:schemeClr val="accent1"/>
-          </a:fillRef>
-          <a:effectRef idx="1">
-            <a:schemeClr val="accent1"/>
-          </a:effectRef>
-          <a:fontRef idx="minor">
-            <a:schemeClr val="lt1"/>
-          </a:fontRef>
-        </p:style>
-        <p:txBody>
-          <a:bodyPr rtlCol="0" anchor="ctr"/>
-          <a:lstStyle/>
-          <a:p>
-            <a:pPr algn="ctr"/>
-            <a:r>
-              <a:rPr lang="en-US" altLang="zh-CN" b="1" dirty="0"/>
-              <a:t>Microphone</a:t>
-            </a:r>
-            <a:r>
-              <a:rPr lang="zh-CN" altLang="en-US" b="1" dirty="0"/>
-              <a:t>实时输出</a:t>
-            </a:r>
-          </a:p>
-        </p:txBody>
-      </p:sp>
       <p:cxnSp>
         <p:nvCxnSpPr>
           <p:cNvPr id="12" name="Straight Arrow Connector 11">
@@ -8974,7 +9091,6 @@
           <p:cNvCxnSpPr>
             <a:cxnSpLocks/>
             <a:stCxn id="9" idx="2"/>
-            <a:endCxn id="10" idx="0"/>
           </p:cNvCxnSpPr>
           <p:nvPr/>
         </p:nvCxnSpPr>
@@ -9545,7 +9661,7 @@
         </p:nvSpPr>
         <p:spPr>
           <a:xfrm>
-            <a:off x="2898241" y="4929309"/>
+            <a:off x="2959460" y="4977140"/>
             <a:ext cx="1961763" cy="801780"/>
           </a:xfrm>
           <a:prstGeom prst="rect">
@@ -9578,6 +9694,53 @@
           <a:p>
             <a:pPr algn="ctr"/>
             <a:endParaRPr lang="zh-CN" altLang="en-US"/>
+          </a:p>
+        </p:txBody>
+      </p:sp>
+      <p:sp>
+        <p:nvSpPr>
+          <p:cNvPr id="26" name="Flowchart: Terminator 25">
+            <a:extLst>
+              <a:ext uri="{FF2B5EF4-FFF2-40B4-BE49-F238E27FC236}">
+                <a16:creationId xmlns:a16="http://schemas.microsoft.com/office/drawing/2014/main" id="{CCAE976D-8420-4F82-AA7B-116F3AF18211}"/>
+              </a:ext>
+            </a:extLst>
+          </p:cNvPr>
+          <p:cNvSpPr/>
+          <p:nvPr/>
+        </p:nvSpPr>
+        <p:spPr>
+          <a:xfrm>
+            <a:off x="2545108" y="6072013"/>
+            <a:ext cx="2639590" cy="523783"/>
+          </a:xfrm>
+          <a:prstGeom prst="flowChartTerminator">
+            <a:avLst/>
+          </a:prstGeom>
+        </p:spPr>
+        <p:style>
+          <a:lnRef idx="3">
+            <a:schemeClr val="lt1"/>
+          </a:lnRef>
+          <a:fillRef idx="1">
+            <a:schemeClr val="accent1"/>
+          </a:fillRef>
+          <a:effectRef idx="1">
+            <a:schemeClr val="accent1"/>
+          </a:effectRef>
+          <a:fontRef idx="minor">
+            <a:schemeClr val="lt1"/>
+          </a:fontRef>
+        </p:style>
+        <p:txBody>
+          <a:bodyPr rtlCol="0" anchor="ctr"/>
+          <a:lstStyle/>
+          <a:p>
+            <a:pPr algn="ctr"/>
+            <a:r>
+              <a:rPr lang="zh-CN" altLang="en-US" b="1" dirty="0"/>
+              <a:t>结果输出</a:t>
+            </a:r>
           </a:p>
         </p:txBody>
       </p:sp>
@@ -9613,38 +9776,10 @@
       </p:grpSpPr>
       <p:sp>
         <p:nvSpPr>
-          <p:cNvPr id="3" name="Content Placeholder 2">
-            <a:extLst>
-              <a:ext uri="{FF2B5EF4-FFF2-40B4-BE49-F238E27FC236}">
-                <a16:creationId xmlns:a16="http://schemas.microsoft.com/office/drawing/2014/main" id="{C307C99A-7957-4E1D-9E4D-26FE26CCE030}"/>
-              </a:ext>
-            </a:extLst>
-          </p:cNvPr>
-          <p:cNvSpPr>
-            <a:spLocks noGrp="1"/>
-          </p:cNvSpPr>
-          <p:nvPr>
-            <p:ph idx="1"/>
-          </p:nvPr>
-        </p:nvSpPr>
-        <p:spPr/>
-        <p:txBody>
-          <a:bodyPr/>
-          <a:lstStyle/>
-          <a:p>
-            <a:pPr marL="0" indent="0">
-              <a:buNone/>
-            </a:pPr>
-            <a:endParaRPr lang="zh-CN" altLang="en-US" dirty="0"/>
-          </a:p>
-        </p:txBody>
-      </p:sp>
-      <p:sp>
-        <p:nvSpPr>
           <p:cNvPr id="4" name="Slide Number Placeholder 3">
             <a:extLst>
               <a:ext uri="{FF2B5EF4-FFF2-40B4-BE49-F238E27FC236}">
-                <a16:creationId xmlns:a16="http://schemas.microsoft.com/office/drawing/2014/main" id="{59A1C320-10E8-488D-B62D-73FE9A1348E9}"/>
+                <a16:creationId xmlns:a16="http://schemas.microsoft.com/office/drawing/2014/main" id="{E370ACF5-72B0-42AF-8A9C-F6AC839802A7}"/>
               </a:ext>
             </a:extLst>
           </p:cNvPr>
@@ -9670,10 +9805,10 @@
       </p:sp>
       <p:sp>
         <p:nvSpPr>
-          <p:cNvPr id="9" name="Title 1">
-            <a:extLst>
-              <a:ext uri="{FF2B5EF4-FFF2-40B4-BE49-F238E27FC236}">
-                <a16:creationId xmlns:a16="http://schemas.microsoft.com/office/drawing/2014/main" id="{E2BBFDD7-1210-42FA-B9DC-061F6E5F81CB}"/>
+          <p:cNvPr id="5" name="Title 1">
+            <a:extLst>
+              <a:ext uri="{FF2B5EF4-FFF2-40B4-BE49-F238E27FC236}">
+                <a16:creationId xmlns:a16="http://schemas.microsoft.com/office/drawing/2014/main" id="{3BC196C9-E495-403A-9892-5A9C27D64E32}"/>
               </a:ext>
             </a:extLst>
           </p:cNvPr>
@@ -9699,7 +9834,21 @@
                 <a:latin typeface="仿宋" panose="02010609060101010101" pitchFamily="49" charset="-122"/>
                 <a:ea typeface="仿宋" panose="02010609060101010101" pitchFamily="49" charset="-122"/>
               </a:rPr>
-              <a:t>参考文献</a:t>
+              <a:t>软件架构 </a:t>
+            </a:r>
+            <a:r>
+              <a:rPr lang="en-US" altLang="zh-CN" dirty="0">
+                <a:latin typeface="仿宋" panose="02010609060101010101" pitchFamily="49" charset="-122"/>
+                <a:ea typeface="仿宋" panose="02010609060101010101" pitchFamily="49" charset="-122"/>
+              </a:rPr>
+              <a:t>– </a:t>
+            </a:r>
+            <a:r>
+              <a:rPr lang="zh-CN" altLang="en-US" dirty="0">
+                <a:latin typeface="仿宋" panose="02010609060101010101" pitchFamily="49" charset="-122"/>
+                <a:ea typeface="仿宋" panose="02010609060101010101" pitchFamily="49" charset="-122"/>
+              </a:rPr>
+              <a:t>分类器</a:t>
             </a:r>
             <a:br>
               <a:rPr lang="en-US" altLang="zh-CN" dirty="0">
@@ -9713,7 +9862,7 @@
                 <a:ea typeface="仿宋" panose="02010609060101010101" pitchFamily="49" charset="-122"/>
                 <a:cs typeface="Times New Roman" panose="02020603050405020304" pitchFamily="18" charset="0"/>
               </a:rPr>
-              <a:t>Reference</a:t>
+              <a:t>Software Architecture – classifier</a:t>
             </a:r>
             <a:endParaRPr lang="zh-CN" altLang="en-US" sz="3000" dirty="0">
               <a:latin typeface="Times New Roman" panose="02020603050405020304" pitchFamily="18" charset="0"/>
@@ -9723,10 +9872,886 @@
           </a:p>
         </p:txBody>
       </p:sp>
+      <p:sp>
+        <p:nvSpPr>
+          <p:cNvPr id="6" name="TextBox 5">
+            <a:extLst>
+              <a:ext uri="{FF2B5EF4-FFF2-40B4-BE49-F238E27FC236}">
+                <a16:creationId xmlns:a16="http://schemas.microsoft.com/office/drawing/2014/main" id="{225C03FB-FF0C-467C-BDD9-2C2CFFC22E52}"/>
+              </a:ext>
+            </a:extLst>
+          </p:cNvPr>
+          <p:cNvSpPr txBox="1"/>
+          <p:nvPr/>
+        </p:nvSpPr>
+        <p:spPr>
+          <a:xfrm>
+            <a:off x="582930" y="1682888"/>
+            <a:ext cx="10962503" cy="4170372"/>
+          </a:xfrm>
+          <a:prstGeom prst="rect">
+            <a:avLst/>
+          </a:prstGeom>
+          <a:noFill/>
+        </p:spPr>
+        <p:txBody>
+          <a:bodyPr wrap="square" rtlCol="0">
+            <a:spAutoFit/>
+          </a:bodyPr>
+          <a:lstStyle/>
+          <a:p>
+            <a:pPr marL="342900" indent="-342900">
+              <a:buFont typeface="Arial" panose="020B0604020202020204" pitchFamily="34" charset="0"/>
+              <a:buChar char="•"/>
+            </a:pPr>
+            <a:r>
+              <a:rPr lang="zh-CN" altLang="en-US" sz="2500" dirty="0">
+                <a:latin typeface="仿宋" panose="02010609060101010101" pitchFamily="49" charset="-122"/>
+                <a:ea typeface="仿宋" panose="02010609060101010101" pitchFamily="49" charset="-122"/>
+              </a:rPr>
+              <a:t>关于</a:t>
+            </a:r>
+            <a:r>
+              <a:rPr lang="zh-CN" altLang="en-US" sz="2500" b="1" dirty="0">
+                <a:latin typeface="仿宋" panose="02010609060101010101" pitchFamily="49" charset="-122"/>
+                <a:ea typeface="仿宋" panose="02010609060101010101" pitchFamily="49" charset="-122"/>
+              </a:rPr>
+              <a:t>分类器</a:t>
+            </a:r>
+            <a:r>
+              <a:rPr lang="en-US" altLang="zh-CN" sz="2500" b="1" dirty="0">
+                <a:latin typeface="仿宋" panose="02010609060101010101" pitchFamily="49" charset="-122"/>
+                <a:ea typeface="仿宋" panose="02010609060101010101" pitchFamily="49" charset="-122"/>
+              </a:rPr>
+              <a:t>(classifier)   </a:t>
+            </a:r>
+          </a:p>
+          <a:p>
+            <a:r>
+              <a:rPr lang="zh-CN" altLang="en-US" sz="2000" dirty="0">
+                <a:latin typeface="仿宋" panose="02010609060101010101" pitchFamily="49" charset="-122"/>
+                <a:ea typeface="仿宋" panose="02010609060101010101" pitchFamily="49" charset="-122"/>
+              </a:rPr>
+              <a:t>   时下非常非常非常火爆的研究热点，机器学习</a:t>
+            </a:r>
+            <a:r>
+              <a:rPr lang="en-US" altLang="zh-CN" sz="2000" dirty="0">
+                <a:latin typeface="仿宋" panose="02010609060101010101" pitchFamily="49" charset="-122"/>
+                <a:ea typeface="仿宋" panose="02010609060101010101" pitchFamily="49" charset="-122"/>
+              </a:rPr>
+              <a:t>(Machine Learning)</a:t>
+            </a:r>
+            <a:r>
+              <a:rPr lang="zh-CN" altLang="en-US" sz="2000" dirty="0">
+                <a:latin typeface="仿宋" panose="02010609060101010101" pitchFamily="49" charset="-122"/>
+                <a:ea typeface="仿宋" panose="02010609060101010101" pitchFamily="49" charset="-122"/>
+              </a:rPr>
+              <a:t>中的一大研究内容，经典的分类器利用概率统计、统计信号处理、贝叶斯估计等理论，在向量空间中，将特征化的输入进行划分，分类器的一些经典模型</a:t>
+            </a:r>
+            <a:r>
+              <a:rPr lang="en-US" altLang="zh-CN" sz="2000" dirty="0">
+                <a:latin typeface="仿宋" panose="02010609060101010101" pitchFamily="49" charset="-122"/>
+                <a:ea typeface="仿宋" panose="02010609060101010101" pitchFamily="49" charset="-122"/>
+              </a:rPr>
+              <a:t>【5】</a:t>
+            </a:r>
+            <a:r>
+              <a:rPr lang="zh-CN" altLang="en-US" sz="2000" dirty="0">
+                <a:latin typeface="仿宋" panose="02010609060101010101" pitchFamily="49" charset="-122"/>
+                <a:ea typeface="仿宋" panose="02010609060101010101" pitchFamily="49" charset="-122"/>
+              </a:rPr>
+              <a:t>：</a:t>
+            </a:r>
+            <a:endParaRPr lang="en-US" altLang="zh-CN" sz="2000" dirty="0">
+              <a:latin typeface="仿宋" panose="02010609060101010101" pitchFamily="49" charset="-122"/>
+              <a:ea typeface="仿宋" panose="02010609060101010101" pitchFamily="49" charset="-122"/>
+            </a:endParaRPr>
+          </a:p>
+          <a:p>
+            <a:pPr marL="342900" indent="-342900">
+              <a:buFont typeface="Arial" panose="020B0604020202020204" pitchFamily="34" charset="0"/>
+              <a:buChar char="•"/>
+            </a:pPr>
+            <a:r>
+              <a:rPr lang="en-US" altLang="zh-CN" sz="2000" dirty="0">
+                <a:latin typeface="仿宋" panose="02010609060101010101" pitchFamily="49" charset="-122"/>
+                <a:ea typeface="仿宋" panose="02010609060101010101" pitchFamily="49" charset="-122"/>
+              </a:rPr>
+              <a:t>Bayes</a:t>
+            </a:r>
+            <a:r>
+              <a:rPr lang="zh-CN" altLang="en-US" sz="2000" dirty="0">
+                <a:latin typeface="仿宋" panose="02010609060101010101" pitchFamily="49" charset="-122"/>
+                <a:ea typeface="仿宋" panose="02010609060101010101" pitchFamily="49" charset="-122"/>
+              </a:rPr>
+              <a:t>决策：需要</a:t>
+            </a:r>
+            <a:r>
+              <a:rPr lang="en-US" altLang="zh-CN" sz="2000" dirty="0">
+                <a:latin typeface="仿宋" panose="02010609060101010101" pitchFamily="49" charset="-122"/>
+                <a:ea typeface="仿宋" panose="02010609060101010101" pitchFamily="49" charset="-122"/>
+              </a:rPr>
+              <a:t>posterior</a:t>
+            </a:r>
+            <a:r>
+              <a:rPr lang="zh-CN" altLang="en-US" sz="2000" dirty="0">
+                <a:latin typeface="仿宋" panose="02010609060101010101" pitchFamily="49" charset="-122"/>
+                <a:ea typeface="仿宋" panose="02010609060101010101" pitchFamily="49" charset="-122"/>
+              </a:rPr>
+              <a:t>或者</a:t>
+            </a:r>
+            <a:r>
+              <a:rPr lang="en-US" altLang="zh-CN" sz="2000" u="sng" dirty="0">
+                <a:latin typeface="仿宋" panose="02010609060101010101" pitchFamily="49" charset="-122"/>
+                <a:ea typeface="仿宋" panose="02010609060101010101" pitchFamily="49" charset="-122"/>
+              </a:rPr>
+              <a:t>prior</a:t>
+            </a:r>
+            <a:r>
+              <a:rPr lang="en-US" altLang="zh-CN" sz="2000" dirty="0">
+                <a:latin typeface="仿宋" panose="02010609060101010101" pitchFamily="49" charset="-122"/>
+                <a:ea typeface="仿宋" panose="02010609060101010101" pitchFamily="49" charset="-122"/>
+              </a:rPr>
+              <a:t> &amp; likelihood</a:t>
+            </a:r>
+            <a:r>
+              <a:rPr lang="zh-CN" altLang="en-US" sz="2000" dirty="0">
+                <a:latin typeface="仿宋" panose="02010609060101010101" pitchFamily="49" charset="-122"/>
+                <a:ea typeface="仿宋" panose="02010609060101010101" pitchFamily="49" charset="-122"/>
+              </a:rPr>
+              <a:t>，需要</a:t>
+            </a:r>
+            <a:r>
+              <a:rPr lang="en-US" altLang="zh-CN" sz="2000" u="sng" dirty="0">
+                <a:latin typeface="仿宋" panose="02010609060101010101" pitchFamily="49" charset="-122"/>
+                <a:ea typeface="仿宋" panose="02010609060101010101" pitchFamily="49" charset="-122"/>
+              </a:rPr>
+              <a:t>loss matrix</a:t>
+            </a:r>
+          </a:p>
+          <a:p>
+            <a:pPr marL="342900" indent="-342900">
+              <a:buFont typeface="Arial" panose="020B0604020202020204" pitchFamily="34" charset="0"/>
+              <a:buChar char="•"/>
+            </a:pPr>
+            <a:r>
+              <a:rPr lang="zh-CN" altLang="en-US" sz="2000" dirty="0">
+                <a:latin typeface="仿宋" panose="02010609060101010101" pitchFamily="49" charset="-122"/>
+                <a:ea typeface="仿宋" panose="02010609060101010101" pitchFamily="49" charset="-122"/>
+              </a:rPr>
+              <a:t>支持向量机</a:t>
+            </a:r>
+            <a:r>
+              <a:rPr lang="en-US" altLang="zh-CN" sz="2000" dirty="0">
+                <a:latin typeface="仿宋" panose="02010609060101010101" pitchFamily="49" charset="-122"/>
+                <a:ea typeface="仿宋" panose="02010609060101010101" pitchFamily="49" charset="-122"/>
+              </a:rPr>
+              <a:t>SVM(Support Vector Machine)</a:t>
+            </a:r>
+            <a:r>
+              <a:rPr lang="zh-CN" altLang="en-US" sz="2000" dirty="0">
+                <a:latin typeface="仿宋" panose="02010609060101010101" pitchFamily="49" charset="-122"/>
+                <a:ea typeface="仿宋" panose="02010609060101010101" pitchFamily="49" charset="-122"/>
+              </a:rPr>
+              <a:t>：根据线性可分性</a:t>
+            </a:r>
+            <a:r>
+              <a:rPr lang="zh-CN" altLang="en-US" sz="2000" u="sng" dirty="0">
+                <a:latin typeface="仿宋" panose="02010609060101010101" pitchFamily="49" charset="-122"/>
+                <a:ea typeface="仿宋" panose="02010609060101010101" pitchFamily="49" charset="-122"/>
+              </a:rPr>
+              <a:t>分为</a:t>
+            </a:r>
+            <a:r>
+              <a:rPr lang="en-US" altLang="zh-CN" sz="2000" u="sng" dirty="0">
+                <a:latin typeface="仿宋" panose="02010609060101010101" pitchFamily="49" charset="-122"/>
+                <a:ea typeface="仿宋" panose="02010609060101010101" pitchFamily="49" charset="-122"/>
+              </a:rPr>
+              <a:t>linear SVM</a:t>
+            </a:r>
+            <a:r>
+              <a:rPr lang="zh-CN" altLang="en-US" sz="2000" u="sng" dirty="0">
+                <a:latin typeface="仿宋" panose="02010609060101010101" pitchFamily="49" charset="-122"/>
+                <a:ea typeface="仿宋" panose="02010609060101010101" pitchFamily="49" charset="-122"/>
+              </a:rPr>
+              <a:t>和</a:t>
+            </a:r>
+            <a:r>
+              <a:rPr lang="en-US" altLang="zh-CN" sz="2000" u="sng" dirty="0">
+                <a:latin typeface="仿宋" panose="02010609060101010101" pitchFamily="49" charset="-122"/>
+                <a:ea typeface="仿宋" panose="02010609060101010101" pitchFamily="49" charset="-122"/>
+              </a:rPr>
+              <a:t>nonlinear SVM</a:t>
+            </a:r>
+          </a:p>
+          <a:p>
+            <a:r>
+              <a:rPr lang="en-US" altLang="zh-CN" sz="2000" dirty="0">
+                <a:latin typeface="仿宋" panose="02010609060101010101" pitchFamily="49" charset="-122"/>
+                <a:ea typeface="仿宋" panose="02010609060101010101" pitchFamily="49" charset="-122"/>
+              </a:rPr>
+              <a:t>  					      nonlinear SVM</a:t>
+            </a:r>
+            <a:r>
+              <a:rPr lang="zh-CN" altLang="en-US" sz="2000" dirty="0">
+                <a:latin typeface="仿宋" panose="02010609060101010101" pitchFamily="49" charset="-122"/>
+                <a:ea typeface="仿宋" panose="02010609060101010101" pitchFamily="49" charset="-122"/>
+              </a:rPr>
+              <a:t>中</a:t>
+            </a:r>
+            <a:r>
+              <a:rPr lang="en-US" altLang="zh-CN" sz="2000" dirty="0">
+                <a:latin typeface="仿宋" panose="02010609060101010101" pitchFamily="49" charset="-122"/>
+                <a:ea typeface="仿宋" panose="02010609060101010101" pitchFamily="49" charset="-122"/>
+              </a:rPr>
+              <a:t>kernel function</a:t>
+            </a:r>
+            <a:r>
+              <a:rPr lang="zh-CN" altLang="en-US" sz="2000" dirty="0">
+                <a:latin typeface="仿宋" panose="02010609060101010101" pitchFamily="49" charset="-122"/>
+                <a:ea typeface="仿宋" panose="02010609060101010101" pitchFamily="49" charset="-122"/>
+              </a:rPr>
+              <a:t>的选用比较考</a:t>
+            </a:r>
+            <a:r>
+              <a:rPr lang="en-US" altLang="zh-CN" sz="2000" dirty="0">
+                <a:latin typeface="仿宋" panose="02010609060101010101" pitchFamily="49" charset="-122"/>
+                <a:ea typeface="仿宋" panose="02010609060101010101" pitchFamily="49" charset="-122"/>
+              </a:rPr>
+              <a:t>					      </a:t>
+            </a:r>
+            <a:r>
+              <a:rPr lang="zh-CN" altLang="en-US" sz="2000" dirty="0">
+                <a:latin typeface="仿宋" panose="02010609060101010101" pitchFamily="49" charset="-122"/>
+                <a:ea typeface="仿宋" panose="02010609060101010101" pitchFamily="49" charset="-122"/>
+              </a:rPr>
+              <a:t>究，有一整套理论</a:t>
+            </a:r>
+            <a:r>
+              <a:rPr lang="en-US" altLang="zh-CN" sz="2000" dirty="0">
+                <a:latin typeface="仿宋" panose="02010609060101010101" pitchFamily="49" charset="-122"/>
+                <a:ea typeface="仿宋" panose="02010609060101010101" pitchFamily="49" charset="-122"/>
+              </a:rPr>
+              <a:t>【6】【7】</a:t>
+            </a:r>
+            <a:r>
+              <a:rPr lang="zh-CN" altLang="en-US" sz="2000" dirty="0">
+                <a:latin typeface="仿宋" panose="02010609060101010101" pitchFamily="49" charset="-122"/>
+                <a:ea typeface="仿宋" panose="02010609060101010101" pitchFamily="49" charset="-122"/>
+              </a:rPr>
+              <a:t>。</a:t>
+            </a:r>
+            <a:r>
+              <a:rPr lang="zh-CN" altLang="en-US" sz="2000" strike="sngStrike" dirty="0">
+                <a:latin typeface="仿宋" panose="02010609060101010101" pitchFamily="49" charset="-122"/>
+                <a:ea typeface="仿宋" panose="02010609060101010101" pitchFamily="49" charset="-122"/>
+              </a:rPr>
+              <a:t>水太深了</a:t>
+            </a:r>
+            <a:r>
+              <a:rPr lang="en-US" altLang="zh-CN" sz="2000" strike="sngStrike" dirty="0">
+                <a:latin typeface="仿宋" panose="02010609060101010101" pitchFamily="49" charset="-122"/>
+                <a:ea typeface="仿宋" panose="02010609060101010101" pitchFamily="49" charset="-122"/>
+              </a:rPr>
+              <a:t>……</a:t>
+            </a:r>
+          </a:p>
+          <a:p>
+            <a:pPr marL="342900" indent="-342900">
+              <a:buFont typeface="Arial" panose="020B0604020202020204" pitchFamily="34" charset="0"/>
+              <a:buChar char="•"/>
+            </a:pPr>
+            <a:r>
+              <a:rPr lang="en-US" altLang="zh-CN" sz="2000" dirty="0" err="1">
+                <a:latin typeface="仿宋" panose="02010609060101010101" pitchFamily="49" charset="-122"/>
+                <a:ea typeface="仿宋" panose="02010609060101010101" pitchFamily="49" charset="-122"/>
+              </a:rPr>
+              <a:t>Adaboost</a:t>
+            </a:r>
+            <a:r>
+              <a:rPr lang="en-US" altLang="zh-CN" sz="2000" dirty="0">
+                <a:latin typeface="仿宋" panose="02010609060101010101" pitchFamily="49" charset="-122"/>
+                <a:ea typeface="仿宋" panose="02010609060101010101" pitchFamily="49" charset="-122"/>
+              </a:rPr>
+              <a:t>(Adaptive Boosting)</a:t>
+            </a:r>
+            <a:r>
+              <a:rPr lang="zh-CN" altLang="en-US" sz="2000" dirty="0">
+                <a:latin typeface="仿宋" panose="02010609060101010101" pitchFamily="49" charset="-122"/>
+                <a:ea typeface="仿宋" panose="02010609060101010101" pitchFamily="49" charset="-122"/>
+              </a:rPr>
+              <a:t>：</a:t>
+            </a:r>
+            <a:r>
+              <a:rPr lang="en-US" altLang="zh-CN" sz="2000" dirty="0">
+                <a:latin typeface="仿宋" panose="02010609060101010101" pitchFamily="49" charset="-122"/>
+                <a:ea typeface="仿宋" panose="02010609060101010101" pitchFamily="49" charset="-122"/>
+              </a:rPr>
+              <a:t>sensitive to outliers</a:t>
+            </a:r>
+            <a:r>
+              <a:rPr lang="zh-CN" altLang="en-US" sz="2000" dirty="0">
+                <a:latin typeface="仿宋" panose="02010609060101010101" pitchFamily="49" charset="-122"/>
+                <a:ea typeface="仿宋" panose="02010609060101010101" pitchFamily="49" charset="-122"/>
+              </a:rPr>
+              <a:t>，母前手头的样本太少</a:t>
+            </a:r>
+            <a:endParaRPr lang="en-US" altLang="zh-CN" sz="2000" dirty="0">
+              <a:latin typeface="仿宋" panose="02010609060101010101" pitchFamily="49" charset="-122"/>
+              <a:ea typeface="仿宋" panose="02010609060101010101" pitchFamily="49" charset="-122"/>
+            </a:endParaRPr>
+          </a:p>
+          <a:p>
+            <a:pPr marL="342900" indent="-342900">
+              <a:buFont typeface="Arial" panose="020B0604020202020204" pitchFamily="34" charset="0"/>
+              <a:buChar char="•"/>
+            </a:pPr>
+            <a:r>
+              <a:rPr lang="zh-CN" altLang="en-US" sz="2000" dirty="0">
+                <a:latin typeface="仿宋" panose="02010609060101010101" pitchFamily="49" charset="-122"/>
+                <a:ea typeface="仿宋" panose="02010609060101010101" pitchFamily="49" charset="-122"/>
+              </a:rPr>
+              <a:t>随机森林</a:t>
+            </a:r>
+            <a:r>
+              <a:rPr lang="en-US" altLang="zh-CN" sz="2000" dirty="0">
+                <a:latin typeface="仿宋" panose="02010609060101010101" pitchFamily="49" charset="-122"/>
+                <a:ea typeface="仿宋" panose="02010609060101010101" pitchFamily="49" charset="-122"/>
+              </a:rPr>
+              <a:t>(Random Forest)</a:t>
+            </a:r>
+            <a:r>
+              <a:rPr lang="zh-CN" altLang="en-US" sz="2000" dirty="0">
+                <a:latin typeface="仿宋" panose="02010609060101010101" pitchFamily="49" charset="-122"/>
+                <a:ea typeface="仿宋" panose="02010609060101010101" pitchFamily="49" charset="-122"/>
+              </a:rPr>
+              <a:t>：训练有点复杂</a:t>
+            </a:r>
+            <a:endParaRPr lang="en-US" altLang="zh-CN" sz="2000" dirty="0">
+              <a:latin typeface="仿宋" panose="02010609060101010101" pitchFamily="49" charset="-122"/>
+              <a:ea typeface="仿宋" panose="02010609060101010101" pitchFamily="49" charset="-122"/>
+            </a:endParaRPr>
+          </a:p>
+          <a:p>
+            <a:pPr marL="342900" indent="-342900">
+              <a:buFont typeface="Arial" panose="020B0604020202020204" pitchFamily="34" charset="0"/>
+              <a:buChar char="•"/>
+            </a:pPr>
+            <a:r>
+              <a:rPr lang="en-US" altLang="zh-CN" sz="2000" dirty="0">
+                <a:latin typeface="仿宋" panose="02010609060101010101" pitchFamily="49" charset="-122"/>
+                <a:ea typeface="仿宋" panose="02010609060101010101" pitchFamily="49" charset="-122"/>
+              </a:rPr>
+              <a:t>GMM + Maximum Likelihood Estimation</a:t>
+            </a:r>
+            <a:r>
+              <a:rPr lang="zh-CN" altLang="en-US" sz="2000" dirty="0">
+                <a:latin typeface="仿宋" panose="02010609060101010101" pitchFamily="49" charset="-122"/>
+                <a:ea typeface="仿宋" panose="02010609060101010101" pitchFamily="49" charset="-122"/>
+              </a:rPr>
+              <a:t>：本项目中使用</a:t>
+            </a:r>
+            <a:endParaRPr lang="en-US" altLang="zh-CN" sz="2000" dirty="0">
+              <a:latin typeface="仿宋" panose="02010609060101010101" pitchFamily="49" charset="-122"/>
+              <a:ea typeface="仿宋" panose="02010609060101010101" pitchFamily="49" charset="-122"/>
+            </a:endParaRPr>
+          </a:p>
+          <a:p>
+            <a:pPr marL="342900" indent="-342900">
+              <a:buFont typeface="Arial" panose="020B0604020202020204" pitchFamily="34" charset="0"/>
+              <a:buChar char="•"/>
+            </a:pPr>
+            <a:endParaRPr lang="en-US" altLang="zh-CN" sz="2000" dirty="0">
+              <a:latin typeface="仿宋" panose="02010609060101010101" pitchFamily="49" charset="-122"/>
+              <a:ea typeface="仿宋" panose="02010609060101010101" pitchFamily="49" charset="-122"/>
+            </a:endParaRPr>
+          </a:p>
+          <a:p>
+            <a:endParaRPr lang="en-US" altLang="zh-CN" sz="2000" dirty="0">
+              <a:latin typeface="仿宋" panose="02010609060101010101" pitchFamily="49" charset="-122"/>
+              <a:ea typeface="仿宋" panose="02010609060101010101" pitchFamily="49" charset="-122"/>
+            </a:endParaRPr>
+          </a:p>
+        </p:txBody>
+      </p:sp>
+      <p:sp>
+        <p:nvSpPr>
+          <p:cNvPr id="15" name="TextBox 14">
+            <a:extLst>
+              <a:ext uri="{FF2B5EF4-FFF2-40B4-BE49-F238E27FC236}">
+                <a16:creationId xmlns:a16="http://schemas.microsoft.com/office/drawing/2014/main" id="{0049405E-4AAF-4A98-B9AE-3CCC0C9BB80B}"/>
+              </a:ext>
+            </a:extLst>
+          </p:cNvPr>
+          <p:cNvSpPr txBox="1"/>
+          <p:nvPr/>
+        </p:nvSpPr>
+        <p:spPr>
+          <a:xfrm>
+            <a:off x="967740" y="6279538"/>
+            <a:ext cx="7453390" cy="553998"/>
+          </a:xfrm>
+          <a:prstGeom prst="rect">
+            <a:avLst/>
+          </a:prstGeom>
+          <a:noFill/>
+        </p:spPr>
+        <p:txBody>
+          <a:bodyPr wrap="square" rtlCol="0">
+            <a:spAutoFit/>
+          </a:bodyPr>
+          <a:lstStyle/>
+          <a:p>
+            <a:r>
+              <a:rPr lang="en-US" altLang="zh-CN" sz="1000" dirty="0"/>
+              <a:t>【5】Pattern Recognition and Machine Learning, Springer, Christopher M. Bishop</a:t>
+            </a:r>
+          </a:p>
+          <a:p>
+            <a:r>
+              <a:rPr lang="en-US" altLang="zh-CN" sz="1000" dirty="0"/>
+              <a:t>【6】Learning with Kernels, MIT Press, B. </a:t>
+            </a:r>
+            <a:r>
+              <a:rPr lang="en-US" altLang="zh-CN" sz="1000" dirty="0" err="1"/>
+              <a:t>Schoelkopf</a:t>
+            </a:r>
+            <a:r>
+              <a:rPr lang="en-US" altLang="zh-CN" sz="1000" dirty="0"/>
+              <a:t>, A. </a:t>
+            </a:r>
+            <a:r>
+              <a:rPr lang="en-US" altLang="zh-CN" sz="1000" dirty="0" err="1"/>
+              <a:t>Smola</a:t>
+            </a:r>
+            <a:endParaRPr lang="en-US" altLang="zh-CN" sz="1000" dirty="0"/>
+          </a:p>
+          <a:p>
+            <a:r>
+              <a:rPr lang="en-US" altLang="zh-CN" sz="1000" dirty="0"/>
+              <a:t>【7】A Tutorial on Support Vector Machines for Pattern Recognition, Data Mining and Knowledge Discovery</a:t>
+            </a:r>
+            <a:endParaRPr lang="zh-CN" altLang="en-US" sz="1000" dirty="0"/>
+          </a:p>
+        </p:txBody>
+      </p:sp>
     </p:spTree>
     <p:extLst>
       <p:ext uri="{BB962C8B-B14F-4D97-AF65-F5344CB8AC3E}">
-        <p14:creationId xmlns:p14="http://schemas.microsoft.com/office/powerpoint/2010/main" val="4098803284"/>
+        <p14:creationId xmlns:p14="http://schemas.microsoft.com/office/powerpoint/2010/main" val="2320512508"/>
+      </p:ext>
+    </p:extLst>
+  </p:cSld>
+  <p:clrMapOvr>
+    <a:masterClrMapping/>
+  </p:clrMapOvr>
+</p:sld>
+</file>
+
+<file path=ppt/slides/slide19.xml><?xml version="1.0" encoding="utf-8"?>
+<p:sld xmlns:a="http://schemas.openxmlformats.org/drawingml/2006/main" xmlns:r="http://schemas.openxmlformats.org/officeDocument/2006/relationships" xmlns:p="http://schemas.openxmlformats.org/presentationml/2006/main">
+  <p:cSld>
+    <p:spTree>
+      <p:nvGrpSpPr>
+        <p:cNvPr id="1" name=""/>
+        <p:cNvGrpSpPr/>
+        <p:nvPr/>
+      </p:nvGrpSpPr>
+      <p:grpSpPr>
+        <a:xfrm>
+          <a:off x="0" y="0"/>
+          <a:ext cx="0" cy="0"/>
+          <a:chOff x="0" y="0"/>
+          <a:chExt cx="0" cy="0"/>
+        </a:xfrm>
+      </p:grpSpPr>
+      <p:sp>
+        <p:nvSpPr>
+          <p:cNvPr id="4" name="Slide Number Placeholder 3">
+            <a:extLst>
+              <a:ext uri="{FF2B5EF4-FFF2-40B4-BE49-F238E27FC236}">
+                <a16:creationId xmlns:a16="http://schemas.microsoft.com/office/drawing/2014/main" id="{E370ACF5-72B0-42AF-8A9C-F6AC839802A7}"/>
+              </a:ext>
+            </a:extLst>
+          </p:cNvPr>
+          <p:cNvSpPr>
+            <a:spLocks noGrp="1"/>
+          </p:cNvSpPr>
+          <p:nvPr>
+            <p:ph type="sldNum" sz="quarter" idx="12"/>
+          </p:nvPr>
+        </p:nvSpPr>
+        <p:spPr/>
+        <p:txBody>
+          <a:bodyPr/>
+          <a:lstStyle/>
+          <a:p>
+            <a:fld id="{2BB362F8-89DF-415A-B93E-F967FB14F09D}" type="slidenum">
+              <a:rPr lang="zh-CN" altLang="en-US" smtClean="0"/>
+              <a:t>19</a:t>
+            </a:fld>
+            <a:endParaRPr lang="zh-CN" altLang="en-US"/>
+          </a:p>
+        </p:txBody>
+      </p:sp>
+      <p:sp>
+        <p:nvSpPr>
+          <p:cNvPr id="5" name="Title 1">
+            <a:extLst>
+              <a:ext uri="{FF2B5EF4-FFF2-40B4-BE49-F238E27FC236}">
+                <a16:creationId xmlns:a16="http://schemas.microsoft.com/office/drawing/2014/main" id="{3BC196C9-E495-403A-9892-5A9C27D64E32}"/>
+              </a:ext>
+            </a:extLst>
+          </p:cNvPr>
+          <p:cNvSpPr>
+            <a:spLocks noGrp="1"/>
+          </p:cNvSpPr>
+          <p:nvPr>
+            <p:ph type="title"/>
+          </p:nvPr>
+        </p:nvSpPr>
+        <p:spPr>
+          <a:xfrm>
+            <a:off x="838200" y="174763"/>
+            <a:ext cx="10515600" cy="1325563"/>
+          </a:xfrm>
+        </p:spPr>
+        <p:txBody>
+          <a:bodyPr/>
+          <a:lstStyle/>
+          <a:p>
+            <a:r>
+              <a:rPr lang="zh-CN" altLang="en-US" dirty="0">
+                <a:latin typeface="仿宋" panose="02010609060101010101" pitchFamily="49" charset="-122"/>
+                <a:ea typeface="仿宋" panose="02010609060101010101" pitchFamily="49" charset="-122"/>
+              </a:rPr>
+              <a:t>软件架构 </a:t>
+            </a:r>
+            <a:r>
+              <a:rPr lang="en-US" altLang="zh-CN" dirty="0">
+                <a:latin typeface="仿宋" panose="02010609060101010101" pitchFamily="49" charset="-122"/>
+                <a:ea typeface="仿宋" panose="02010609060101010101" pitchFamily="49" charset="-122"/>
+              </a:rPr>
+              <a:t>– </a:t>
+            </a:r>
+            <a:r>
+              <a:rPr lang="zh-CN" altLang="en-US" dirty="0">
+                <a:latin typeface="仿宋" panose="02010609060101010101" pitchFamily="49" charset="-122"/>
+                <a:ea typeface="仿宋" panose="02010609060101010101" pitchFamily="49" charset="-122"/>
+              </a:rPr>
+              <a:t>分类器</a:t>
+            </a:r>
+            <a:br>
+              <a:rPr lang="en-US" altLang="zh-CN" dirty="0">
+                <a:latin typeface="仿宋" panose="02010609060101010101" pitchFamily="49" charset="-122"/>
+                <a:ea typeface="仿宋" panose="02010609060101010101" pitchFamily="49" charset="-122"/>
+              </a:rPr>
+            </a:br>
+            <a:r>
+              <a:rPr lang="en-US" altLang="zh-CN" sz="3000" dirty="0">
+                <a:latin typeface="Times New Roman" panose="02020603050405020304" pitchFamily="18" charset="0"/>
+                <a:ea typeface="仿宋" panose="02010609060101010101" pitchFamily="49" charset="-122"/>
+                <a:cs typeface="Times New Roman" panose="02020603050405020304" pitchFamily="18" charset="0"/>
+              </a:rPr>
+              <a:t>Software Architecture – classifier</a:t>
+            </a:r>
+            <a:endParaRPr lang="zh-CN" altLang="en-US" sz="3000" dirty="0">
+              <a:latin typeface="Times New Roman" panose="02020603050405020304" pitchFamily="18" charset="0"/>
+              <a:ea typeface="仿宋" panose="02010609060101010101" pitchFamily="49" charset="-122"/>
+              <a:cs typeface="Times New Roman" panose="02020603050405020304" pitchFamily="18" charset="0"/>
+            </a:endParaRPr>
+          </a:p>
+        </p:txBody>
+      </p:sp>
+      <p:sp>
+        <p:nvSpPr>
+          <p:cNvPr id="6" name="TextBox 5">
+            <a:extLst>
+              <a:ext uri="{FF2B5EF4-FFF2-40B4-BE49-F238E27FC236}">
+                <a16:creationId xmlns:a16="http://schemas.microsoft.com/office/drawing/2014/main" id="{225C03FB-FF0C-467C-BDD9-2C2CFFC22E52}"/>
+              </a:ext>
+            </a:extLst>
+          </p:cNvPr>
+          <p:cNvSpPr txBox="1"/>
+          <p:nvPr/>
+        </p:nvSpPr>
+        <p:spPr>
+          <a:xfrm>
+            <a:off x="696097" y="1255621"/>
+            <a:ext cx="10962503" cy="707886"/>
+          </a:xfrm>
+          <a:prstGeom prst="rect">
+            <a:avLst/>
+          </a:prstGeom>
+          <a:noFill/>
+        </p:spPr>
+        <p:txBody>
+          <a:bodyPr wrap="square" rtlCol="0">
+            <a:spAutoFit/>
+          </a:bodyPr>
+          <a:lstStyle/>
+          <a:p>
+            <a:pPr marL="342900" indent="-342900">
+              <a:buFont typeface="Arial" panose="020B0604020202020204" pitchFamily="34" charset="0"/>
+              <a:buChar char="•"/>
+            </a:pPr>
+            <a:r>
+              <a:rPr lang="zh-CN" altLang="en-US" sz="2000" dirty="0">
+                <a:latin typeface="仿宋" panose="02010609060101010101" pitchFamily="49" charset="-122"/>
+                <a:ea typeface="仿宋" panose="02010609060101010101" pitchFamily="49" charset="-122"/>
+              </a:rPr>
+              <a:t>混合高斯模型</a:t>
+            </a:r>
+            <a:r>
+              <a:rPr lang="en-US" altLang="zh-CN" sz="2000" dirty="0">
+                <a:latin typeface="仿宋" panose="02010609060101010101" pitchFamily="49" charset="-122"/>
+                <a:ea typeface="仿宋" panose="02010609060101010101" pitchFamily="49" charset="-122"/>
+              </a:rPr>
+              <a:t>GMM(Gaussian Mixture Model)【5】【10】</a:t>
+            </a:r>
+            <a:r>
+              <a:rPr lang="zh-CN" altLang="en-US" sz="2000" dirty="0">
+                <a:latin typeface="仿宋" panose="02010609060101010101" pitchFamily="49" charset="-122"/>
+                <a:ea typeface="仿宋" panose="02010609060101010101" pitchFamily="49" charset="-122"/>
+              </a:rPr>
+              <a:t>：又叫</a:t>
+            </a:r>
+            <a:r>
+              <a:rPr lang="en-US" altLang="zh-CN" sz="2000" dirty="0" err="1">
+                <a:latin typeface="仿宋" panose="02010609060101010101" pitchFamily="49" charset="-122"/>
+                <a:ea typeface="仿宋" panose="02010609060101010101" pitchFamily="49" charset="-122"/>
+              </a:rPr>
+              <a:t>MoG</a:t>
+            </a:r>
+            <a:r>
+              <a:rPr lang="en-US" altLang="zh-CN" sz="2000" dirty="0">
+                <a:latin typeface="仿宋" panose="02010609060101010101" pitchFamily="49" charset="-122"/>
+                <a:ea typeface="仿宋" panose="02010609060101010101" pitchFamily="49" charset="-122"/>
+              </a:rPr>
+              <a:t>(Mixture of Gaussian)</a:t>
+            </a:r>
+          </a:p>
+          <a:p>
+            <a:endParaRPr lang="en-US" altLang="zh-CN" sz="2000" dirty="0">
+              <a:latin typeface="仿宋" panose="02010609060101010101" pitchFamily="49" charset="-122"/>
+              <a:ea typeface="仿宋" panose="02010609060101010101" pitchFamily="49" charset="-122"/>
+            </a:endParaRPr>
+          </a:p>
+        </p:txBody>
+      </p:sp>
+      <p:sp>
+        <p:nvSpPr>
+          <p:cNvPr id="15" name="TextBox 14">
+            <a:extLst>
+              <a:ext uri="{FF2B5EF4-FFF2-40B4-BE49-F238E27FC236}">
+                <a16:creationId xmlns:a16="http://schemas.microsoft.com/office/drawing/2014/main" id="{0049405E-4AAF-4A98-B9AE-3CCC0C9BB80B}"/>
+              </a:ext>
+            </a:extLst>
+          </p:cNvPr>
+          <p:cNvSpPr txBox="1"/>
+          <p:nvPr/>
+        </p:nvSpPr>
+        <p:spPr>
+          <a:xfrm>
+            <a:off x="967740" y="6272576"/>
+            <a:ext cx="7453390" cy="553998"/>
+          </a:xfrm>
+          <a:prstGeom prst="rect">
+            <a:avLst/>
+          </a:prstGeom>
+          <a:noFill/>
+        </p:spPr>
+        <p:txBody>
+          <a:bodyPr wrap="square" rtlCol="0">
+            <a:spAutoFit/>
+          </a:bodyPr>
+          <a:lstStyle/>
+          <a:p>
+            <a:r>
+              <a:rPr lang="en-US" altLang="zh-CN" sz="1000" dirty="0"/>
+              <a:t>【5】Pattern Recognition and Machine Learning, Springer, Christopher M. Bishop</a:t>
+            </a:r>
+          </a:p>
+          <a:p>
+            <a:r>
+              <a:rPr lang="en-US" altLang="zh-CN" sz="1000" dirty="0"/>
+              <a:t>【9】</a:t>
+            </a:r>
+            <a:r>
+              <a:rPr lang="zh-CN" altLang="en-US" sz="1000" dirty="0"/>
+              <a:t>公共场所下的枪声检测研究，硕士学位论文，朱强强</a:t>
+            </a:r>
+            <a:endParaRPr lang="en-US" altLang="zh-CN" sz="1000" dirty="0"/>
+          </a:p>
+          <a:p>
+            <a:r>
+              <a:rPr lang="en-US" altLang="zh-CN" sz="1000" dirty="0"/>
+              <a:t>【10】Machine Learning (Lecture Notes), RWTH University Aachen, Bastian </a:t>
+            </a:r>
+            <a:r>
+              <a:rPr lang="en-US" altLang="zh-CN" sz="1000" dirty="0" err="1"/>
+              <a:t>Leibe</a:t>
+            </a:r>
+            <a:r>
+              <a:rPr lang="en-US" altLang="zh-CN" sz="1000" dirty="0"/>
+              <a:t>, </a:t>
+            </a:r>
+            <a:r>
+              <a:rPr lang="en-US" altLang="zh-CN" sz="1000" dirty="0" err="1"/>
+              <a:t>Bernt</a:t>
+            </a:r>
+            <a:r>
+              <a:rPr lang="en-US" altLang="zh-CN" sz="1000" dirty="0"/>
+              <a:t> Schiele</a:t>
+            </a:r>
+            <a:endParaRPr lang="zh-CN" altLang="en-US" sz="1000" dirty="0"/>
+          </a:p>
+        </p:txBody>
+      </p:sp>
+      <p:pic>
+        <p:nvPicPr>
+          <p:cNvPr id="3" name="Picture 2">
+            <a:extLst>
+              <a:ext uri="{FF2B5EF4-FFF2-40B4-BE49-F238E27FC236}">
+                <a16:creationId xmlns:a16="http://schemas.microsoft.com/office/drawing/2014/main" id="{05188D57-7C26-41CA-BA04-05F8F5B1AC99}"/>
+              </a:ext>
+            </a:extLst>
+          </p:cNvPr>
+          <p:cNvPicPr>
+            <a:picLocks noChangeAspect="1"/>
+          </p:cNvPicPr>
+          <p:nvPr/>
+        </p:nvPicPr>
+        <p:blipFill>
+          <a:blip r:embed="rId3"/>
+          <a:stretch>
+            <a:fillRect/>
+          </a:stretch>
+        </p:blipFill>
+        <p:spPr>
+          <a:xfrm>
+            <a:off x="480060" y="2032694"/>
+            <a:ext cx="5178001" cy="3431264"/>
+          </a:xfrm>
+          <a:prstGeom prst="rect">
+            <a:avLst/>
+          </a:prstGeom>
+        </p:spPr>
+      </p:pic>
+      <p:pic>
+        <p:nvPicPr>
+          <p:cNvPr id="7" name="Picture 6">
+            <a:extLst>
+              <a:ext uri="{FF2B5EF4-FFF2-40B4-BE49-F238E27FC236}">
+                <a16:creationId xmlns:a16="http://schemas.microsoft.com/office/drawing/2014/main" id="{46BB8348-30EF-4F12-89C2-1C9498D26E8C}"/>
+              </a:ext>
+            </a:extLst>
+          </p:cNvPr>
+          <p:cNvPicPr>
+            <a:picLocks noChangeAspect="1"/>
+          </p:cNvPicPr>
+          <p:nvPr/>
+        </p:nvPicPr>
+        <p:blipFill>
+          <a:blip r:embed="rId4"/>
+          <a:stretch>
+            <a:fillRect/>
+          </a:stretch>
+        </p:blipFill>
+        <p:spPr>
+          <a:xfrm>
+            <a:off x="6177348" y="4025280"/>
+            <a:ext cx="3461952" cy="2247296"/>
+          </a:xfrm>
+          <a:prstGeom prst="rect">
+            <a:avLst/>
+          </a:prstGeom>
+        </p:spPr>
+      </p:pic>
+      <p:pic>
+        <p:nvPicPr>
+          <p:cNvPr id="8" name="Picture 7">
+            <a:extLst>
+              <a:ext uri="{FF2B5EF4-FFF2-40B4-BE49-F238E27FC236}">
+                <a16:creationId xmlns:a16="http://schemas.microsoft.com/office/drawing/2014/main" id="{13A9E94D-5800-42D3-B30E-8B46D70FB98B}"/>
+              </a:ext>
+            </a:extLst>
+          </p:cNvPr>
+          <p:cNvPicPr>
+            <a:picLocks noChangeAspect="1"/>
+          </p:cNvPicPr>
+          <p:nvPr/>
+        </p:nvPicPr>
+        <p:blipFill>
+          <a:blip r:embed="rId5"/>
+          <a:stretch>
+            <a:fillRect/>
+          </a:stretch>
+        </p:blipFill>
+        <p:spPr>
+          <a:xfrm>
+            <a:off x="6113917" y="2096878"/>
+            <a:ext cx="5420933" cy="1832351"/>
+          </a:xfrm>
+          <a:prstGeom prst="rect">
+            <a:avLst/>
+          </a:prstGeom>
+        </p:spPr>
+      </p:pic>
+      <p:sp>
+        <p:nvSpPr>
+          <p:cNvPr id="11" name="Rectangle 10">
+            <a:extLst>
+              <a:ext uri="{FF2B5EF4-FFF2-40B4-BE49-F238E27FC236}">
+                <a16:creationId xmlns:a16="http://schemas.microsoft.com/office/drawing/2014/main" id="{9916AA10-74DF-45BE-A6A7-82ABFC4503FD}"/>
+              </a:ext>
+            </a:extLst>
+          </p:cNvPr>
+          <p:cNvSpPr/>
+          <p:nvPr/>
+        </p:nvSpPr>
+        <p:spPr>
+          <a:xfrm>
+            <a:off x="3276614" y="4382636"/>
+            <a:ext cx="2316466" cy="981843"/>
+          </a:xfrm>
+          <a:prstGeom prst="rect">
+            <a:avLst/>
+          </a:prstGeom>
+          <a:noFill/>
+          <a:ln w="38100">
+            <a:solidFill>
+              <a:srgbClr val="FF0000"/>
+            </a:solidFill>
+          </a:ln>
+        </p:spPr>
+        <p:style>
+          <a:lnRef idx="2">
+            <a:schemeClr val="accent2"/>
+          </a:lnRef>
+          <a:fillRef idx="1">
+            <a:schemeClr val="lt1"/>
+          </a:fillRef>
+          <a:effectRef idx="0">
+            <a:schemeClr val="accent2"/>
+          </a:effectRef>
+          <a:fontRef idx="minor">
+            <a:schemeClr val="dk1"/>
+          </a:fontRef>
+        </p:style>
+        <p:txBody>
+          <a:bodyPr rtlCol="0" anchor="ctr"/>
+          <a:lstStyle/>
+          <a:p>
+            <a:pPr algn="ctr"/>
+            <a:endParaRPr lang="zh-CN" altLang="en-US"/>
+          </a:p>
+        </p:txBody>
+      </p:sp>
+    </p:spTree>
+    <p:extLst>
+      <p:ext uri="{BB962C8B-B14F-4D97-AF65-F5344CB8AC3E}">
+        <p14:creationId xmlns:p14="http://schemas.microsoft.com/office/powerpoint/2010/main" val="2655265174"/>
       </p:ext>
     </p:extLst>
   </p:cSld>
@@ -10084,57 +11109,6 @@
           </a:p>
         </p:txBody>
       </p:sp>
-      <p:sp>
-        <p:nvSpPr>
-          <p:cNvPr id="10" name="Flowchart: Terminator 9">
-            <a:extLst>
-              <a:ext uri="{FF2B5EF4-FFF2-40B4-BE49-F238E27FC236}">
-                <a16:creationId xmlns:a16="http://schemas.microsoft.com/office/drawing/2014/main" id="{713125AB-F947-460F-9D7C-B24D25ED9A9D}"/>
-              </a:ext>
-            </a:extLst>
-          </p:cNvPr>
-          <p:cNvSpPr/>
-          <p:nvPr/>
-        </p:nvSpPr>
-        <p:spPr>
-          <a:xfrm>
-            <a:off x="2545108" y="6072013"/>
-            <a:ext cx="2639590" cy="523783"/>
-          </a:xfrm>
-          <a:prstGeom prst="flowChartTerminator">
-            <a:avLst/>
-          </a:prstGeom>
-        </p:spPr>
-        <p:style>
-          <a:lnRef idx="3">
-            <a:schemeClr val="lt1"/>
-          </a:lnRef>
-          <a:fillRef idx="1">
-            <a:schemeClr val="accent1"/>
-          </a:fillRef>
-          <a:effectRef idx="1">
-            <a:schemeClr val="accent1"/>
-          </a:effectRef>
-          <a:fontRef idx="minor">
-            <a:schemeClr val="lt1"/>
-          </a:fontRef>
-        </p:style>
-        <p:txBody>
-          <a:bodyPr rtlCol="0" anchor="ctr"/>
-          <a:lstStyle/>
-          <a:p>
-            <a:pPr algn="ctr"/>
-            <a:r>
-              <a:rPr lang="en-US" altLang="zh-CN" b="1" dirty="0"/>
-              <a:t>Microphone</a:t>
-            </a:r>
-            <a:r>
-              <a:rPr lang="zh-CN" altLang="en-US" b="1" dirty="0"/>
-              <a:t>实时输出</a:t>
-            </a:r>
-          </a:p>
-        </p:txBody>
-      </p:sp>
       <p:cxnSp>
         <p:nvCxnSpPr>
           <p:cNvPr id="12" name="Straight Arrow Connector 11">
@@ -10276,7 +11250,6 @@
           <p:cNvCxnSpPr>
             <a:cxnSpLocks/>
             <a:stCxn id="9" idx="2"/>
-            <a:endCxn id="10" idx="0"/>
           </p:cNvCxnSpPr>
           <p:nvPr/>
         </p:nvCxnSpPr>
@@ -10883,10 +11856,2335 @@
           </a:p>
         </p:txBody>
       </p:sp>
+      <p:sp>
+        <p:nvSpPr>
+          <p:cNvPr id="26" name="Flowchart: Terminator 25">
+            <a:extLst>
+              <a:ext uri="{FF2B5EF4-FFF2-40B4-BE49-F238E27FC236}">
+                <a16:creationId xmlns:a16="http://schemas.microsoft.com/office/drawing/2014/main" id="{61F18FD2-F4EC-4D8F-BFDF-235CE9A75EF4}"/>
+              </a:ext>
+            </a:extLst>
+          </p:cNvPr>
+          <p:cNvSpPr/>
+          <p:nvPr/>
+        </p:nvSpPr>
+        <p:spPr>
+          <a:xfrm>
+            <a:off x="2545108" y="6072013"/>
+            <a:ext cx="2639590" cy="523783"/>
+          </a:xfrm>
+          <a:prstGeom prst="flowChartTerminator">
+            <a:avLst/>
+          </a:prstGeom>
+        </p:spPr>
+        <p:style>
+          <a:lnRef idx="3">
+            <a:schemeClr val="lt1"/>
+          </a:lnRef>
+          <a:fillRef idx="1">
+            <a:schemeClr val="accent1"/>
+          </a:fillRef>
+          <a:effectRef idx="1">
+            <a:schemeClr val="accent1"/>
+          </a:effectRef>
+          <a:fontRef idx="minor">
+            <a:schemeClr val="lt1"/>
+          </a:fontRef>
+        </p:style>
+        <p:txBody>
+          <a:bodyPr rtlCol="0" anchor="ctr"/>
+          <a:lstStyle/>
+          <a:p>
+            <a:pPr algn="ctr"/>
+            <a:r>
+              <a:rPr lang="zh-CN" altLang="en-US" b="1" dirty="0"/>
+              <a:t>结果输出</a:t>
+            </a:r>
+          </a:p>
+        </p:txBody>
+      </p:sp>
     </p:spTree>
     <p:extLst>
       <p:ext uri="{BB962C8B-B14F-4D97-AF65-F5344CB8AC3E}">
         <p14:creationId xmlns:p14="http://schemas.microsoft.com/office/powerpoint/2010/main" val="1683549510"/>
+      </p:ext>
+    </p:extLst>
+  </p:cSld>
+  <p:clrMapOvr>
+    <a:masterClrMapping/>
+  </p:clrMapOvr>
+</p:sld>
+</file>
+
+<file path=ppt/slides/slide20.xml><?xml version="1.0" encoding="utf-8"?>
+<p:sld xmlns:a="http://schemas.openxmlformats.org/drawingml/2006/main" xmlns:r="http://schemas.openxmlformats.org/officeDocument/2006/relationships" xmlns:p="http://schemas.openxmlformats.org/presentationml/2006/main">
+  <p:cSld>
+    <p:spTree>
+      <p:nvGrpSpPr>
+        <p:cNvPr id="1" name=""/>
+        <p:cNvGrpSpPr/>
+        <p:nvPr/>
+      </p:nvGrpSpPr>
+      <p:grpSpPr>
+        <a:xfrm>
+          <a:off x="0" y="0"/>
+          <a:ext cx="0" cy="0"/>
+          <a:chOff x="0" y="0"/>
+          <a:chExt cx="0" cy="0"/>
+        </a:xfrm>
+      </p:grpSpPr>
+      <p:pic>
+        <p:nvPicPr>
+          <p:cNvPr id="14" name="Picture 13">
+            <a:extLst>
+              <a:ext uri="{FF2B5EF4-FFF2-40B4-BE49-F238E27FC236}">
+                <a16:creationId xmlns:a16="http://schemas.microsoft.com/office/drawing/2014/main" id="{8FBD85AC-2C01-4B30-BF50-673726CBFD3D}"/>
+              </a:ext>
+            </a:extLst>
+          </p:cNvPr>
+          <p:cNvPicPr>
+            <a:picLocks noChangeAspect="1"/>
+          </p:cNvPicPr>
+          <p:nvPr/>
+        </p:nvPicPr>
+        <p:blipFill>
+          <a:blip r:embed="rId2"/>
+          <a:stretch>
+            <a:fillRect/>
+          </a:stretch>
+        </p:blipFill>
+        <p:spPr>
+          <a:xfrm>
+            <a:off x="838200" y="2405215"/>
+            <a:ext cx="4330065" cy="2878043"/>
+          </a:xfrm>
+          <a:prstGeom prst="rect">
+            <a:avLst/>
+          </a:prstGeom>
+        </p:spPr>
+      </p:pic>
+      <p:pic>
+        <p:nvPicPr>
+          <p:cNvPr id="12" name="Picture 11">
+            <a:extLst>
+              <a:ext uri="{FF2B5EF4-FFF2-40B4-BE49-F238E27FC236}">
+                <a16:creationId xmlns:a16="http://schemas.microsoft.com/office/drawing/2014/main" id="{E8A06A3A-36A4-4DEB-A3E4-1FEB80D0169B}"/>
+              </a:ext>
+            </a:extLst>
+          </p:cNvPr>
+          <p:cNvPicPr>
+            <a:picLocks noChangeAspect="1"/>
+          </p:cNvPicPr>
+          <p:nvPr/>
+        </p:nvPicPr>
+        <p:blipFill>
+          <a:blip r:embed="rId3"/>
+          <a:stretch>
+            <a:fillRect/>
+          </a:stretch>
+        </p:blipFill>
+        <p:spPr>
+          <a:xfrm>
+            <a:off x="5879820" y="1369563"/>
+            <a:ext cx="6053532" cy="4021577"/>
+          </a:xfrm>
+          <a:prstGeom prst="rect">
+            <a:avLst/>
+          </a:prstGeom>
+        </p:spPr>
+      </p:pic>
+      <p:sp>
+        <p:nvSpPr>
+          <p:cNvPr id="4" name="Slide Number Placeholder 3">
+            <a:extLst>
+              <a:ext uri="{FF2B5EF4-FFF2-40B4-BE49-F238E27FC236}">
+                <a16:creationId xmlns:a16="http://schemas.microsoft.com/office/drawing/2014/main" id="{E370ACF5-72B0-42AF-8A9C-F6AC839802A7}"/>
+              </a:ext>
+            </a:extLst>
+          </p:cNvPr>
+          <p:cNvSpPr>
+            <a:spLocks noGrp="1"/>
+          </p:cNvSpPr>
+          <p:nvPr>
+            <p:ph type="sldNum" sz="quarter" idx="12"/>
+          </p:nvPr>
+        </p:nvSpPr>
+        <p:spPr/>
+        <p:txBody>
+          <a:bodyPr/>
+          <a:lstStyle/>
+          <a:p>
+            <a:fld id="{2BB362F8-89DF-415A-B93E-F967FB14F09D}" type="slidenum">
+              <a:rPr lang="zh-CN" altLang="en-US" smtClean="0"/>
+              <a:t>20</a:t>
+            </a:fld>
+            <a:endParaRPr lang="zh-CN" altLang="en-US"/>
+          </a:p>
+        </p:txBody>
+      </p:sp>
+      <p:sp>
+        <p:nvSpPr>
+          <p:cNvPr id="29" name="Title 1">
+            <a:extLst>
+              <a:ext uri="{FF2B5EF4-FFF2-40B4-BE49-F238E27FC236}">
+                <a16:creationId xmlns:a16="http://schemas.microsoft.com/office/drawing/2014/main" id="{81BB6E71-ABE6-41C4-9E80-CBC810C23C68}"/>
+              </a:ext>
+            </a:extLst>
+          </p:cNvPr>
+          <p:cNvSpPr>
+            <a:spLocks noGrp="1"/>
+          </p:cNvSpPr>
+          <p:nvPr>
+            <p:ph type="title"/>
+          </p:nvPr>
+        </p:nvSpPr>
+        <p:spPr>
+          <a:xfrm>
+            <a:off x="838200" y="174763"/>
+            <a:ext cx="10515600" cy="1325563"/>
+          </a:xfrm>
+        </p:spPr>
+        <p:txBody>
+          <a:bodyPr/>
+          <a:lstStyle/>
+          <a:p>
+            <a:r>
+              <a:rPr lang="zh-CN" altLang="en-US" dirty="0">
+                <a:latin typeface="仿宋" panose="02010609060101010101" pitchFamily="49" charset="-122"/>
+                <a:ea typeface="仿宋" panose="02010609060101010101" pitchFamily="49" charset="-122"/>
+              </a:rPr>
+              <a:t>软件架构 </a:t>
+            </a:r>
+            <a:r>
+              <a:rPr lang="en-US" altLang="zh-CN" dirty="0">
+                <a:latin typeface="仿宋" panose="02010609060101010101" pitchFamily="49" charset="-122"/>
+                <a:ea typeface="仿宋" panose="02010609060101010101" pitchFamily="49" charset="-122"/>
+              </a:rPr>
+              <a:t>– </a:t>
+            </a:r>
+            <a:r>
+              <a:rPr lang="zh-CN" altLang="en-US" dirty="0">
+                <a:latin typeface="仿宋" panose="02010609060101010101" pitchFamily="49" charset="-122"/>
+                <a:ea typeface="仿宋" panose="02010609060101010101" pitchFamily="49" charset="-122"/>
+              </a:rPr>
+              <a:t>分类器</a:t>
+            </a:r>
+            <a:br>
+              <a:rPr lang="en-US" altLang="zh-CN" dirty="0">
+                <a:latin typeface="仿宋" panose="02010609060101010101" pitchFamily="49" charset="-122"/>
+                <a:ea typeface="仿宋" panose="02010609060101010101" pitchFamily="49" charset="-122"/>
+              </a:rPr>
+            </a:br>
+            <a:r>
+              <a:rPr lang="en-US" altLang="zh-CN" sz="3000" dirty="0">
+                <a:latin typeface="Times New Roman" panose="02020603050405020304" pitchFamily="18" charset="0"/>
+                <a:ea typeface="仿宋" panose="02010609060101010101" pitchFamily="49" charset="-122"/>
+                <a:cs typeface="Times New Roman" panose="02020603050405020304" pitchFamily="18" charset="0"/>
+              </a:rPr>
+              <a:t>Software Architecture – classifier</a:t>
+            </a:r>
+            <a:endParaRPr lang="zh-CN" altLang="en-US" sz="3000" dirty="0">
+              <a:latin typeface="Times New Roman" panose="02020603050405020304" pitchFamily="18" charset="0"/>
+              <a:ea typeface="仿宋" panose="02010609060101010101" pitchFamily="49" charset="-122"/>
+              <a:cs typeface="Times New Roman" panose="02020603050405020304" pitchFamily="18" charset="0"/>
+            </a:endParaRPr>
+          </a:p>
+        </p:txBody>
+      </p:sp>
+      <p:sp>
+        <p:nvSpPr>
+          <p:cNvPr id="30" name="TextBox 29">
+            <a:extLst>
+              <a:ext uri="{FF2B5EF4-FFF2-40B4-BE49-F238E27FC236}">
+                <a16:creationId xmlns:a16="http://schemas.microsoft.com/office/drawing/2014/main" id="{2D248397-0919-466A-8BAB-2AA82949F795}"/>
+              </a:ext>
+            </a:extLst>
+          </p:cNvPr>
+          <p:cNvSpPr txBox="1"/>
+          <p:nvPr/>
+        </p:nvSpPr>
+        <p:spPr>
+          <a:xfrm>
+            <a:off x="961779" y="6386527"/>
+            <a:ext cx="7453390" cy="400110"/>
+          </a:xfrm>
+          <a:prstGeom prst="rect">
+            <a:avLst/>
+          </a:prstGeom>
+          <a:noFill/>
+        </p:spPr>
+        <p:txBody>
+          <a:bodyPr wrap="square" rtlCol="0">
+            <a:spAutoFit/>
+          </a:bodyPr>
+          <a:lstStyle/>
+          <a:p>
+            <a:r>
+              <a:rPr lang="en-US" altLang="zh-CN" sz="1000" dirty="0"/>
+              <a:t>【5】Pattern Recognition and Machine Learning, Springer, Christopher M. Bishop</a:t>
+            </a:r>
+          </a:p>
+          <a:p>
+            <a:r>
+              <a:rPr lang="en-US" altLang="zh-CN" sz="1000" dirty="0"/>
+              <a:t>【10】Machine Learning (Lecture Notes), RWTH University Aachen, Bastian </a:t>
+            </a:r>
+            <a:r>
+              <a:rPr lang="en-US" altLang="zh-CN" sz="1000" dirty="0" err="1"/>
+              <a:t>Leibe</a:t>
+            </a:r>
+            <a:r>
+              <a:rPr lang="en-US" altLang="zh-CN" sz="1000" dirty="0"/>
+              <a:t>, </a:t>
+            </a:r>
+            <a:r>
+              <a:rPr lang="en-US" altLang="zh-CN" sz="1000" dirty="0" err="1"/>
+              <a:t>Bernt</a:t>
+            </a:r>
+            <a:r>
+              <a:rPr lang="en-US" altLang="zh-CN" sz="1000" dirty="0"/>
+              <a:t> Schiele</a:t>
+            </a:r>
+            <a:endParaRPr lang="zh-CN" altLang="en-US" sz="1000" dirty="0"/>
+          </a:p>
+        </p:txBody>
+      </p:sp>
+      <p:sp>
+        <p:nvSpPr>
+          <p:cNvPr id="34" name="TextBox 33">
+            <a:extLst>
+              <a:ext uri="{FF2B5EF4-FFF2-40B4-BE49-F238E27FC236}">
+                <a16:creationId xmlns:a16="http://schemas.microsoft.com/office/drawing/2014/main" id="{7A01C336-BA0B-4256-975D-4D14B22D9768}"/>
+              </a:ext>
+            </a:extLst>
+          </p:cNvPr>
+          <p:cNvSpPr txBox="1"/>
+          <p:nvPr/>
+        </p:nvSpPr>
+        <p:spPr>
+          <a:xfrm>
+            <a:off x="4503414" y="5270487"/>
+            <a:ext cx="2752812" cy="646331"/>
+          </a:xfrm>
+          <a:prstGeom prst="rect">
+            <a:avLst/>
+          </a:prstGeom>
+          <a:noFill/>
+        </p:spPr>
+        <p:txBody>
+          <a:bodyPr wrap="square" rtlCol="0">
+            <a:spAutoFit/>
+          </a:bodyPr>
+          <a:lstStyle/>
+          <a:p>
+            <a:pPr algn="ctr"/>
+            <a:r>
+              <a:rPr lang="en-US" altLang="zh-CN" b="1" dirty="0">
+                <a:latin typeface="Times New Roman" panose="02020603050405020304" pitchFamily="18" charset="0"/>
+                <a:cs typeface="Times New Roman" panose="02020603050405020304" pitchFamily="18" charset="0"/>
+              </a:rPr>
+              <a:t>Step 2</a:t>
+            </a:r>
+          </a:p>
+          <a:p>
+            <a:pPr algn="ctr"/>
+            <a:r>
+              <a:rPr lang="en-US" altLang="zh-CN" b="1" dirty="0">
+                <a:latin typeface="Times New Roman" panose="02020603050405020304" pitchFamily="18" charset="0"/>
+                <a:cs typeface="Times New Roman" panose="02020603050405020304" pitchFamily="18" charset="0"/>
+              </a:rPr>
+              <a:t>EM Algorithm</a:t>
+            </a:r>
+            <a:endParaRPr lang="zh-CN" altLang="en-US" b="1" dirty="0">
+              <a:latin typeface="Times New Roman" panose="02020603050405020304" pitchFamily="18" charset="0"/>
+              <a:cs typeface="Times New Roman" panose="02020603050405020304" pitchFamily="18" charset="0"/>
+            </a:endParaRPr>
+          </a:p>
+        </p:txBody>
+      </p:sp>
+      <p:sp>
+        <p:nvSpPr>
+          <p:cNvPr id="15" name="TextBox 14">
+            <a:extLst>
+              <a:ext uri="{FF2B5EF4-FFF2-40B4-BE49-F238E27FC236}">
+                <a16:creationId xmlns:a16="http://schemas.microsoft.com/office/drawing/2014/main" id="{FD2454AE-25E0-45CC-8547-20467D4DE4D7}"/>
+              </a:ext>
+            </a:extLst>
+          </p:cNvPr>
+          <p:cNvSpPr txBox="1"/>
+          <p:nvPr/>
+        </p:nvSpPr>
+        <p:spPr>
+          <a:xfrm>
+            <a:off x="126644" y="1395400"/>
+            <a:ext cx="3874770" cy="369332"/>
+          </a:xfrm>
+          <a:prstGeom prst="rect">
+            <a:avLst/>
+          </a:prstGeom>
+          <a:noFill/>
+        </p:spPr>
+        <p:txBody>
+          <a:bodyPr wrap="square" rtlCol="0">
+            <a:spAutoFit/>
+          </a:bodyPr>
+          <a:lstStyle/>
+          <a:p>
+            <a:pPr algn="ctr"/>
+            <a:r>
+              <a:rPr lang="en-US" altLang="zh-CN" b="1" dirty="0">
+                <a:latin typeface="Times New Roman" panose="02020603050405020304" pitchFamily="18" charset="0"/>
+                <a:cs typeface="Times New Roman" panose="02020603050405020304" pitchFamily="18" charset="0"/>
+              </a:rPr>
+              <a:t>Step 1: Initialization (</a:t>
+            </a:r>
+            <a:r>
+              <a:rPr lang="en-US" altLang="zh-CN" b="1" dirty="0" err="1">
+                <a:latin typeface="Times New Roman" panose="02020603050405020304" pitchFamily="18" charset="0"/>
+                <a:cs typeface="Times New Roman" panose="02020603050405020304" pitchFamily="18" charset="0"/>
+              </a:rPr>
+              <a:t>eg.</a:t>
+            </a:r>
+            <a:r>
+              <a:rPr lang="en-US" altLang="zh-CN" b="1" dirty="0">
+                <a:latin typeface="Times New Roman" panose="02020603050405020304" pitchFamily="18" charset="0"/>
+                <a:cs typeface="Times New Roman" panose="02020603050405020304" pitchFamily="18" charset="0"/>
+              </a:rPr>
+              <a:t> K-Means)</a:t>
+            </a:r>
+            <a:endParaRPr lang="zh-CN" altLang="en-US" b="1" dirty="0">
+              <a:latin typeface="Times New Roman" panose="02020603050405020304" pitchFamily="18" charset="0"/>
+              <a:cs typeface="Times New Roman" panose="02020603050405020304" pitchFamily="18" charset="0"/>
+            </a:endParaRPr>
+          </a:p>
+        </p:txBody>
+      </p:sp>
+      <p:sp>
+        <p:nvSpPr>
+          <p:cNvPr id="16" name="Rectangle 15">
+            <a:extLst>
+              <a:ext uri="{FF2B5EF4-FFF2-40B4-BE49-F238E27FC236}">
+                <a16:creationId xmlns:a16="http://schemas.microsoft.com/office/drawing/2014/main" id="{32AB3096-D32B-4FB0-A8C3-A836DA76F8B6}"/>
+              </a:ext>
+            </a:extLst>
+          </p:cNvPr>
+          <p:cNvSpPr/>
+          <p:nvPr/>
+        </p:nvSpPr>
+        <p:spPr>
+          <a:xfrm>
+            <a:off x="775335" y="2360565"/>
+            <a:ext cx="4481499" cy="1457124"/>
+          </a:xfrm>
+          <a:prstGeom prst="rect">
+            <a:avLst/>
+          </a:prstGeom>
+          <a:noFill/>
+          <a:ln w="38100">
+            <a:solidFill>
+              <a:srgbClr val="FF0000"/>
+            </a:solidFill>
+          </a:ln>
+        </p:spPr>
+        <p:style>
+          <a:lnRef idx="2">
+            <a:schemeClr val="accent2"/>
+          </a:lnRef>
+          <a:fillRef idx="1">
+            <a:schemeClr val="lt1"/>
+          </a:fillRef>
+          <a:effectRef idx="0">
+            <a:schemeClr val="accent2"/>
+          </a:effectRef>
+          <a:fontRef idx="minor">
+            <a:schemeClr val="dk1"/>
+          </a:fontRef>
+        </p:style>
+        <p:txBody>
+          <a:bodyPr rtlCol="0" anchor="ctr"/>
+          <a:lstStyle/>
+          <a:p>
+            <a:pPr algn="ctr"/>
+            <a:endParaRPr lang="zh-CN" altLang="en-US"/>
+          </a:p>
+        </p:txBody>
+      </p:sp>
+      <p:sp>
+        <p:nvSpPr>
+          <p:cNvPr id="2" name="Arrow: Right 1">
+            <a:extLst>
+              <a:ext uri="{FF2B5EF4-FFF2-40B4-BE49-F238E27FC236}">
+                <a16:creationId xmlns:a16="http://schemas.microsoft.com/office/drawing/2014/main" id="{B2C5E33F-33AE-48CE-A631-CE11E08DE353}"/>
+              </a:ext>
+            </a:extLst>
+          </p:cNvPr>
+          <p:cNvSpPr/>
+          <p:nvPr/>
+        </p:nvSpPr>
+        <p:spPr>
+          <a:xfrm rot="3813261">
+            <a:off x="2020576" y="1799424"/>
+            <a:ext cx="370827" cy="385758"/>
+          </a:xfrm>
+          <a:prstGeom prst="rightArrow">
+            <a:avLst/>
+          </a:prstGeom>
+        </p:spPr>
+        <p:style>
+          <a:lnRef idx="3">
+            <a:schemeClr val="lt1"/>
+          </a:lnRef>
+          <a:fillRef idx="1">
+            <a:schemeClr val="accent2"/>
+          </a:fillRef>
+          <a:effectRef idx="1">
+            <a:schemeClr val="accent2"/>
+          </a:effectRef>
+          <a:fontRef idx="minor">
+            <a:schemeClr val="lt1"/>
+          </a:fontRef>
+        </p:style>
+        <p:txBody>
+          <a:bodyPr rtlCol="0" anchor="ctr"/>
+          <a:lstStyle/>
+          <a:p>
+            <a:pPr algn="ctr"/>
+            <a:endParaRPr lang="zh-CN" altLang="en-US"/>
+          </a:p>
+        </p:txBody>
+      </p:sp>
+      <p:sp>
+        <p:nvSpPr>
+          <p:cNvPr id="18" name="Arrow: Right 17">
+            <a:extLst>
+              <a:ext uri="{FF2B5EF4-FFF2-40B4-BE49-F238E27FC236}">
+                <a16:creationId xmlns:a16="http://schemas.microsoft.com/office/drawing/2014/main" id="{C2EF0F99-2238-4F96-A35A-FE9869244236}"/>
+              </a:ext>
+            </a:extLst>
+          </p:cNvPr>
+          <p:cNvSpPr/>
+          <p:nvPr/>
+        </p:nvSpPr>
+        <p:spPr>
+          <a:xfrm rot="9611900">
+            <a:off x="5648698" y="4309537"/>
+            <a:ext cx="370827" cy="385758"/>
+          </a:xfrm>
+          <a:prstGeom prst="rightArrow">
+            <a:avLst/>
+          </a:prstGeom>
+        </p:spPr>
+        <p:style>
+          <a:lnRef idx="3">
+            <a:schemeClr val="lt1"/>
+          </a:lnRef>
+          <a:fillRef idx="1">
+            <a:schemeClr val="accent2"/>
+          </a:fillRef>
+          <a:effectRef idx="1">
+            <a:schemeClr val="accent2"/>
+          </a:effectRef>
+          <a:fontRef idx="minor">
+            <a:schemeClr val="lt1"/>
+          </a:fontRef>
+        </p:style>
+        <p:txBody>
+          <a:bodyPr rtlCol="0" anchor="ctr"/>
+          <a:lstStyle/>
+          <a:p>
+            <a:pPr algn="ctr"/>
+            <a:endParaRPr lang="zh-CN" altLang="en-US"/>
+          </a:p>
+        </p:txBody>
+      </p:sp>
+      <p:sp>
+        <p:nvSpPr>
+          <p:cNvPr id="19" name="Rectangle 18">
+            <a:extLst>
+              <a:ext uri="{FF2B5EF4-FFF2-40B4-BE49-F238E27FC236}">
+                <a16:creationId xmlns:a16="http://schemas.microsoft.com/office/drawing/2014/main" id="{445803B0-F4A4-4EF7-AAE0-26EE5E1353B8}"/>
+              </a:ext>
+            </a:extLst>
+          </p:cNvPr>
+          <p:cNvSpPr/>
+          <p:nvPr/>
+        </p:nvSpPr>
+        <p:spPr>
+          <a:xfrm>
+            <a:off x="775335" y="3829243"/>
+            <a:ext cx="4481499" cy="1454016"/>
+          </a:xfrm>
+          <a:prstGeom prst="rect">
+            <a:avLst/>
+          </a:prstGeom>
+          <a:noFill/>
+          <a:ln w="38100">
+            <a:solidFill>
+              <a:srgbClr val="FF0000"/>
+            </a:solidFill>
+          </a:ln>
+        </p:spPr>
+        <p:style>
+          <a:lnRef idx="2">
+            <a:schemeClr val="accent2"/>
+          </a:lnRef>
+          <a:fillRef idx="1">
+            <a:schemeClr val="lt1"/>
+          </a:fillRef>
+          <a:effectRef idx="0">
+            <a:schemeClr val="accent2"/>
+          </a:effectRef>
+          <a:fontRef idx="minor">
+            <a:schemeClr val="dk1"/>
+          </a:fontRef>
+        </p:style>
+        <p:txBody>
+          <a:bodyPr rtlCol="0" anchor="ctr"/>
+          <a:lstStyle/>
+          <a:p>
+            <a:pPr algn="ctr"/>
+            <a:endParaRPr lang="zh-CN" altLang="en-US"/>
+          </a:p>
+        </p:txBody>
+      </p:sp>
+    </p:spTree>
+    <p:extLst>
+      <p:ext uri="{BB962C8B-B14F-4D97-AF65-F5344CB8AC3E}">
+        <p14:creationId xmlns:p14="http://schemas.microsoft.com/office/powerpoint/2010/main" val="3570576025"/>
+      </p:ext>
+    </p:extLst>
+  </p:cSld>
+  <p:clrMapOvr>
+    <a:masterClrMapping/>
+  </p:clrMapOvr>
+</p:sld>
+</file>
+
+<file path=ppt/slides/slide21.xml><?xml version="1.0" encoding="utf-8"?>
+<p:sld xmlns:a="http://schemas.openxmlformats.org/drawingml/2006/main" xmlns:r="http://schemas.openxmlformats.org/officeDocument/2006/relationships" xmlns:p="http://schemas.openxmlformats.org/presentationml/2006/main">
+  <p:cSld>
+    <p:spTree>
+      <p:nvGrpSpPr>
+        <p:cNvPr id="1" name=""/>
+        <p:cNvGrpSpPr/>
+        <p:nvPr/>
+      </p:nvGrpSpPr>
+      <p:grpSpPr>
+        <a:xfrm>
+          <a:off x="0" y="0"/>
+          <a:ext cx="0" cy="0"/>
+          <a:chOff x="0" y="0"/>
+          <a:chExt cx="0" cy="0"/>
+        </a:xfrm>
+      </p:grpSpPr>
+      <p:sp>
+        <p:nvSpPr>
+          <p:cNvPr id="4" name="Slide Number Placeholder 3">
+            <a:extLst>
+              <a:ext uri="{FF2B5EF4-FFF2-40B4-BE49-F238E27FC236}">
+                <a16:creationId xmlns:a16="http://schemas.microsoft.com/office/drawing/2014/main" id="{E370ACF5-72B0-42AF-8A9C-F6AC839802A7}"/>
+              </a:ext>
+            </a:extLst>
+          </p:cNvPr>
+          <p:cNvSpPr>
+            <a:spLocks noGrp="1"/>
+          </p:cNvSpPr>
+          <p:nvPr>
+            <p:ph type="sldNum" sz="quarter" idx="12"/>
+          </p:nvPr>
+        </p:nvSpPr>
+        <p:spPr/>
+        <p:txBody>
+          <a:bodyPr/>
+          <a:lstStyle/>
+          <a:p>
+            <a:fld id="{2BB362F8-89DF-415A-B93E-F967FB14F09D}" type="slidenum">
+              <a:rPr lang="zh-CN" altLang="en-US" smtClean="0"/>
+              <a:t>21</a:t>
+            </a:fld>
+            <a:endParaRPr lang="zh-CN" altLang="en-US"/>
+          </a:p>
+        </p:txBody>
+      </p:sp>
+      <p:sp>
+        <p:nvSpPr>
+          <p:cNvPr id="5" name="Title 1">
+            <a:extLst>
+              <a:ext uri="{FF2B5EF4-FFF2-40B4-BE49-F238E27FC236}">
+                <a16:creationId xmlns:a16="http://schemas.microsoft.com/office/drawing/2014/main" id="{3BC196C9-E495-403A-9892-5A9C27D64E32}"/>
+              </a:ext>
+            </a:extLst>
+          </p:cNvPr>
+          <p:cNvSpPr>
+            <a:spLocks noGrp="1"/>
+          </p:cNvSpPr>
+          <p:nvPr>
+            <p:ph type="title"/>
+          </p:nvPr>
+        </p:nvSpPr>
+        <p:spPr>
+          <a:xfrm>
+            <a:off x="838200" y="174763"/>
+            <a:ext cx="10515600" cy="1325563"/>
+          </a:xfrm>
+        </p:spPr>
+        <p:txBody>
+          <a:bodyPr/>
+          <a:lstStyle/>
+          <a:p>
+            <a:r>
+              <a:rPr lang="zh-CN" altLang="en-US" dirty="0">
+                <a:latin typeface="仿宋" panose="02010609060101010101" pitchFamily="49" charset="-122"/>
+                <a:ea typeface="仿宋" panose="02010609060101010101" pitchFamily="49" charset="-122"/>
+              </a:rPr>
+              <a:t>软件架构 </a:t>
+            </a:r>
+            <a:r>
+              <a:rPr lang="en-US" altLang="zh-CN" dirty="0">
+                <a:latin typeface="仿宋" panose="02010609060101010101" pitchFamily="49" charset="-122"/>
+                <a:ea typeface="仿宋" panose="02010609060101010101" pitchFamily="49" charset="-122"/>
+              </a:rPr>
+              <a:t>– </a:t>
+            </a:r>
+            <a:r>
+              <a:rPr lang="zh-CN" altLang="en-US" dirty="0">
+                <a:latin typeface="仿宋" panose="02010609060101010101" pitchFamily="49" charset="-122"/>
+                <a:ea typeface="仿宋" panose="02010609060101010101" pitchFamily="49" charset="-122"/>
+              </a:rPr>
+              <a:t>分类器</a:t>
+            </a:r>
+            <a:br>
+              <a:rPr lang="en-US" altLang="zh-CN" dirty="0">
+                <a:latin typeface="仿宋" panose="02010609060101010101" pitchFamily="49" charset="-122"/>
+                <a:ea typeface="仿宋" panose="02010609060101010101" pitchFamily="49" charset="-122"/>
+              </a:rPr>
+            </a:br>
+            <a:r>
+              <a:rPr lang="en-US" altLang="zh-CN" sz="3000" dirty="0">
+                <a:latin typeface="Times New Roman" panose="02020603050405020304" pitchFamily="18" charset="0"/>
+                <a:ea typeface="仿宋" panose="02010609060101010101" pitchFamily="49" charset="-122"/>
+                <a:cs typeface="Times New Roman" panose="02020603050405020304" pitchFamily="18" charset="0"/>
+              </a:rPr>
+              <a:t>Software Architecture – classifier</a:t>
+            </a:r>
+            <a:endParaRPr lang="zh-CN" altLang="en-US" sz="3000" dirty="0">
+              <a:latin typeface="Times New Roman" panose="02020603050405020304" pitchFamily="18" charset="0"/>
+              <a:ea typeface="仿宋" panose="02010609060101010101" pitchFamily="49" charset="-122"/>
+              <a:cs typeface="Times New Roman" panose="02020603050405020304" pitchFamily="18" charset="0"/>
+            </a:endParaRPr>
+          </a:p>
+        </p:txBody>
+      </p:sp>
+      <p:sp>
+        <p:nvSpPr>
+          <p:cNvPr id="6" name="TextBox 5">
+            <a:extLst>
+              <a:ext uri="{FF2B5EF4-FFF2-40B4-BE49-F238E27FC236}">
+                <a16:creationId xmlns:a16="http://schemas.microsoft.com/office/drawing/2014/main" id="{225C03FB-FF0C-467C-BDD9-2C2CFFC22E52}"/>
+              </a:ext>
+            </a:extLst>
+          </p:cNvPr>
+          <p:cNvSpPr txBox="1"/>
+          <p:nvPr/>
+        </p:nvSpPr>
+        <p:spPr>
+          <a:xfrm>
+            <a:off x="696097" y="1255621"/>
+            <a:ext cx="10962503" cy="1015663"/>
+          </a:xfrm>
+          <a:prstGeom prst="rect">
+            <a:avLst/>
+          </a:prstGeom>
+          <a:noFill/>
+        </p:spPr>
+        <p:txBody>
+          <a:bodyPr wrap="square" rtlCol="0">
+            <a:spAutoFit/>
+          </a:bodyPr>
+          <a:lstStyle/>
+          <a:p>
+            <a:pPr marL="342900" indent="-342900">
+              <a:buFont typeface="Arial" panose="020B0604020202020204" pitchFamily="34" charset="0"/>
+              <a:buChar char="•"/>
+            </a:pPr>
+            <a:r>
+              <a:rPr lang="zh-CN" altLang="en-US" sz="2000" dirty="0">
+                <a:latin typeface="仿宋" panose="02010609060101010101" pitchFamily="49" charset="-122"/>
+                <a:ea typeface="仿宋" panose="02010609060101010101" pitchFamily="49" charset="-122"/>
+              </a:rPr>
+              <a:t>极大似然估计</a:t>
+            </a:r>
+            <a:r>
+              <a:rPr lang="en-US" altLang="zh-CN" sz="2000" dirty="0">
+                <a:latin typeface="仿宋" panose="02010609060101010101" pitchFamily="49" charset="-122"/>
+                <a:ea typeface="仿宋" panose="02010609060101010101" pitchFamily="49" charset="-122"/>
+              </a:rPr>
+              <a:t>ML(Maximum Likelihood Estimation)【5】【9】【10】【11】:</a:t>
+            </a:r>
+            <a:r>
+              <a:rPr lang="zh-CN" altLang="en-US" sz="2000" dirty="0">
+                <a:latin typeface="仿宋" panose="02010609060101010101" pitchFamily="49" charset="-122"/>
+                <a:ea typeface="仿宋" panose="02010609060101010101" pitchFamily="49" charset="-122"/>
+              </a:rPr>
+              <a:t>对</a:t>
+            </a:r>
+            <a:r>
+              <a:rPr lang="en-US" altLang="zh-CN" sz="2000" dirty="0">
+                <a:latin typeface="仿宋" panose="02010609060101010101" pitchFamily="49" charset="-122"/>
+                <a:ea typeface="仿宋" panose="02010609060101010101" pitchFamily="49" charset="-122"/>
+              </a:rPr>
+              <a:t>3</a:t>
+            </a:r>
+            <a:r>
+              <a:rPr lang="zh-CN" altLang="en-US" sz="2000" dirty="0">
+                <a:latin typeface="仿宋" panose="02010609060101010101" pitchFamily="49" charset="-122"/>
+                <a:ea typeface="仿宋" panose="02010609060101010101" pitchFamily="49" charset="-122"/>
+              </a:rPr>
+              <a:t>种声学事件（枪声</a:t>
+            </a:r>
+            <a:r>
+              <a:rPr lang="en-US" altLang="zh-CN" sz="2000" dirty="0">
+                <a:latin typeface="仿宋" panose="02010609060101010101" pitchFamily="49" charset="-122"/>
+                <a:ea typeface="仿宋" panose="02010609060101010101" pitchFamily="49" charset="-122"/>
+              </a:rPr>
+              <a:t>/</a:t>
+            </a:r>
+            <a:r>
+              <a:rPr lang="zh-CN" altLang="en-US" sz="2000" dirty="0">
+                <a:latin typeface="仿宋" panose="02010609060101010101" pitchFamily="49" charset="-122"/>
+                <a:ea typeface="仿宋" panose="02010609060101010101" pitchFamily="49" charset="-122"/>
+              </a:rPr>
+              <a:t>爆炸</a:t>
+            </a:r>
+            <a:r>
+              <a:rPr lang="en-US" altLang="zh-CN" sz="2000" dirty="0">
+                <a:latin typeface="仿宋" panose="02010609060101010101" pitchFamily="49" charset="-122"/>
+                <a:ea typeface="仿宋" panose="02010609060101010101" pitchFamily="49" charset="-122"/>
+              </a:rPr>
+              <a:t>/</a:t>
+            </a:r>
+            <a:r>
+              <a:rPr lang="zh-CN" altLang="en-US" sz="2000" dirty="0">
+                <a:latin typeface="仿宋" panose="02010609060101010101" pitchFamily="49" charset="-122"/>
+                <a:ea typeface="仿宋" panose="02010609060101010101" pitchFamily="49" charset="-122"/>
+              </a:rPr>
+              <a:t>汽车喇叭）分别训练</a:t>
+            </a:r>
+            <a:r>
+              <a:rPr lang="en-US" altLang="zh-CN" sz="2000" dirty="0">
+                <a:latin typeface="仿宋" panose="02010609060101010101" pitchFamily="49" charset="-122"/>
+                <a:ea typeface="仿宋" panose="02010609060101010101" pitchFamily="49" charset="-122"/>
+              </a:rPr>
+              <a:t>GMM</a:t>
+            </a:r>
+            <a:r>
+              <a:rPr lang="zh-CN" altLang="en-US" sz="2000" dirty="0">
+                <a:latin typeface="仿宋" panose="02010609060101010101" pitchFamily="49" charset="-122"/>
+                <a:ea typeface="仿宋" panose="02010609060101010101" pitchFamily="49" charset="-122"/>
+              </a:rPr>
+              <a:t>，得到三个</a:t>
+            </a:r>
+            <a:r>
+              <a:rPr lang="en-US" altLang="zh-CN" sz="2000" dirty="0">
+                <a:latin typeface="仿宋" panose="02010609060101010101" pitchFamily="49" charset="-122"/>
+                <a:ea typeface="仿宋" panose="02010609060101010101" pitchFamily="49" charset="-122"/>
+              </a:rPr>
+              <a:t>GMM</a:t>
+            </a:r>
+            <a:r>
+              <a:rPr lang="zh-CN" altLang="en-US" sz="2000" dirty="0">
+                <a:latin typeface="仿宋" panose="02010609060101010101" pitchFamily="49" charset="-122"/>
+                <a:ea typeface="仿宋" panose="02010609060101010101" pitchFamily="49" charset="-122"/>
+              </a:rPr>
+              <a:t>模型。将待检测结果的</a:t>
+            </a:r>
+            <a:r>
+              <a:rPr lang="en-US" altLang="zh-CN" sz="2000" dirty="0">
+                <a:latin typeface="仿宋" panose="02010609060101010101" pitchFamily="49" charset="-122"/>
+                <a:ea typeface="仿宋" panose="02010609060101010101" pitchFamily="49" charset="-122"/>
+              </a:rPr>
+              <a:t>MFCC</a:t>
+            </a:r>
+            <a:r>
+              <a:rPr lang="zh-CN" altLang="en-US" sz="2000" dirty="0">
+                <a:latin typeface="仿宋" panose="02010609060101010101" pitchFamily="49" charset="-122"/>
+                <a:ea typeface="仿宋" panose="02010609060101010101" pitchFamily="49" charset="-122"/>
+              </a:rPr>
+              <a:t>特征</a:t>
+            </a:r>
+            <a:r>
+              <a:rPr lang="en-US" altLang="zh-CN" sz="2000" b="1" dirty="0">
+                <a:latin typeface="仿宋" panose="02010609060101010101" pitchFamily="49" charset="-122"/>
+                <a:ea typeface="仿宋" panose="02010609060101010101" pitchFamily="49" charset="-122"/>
+              </a:rPr>
+              <a:t>x</a:t>
+            </a:r>
+            <a:r>
+              <a:rPr lang="zh-CN" altLang="en-US" sz="2000" dirty="0">
+                <a:latin typeface="仿宋" panose="02010609060101010101" pitchFamily="49" charset="-122"/>
+                <a:ea typeface="仿宋" panose="02010609060101010101" pitchFamily="49" charset="-122"/>
+              </a:rPr>
+              <a:t>分别输入</a:t>
+            </a:r>
+            <a:r>
+              <a:rPr lang="en-US" altLang="zh-CN" sz="2000" dirty="0">
+                <a:latin typeface="仿宋" panose="02010609060101010101" pitchFamily="49" charset="-122"/>
+                <a:ea typeface="仿宋" panose="02010609060101010101" pitchFamily="49" charset="-122"/>
+              </a:rPr>
+              <a:t>3</a:t>
+            </a:r>
+            <a:r>
+              <a:rPr lang="zh-CN" altLang="en-US" sz="2000" dirty="0">
+                <a:latin typeface="仿宋" panose="02010609060101010101" pitchFamily="49" charset="-122"/>
+                <a:ea typeface="仿宋" panose="02010609060101010101" pitchFamily="49" charset="-122"/>
+              </a:rPr>
+              <a:t>个</a:t>
+            </a:r>
+            <a:r>
+              <a:rPr lang="en-US" altLang="zh-CN" sz="2000" dirty="0">
+                <a:latin typeface="仿宋" panose="02010609060101010101" pitchFamily="49" charset="-122"/>
+                <a:ea typeface="仿宋" panose="02010609060101010101" pitchFamily="49" charset="-122"/>
+              </a:rPr>
+              <a:t>GMM</a:t>
+            </a:r>
+            <a:r>
+              <a:rPr lang="zh-CN" altLang="en-US" sz="2000" dirty="0">
+                <a:latin typeface="仿宋" panose="02010609060101010101" pitchFamily="49" charset="-122"/>
+                <a:ea typeface="仿宋" panose="02010609060101010101" pitchFamily="49" charset="-122"/>
+              </a:rPr>
+              <a:t>，得到</a:t>
+            </a:r>
+            <a:r>
+              <a:rPr lang="en-US" altLang="zh-CN" sz="2000" dirty="0">
+                <a:latin typeface="仿宋" panose="02010609060101010101" pitchFamily="49" charset="-122"/>
+                <a:ea typeface="仿宋" panose="02010609060101010101" pitchFamily="49" charset="-122"/>
+              </a:rPr>
+              <a:t>3</a:t>
+            </a:r>
+            <a:r>
+              <a:rPr lang="zh-CN" altLang="en-US" sz="2000" dirty="0">
+                <a:latin typeface="仿宋" panose="02010609060101010101" pitchFamily="49" charset="-122"/>
+                <a:ea typeface="仿宋" panose="02010609060101010101" pitchFamily="49" charset="-122"/>
+              </a:rPr>
+              <a:t>个概率密度，概率密度最大者即认为是该类别</a:t>
+            </a:r>
+            <a:endParaRPr lang="en-US" altLang="zh-CN" sz="2000" dirty="0">
+              <a:latin typeface="仿宋" panose="02010609060101010101" pitchFamily="49" charset="-122"/>
+              <a:ea typeface="仿宋" panose="02010609060101010101" pitchFamily="49" charset="-122"/>
+            </a:endParaRPr>
+          </a:p>
+        </p:txBody>
+      </p:sp>
+      <p:sp>
+        <p:nvSpPr>
+          <p:cNvPr id="15" name="TextBox 14">
+            <a:extLst>
+              <a:ext uri="{FF2B5EF4-FFF2-40B4-BE49-F238E27FC236}">
+                <a16:creationId xmlns:a16="http://schemas.microsoft.com/office/drawing/2014/main" id="{0049405E-4AAF-4A98-B9AE-3CCC0C9BB80B}"/>
+              </a:ext>
+            </a:extLst>
+          </p:cNvPr>
+          <p:cNvSpPr txBox="1"/>
+          <p:nvPr/>
+        </p:nvSpPr>
+        <p:spPr>
+          <a:xfrm>
+            <a:off x="967740" y="6108158"/>
+            <a:ext cx="7453390" cy="707886"/>
+          </a:xfrm>
+          <a:prstGeom prst="rect">
+            <a:avLst/>
+          </a:prstGeom>
+          <a:noFill/>
+        </p:spPr>
+        <p:txBody>
+          <a:bodyPr wrap="square" rtlCol="0">
+            <a:spAutoFit/>
+          </a:bodyPr>
+          <a:lstStyle/>
+          <a:p>
+            <a:r>
+              <a:rPr lang="en-US" altLang="zh-CN" sz="1000" dirty="0"/>
+              <a:t>【5】Pattern Recognition and Machine Learning, Springer, Christopher M. Bishop</a:t>
+            </a:r>
+          </a:p>
+          <a:p>
+            <a:r>
+              <a:rPr lang="en-US" altLang="zh-CN" sz="1000" dirty="0"/>
+              <a:t>【9】</a:t>
+            </a:r>
+            <a:r>
+              <a:rPr lang="zh-CN" altLang="en-US" sz="1000" dirty="0"/>
+              <a:t>公共场所下的枪声检测研究，硕士学位论文，朱强强</a:t>
+            </a:r>
+            <a:endParaRPr lang="en-US" altLang="zh-CN" sz="1000" dirty="0"/>
+          </a:p>
+          <a:p>
+            <a:r>
+              <a:rPr lang="en-US" altLang="zh-CN" sz="1000" dirty="0"/>
+              <a:t>【10】Machine Learning (Lecture Notes), RWTH University Aachen, Bastian </a:t>
+            </a:r>
+            <a:r>
+              <a:rPr lang="en-US" altLang="zh-CN" sz="1000" dirty="0" err="1"/>
+              <a:t>Leibe</a:t>
+            </a:r>
+            <a:r>
+              <a:rPr lang="en-US" altLang="zh-CN" sz="1000" dirty="0"/>
+              <a:t>, </a:t>
+            </a:r>
+            <a:r>
+              <a:rPr lang="en-US" altLang="zh-CN" sz="1000" dirty="0" err="1"/>
+              <a:t>Bernt</a:t>
+            </a:r>
+            <a:r>
+              <a:rPr lang="en-US" altLang="zh-CN" sz="1000" dirty="0"/>
+              <a:t> Schiele</a:t>
+            </a:r>
+          </a:p>
+          <a:p>
+            <a:r>
+              <a:rPr lang="en-US" altLang="zh-CN" sz="1000" dirty="0"/>
+              <a:t>【11】</a:t>
+            </a:r>
+            <a:r>
+              <a:rPr lang="zh-CN" altLang="en-US" sz="1000" dirty="0"/>
+              <a:t>统计信号处理讲义，东南大学，蒋忠进，孟桥等</a:t>
+            </a:r>
+          </a:p>
+        </p:txBody>
+      </p:sp>
+      <p:pic>
+        <p:nvPicPr>
+          <p:cNvPr id="2" name="Picture 1">
+            <a:extLst>
+              <a:ext uri="{FF2B5EF4-FFF2-40B4-BE49-F238E27FC236}">
+                <a16:creationId xmlns:a16="http://schemas.microsoft.com/office/drawing/2014/main" id="{6F4092A3-E1F6-4CCC-9D2B-AC52CF814E1A}"/>
+              </a:ext>
+            </a:extLst>
+          </p:cNvPr>
+          <p:cNvPicPr>
+            <a:picLocks noChangeAspect="1"/>
+          </p:cNvPicPr>
+          <p:nvPr/>
+        </p:nvPicPr>
+        <p:blipFill>
+          <a:blip r:embed="rId3"/>
+          <a:stretch>
+            <a:fillRect/>
+          </a:stretch>
+        </p:blipFill>
+        <p:spPr>
+          <a:xfrm>
+            <a:off x="3242310" y="2503446"/>
+            <a:ext cx="5093251" cy="2895760"/>
+          </a:xfrm>
+          <a:prstGeom prst="rect">
+            <a:avLst/>
+          </a:prstGeom>
+        </p:spPr>
+      </p:pic>
+    </p:spTree>
+    <p:extLst>
+      <p:ext uri="{BB962C8B-B14F-4D97-AF65-F5344CB8AC3E}">
+        <p14:creationId xmlns:p14="http://schemas.microsoft.com/office/powerpoint/2010/main" val="317372915"/>
+      </p:ext>
+    </p:extLst>
+  </p:cSld>
+  <p:clrMapOvr>
+    <a:masterClrMapping/>
+  </p:clrMapOvr>
+</p:sld>
+</file>
+
+<file path=ppt/slides/slide22.xml><?xml version="1.0" encoding="utf-8"?>
+<p:sld xmlns:a="http://schemas.openxmlformats.org/drawingml/2006/main" xmlns:r="http://schemas.openxmlformats.org/officeDocument/2006/relationships" xmlns:p="http://schemas.openxmlformats.org/presentationml/2006/main">
+  <p:cSld>
+    <p:spTree>
+      <p:nvGrpSpPr>
+        <p:cNvPr id="1" name=""/>
+        <p:cNvGrpSpPr/>
+        <p:nvPr/>
+      </p:nvGrpSpPr>
+      <p:grpSpPr>
+        <a:xfrm>
+          <a:off x="0" y="0"/>
+          <a:ext cx="0" cy="0"/>
+          <a:chOff x="0" y="0"/>
+          <a:chExt cx="0" cy="0"/>
+        </a:xfrm>
+      </p:grpSpPr>
+      <p:sp>
+        <p:nvSpPr>
+          <p:cNvPr id="2" name="Title 1">
+            <a:extLst>
+              <a:ext uri="{FF2B5EF4-FFF2-40B4-BE49-F238E27FC236}">
+                <a16:creationId xmlns:a16="http://schemas.microsoft.com/office/drawing/2014/main" id="{DB5099AA-A2DD-4D9B-8FB0-D71892061BD0}"/>
+              </a:ext>
+            </a:extLst>
+          </p:cNvPr>
+          <p:cNvSpPr>
+            <a:spLocks noGrp="1"/>
+          </p:cNvSpPr>
+          <p:nvPr>
+            <p:ph type="title"/>
+          </p:nvPr>
+        </p:nvSpPr>
+        <p:spPr>
+          <a:xfrm>
+            <a:off x="838200" y="174763"/>
+            <a:ext cx="10515600" cy="1325563"/>
+          </a:xfrm>
+        </p:spPr>
+        <p:txBody>
+          <a:bodyPr/>
+          <a:lstStyle/>
+          <a:p>
+            <a:r>
+              <a:rPr lang="zh-CN" altLang="en-US" dirty="0">
+                <a:latin typeface="仿宋" panose="02010609060101010101" pitchFamily="49" charset="-122"/>
+                <a:ea typeface="仿宋" panose="02010609060101010101" pitchFamily="49" charset="-122"/>
+              </a:rPr>
+              <a:t>软件架构 </a:t>
+            </a:r>
+            <a:br>
+              <a:rPr lang="en-US" altLang="zh-CN" dirty="0">
+                <a:latin typeface="仿宋" panose="02010609060101010101" pitchFamily="49" charset="-122"/>
+                <a:ea typeface="仿宋" panose="02010609060101010101" pitchFamily="49" charset="-122"/>
+              </a:rPr>
+            </a:br>
+            <a:r>
+              <a:rPr lang="en-US" altLang="zh-CN" sz="3000" dirty="0">
+                <a:latin typeface="Times New Roman" panose="02020603050405020304" pitchFamily="18" charset="0"/>
+                <a:ea typeface="仿宋" panose="02010609060101010101" pitchFamily="49" charset="-122"/>
+                <a:cs typeface="Times New Roman" panose="02020603050405020304" pitchFamily="18" charset="0"/>
+              </a:rPr>
+              <a:t>Software Architecture</a:t>
+            </a:r>
+            <a:endParaRPr lang="zh-CN" altLang="en-US" sz="3000" dirty="0">
+              <a:latin typeface="Times New Roman" panose="02020603050405020304" pitchFamily="18" charset="0"/>
+              <a:ea typeface="仿宋" panose="02010609060101010101" pitchFamily="49" charset="-122"/>
+              <a:cs typeface="Times New Roman" panose="02020603050405020304" pitchFamily="18" charset="0"/>
+            </a:endParaRPr>
+          </a:p>
+        </p:txBody>
+      </p:sp>
+      <p:sp>
+        <p:nvSpPr>
+          <p:cNvPr id="7" name="Slide Number Placeholder 6">
+            <a:extLst>
+              <a:ext uri="{FF2B5EF4-FFF2-40B4-BE49-F238E27FC236}">
+                <a16:creationId xmlns:a16="http://schemas.microsoft.com/office/drawing/2014/main" id="{B23500B9-0BFF-409A-B734-F888FED31124}"/>
+              </a:ext>
+            </a:extLst>
+          </p:cNvPr>
+          <p:cNvSpPr>
+            <a:spLocks noGrp="1"/>
+          </p:cNvSpPr>
+          <p:nvPr>
+            <p:ph type="sldNum" sz="quarter" idx="12"/>
+          </p:nvPr>
+        </p:nvSpPr>
+        <p:spPr/>
+        <p:txBody>
+          <a:bodyPr/>
+          <a:lstStyle/>
+          <a:p>
+            <a:fld id="{2BB362F8-89DF-415A-B93E-F967FB14F09D}" type="slidenum">
+              <a:rPr lang="zh-CN" altLang="en-US" smtClean="0"/>
+              <a:t>22</a:t>
+            </a:fld>
+            <a:endParaRPr lang="zh-CN" altLang="en-US"/>
+          </a:p>
+        </p:txBody>
+      </p:sp>
+      <p:sp>
+        <p:nvSpPr>
+          <p:cNvPr id="4" name="Flowchart: Terminator 3">
+            <a:extLst>
+              <a:ext uri="{FF2B5EF4-FFF2-40B4-BE49-F238E27FC236}">
+                <a16:creationId xmlns:a16="http://schemas.microsoft.com/office/drawing/2014/main" id="{7603AA80-4C74-42AC-B4B4-4D7A5909CDA8}"/>
+              </a:ext>
+            </a:extLst>
+          </p:cNvPr>
+          <p:cNvSpPr/>
+          <p:nvPr/>
+        </p:nvSpPr>
+        <p:spPr>
+          <a:xfrm>
+            <a:off x="2545109" y="1385254"/>
+            <a:ext cx="2639590" cy="523783"/>
+          </a:xfrm>
+          <a:prstGeom prst="flowChartTerminator">
+            <a:avLst/>
+          </a:prstGeom>
+        </p:spPr>
+        <p:style>
+          <a:lnRef idx="3">
+            <a:schemeClr val="lt1"/>
+          </a:lnRef>
+          <a:fillRef idx="1">
+            <a:schemeClr val="accent1"/>
+          </a:fillRef>
+          <a:effectRef idx="1">
+            <a:schemeClr val="accent1"/>
+          </a:effectRef>
+          <a:fontRef idx="minor">
+            <a:schemeClr val="lt1"/>
+          </a:fontRef>
+        </p:style>
+        <p:txBody>
+          <a:bodyPr rtlCol="0" anchor="ctr"/>
+          <a:lstStyle/>
+          <a:p>
+            <a:pPr algn="ctr"/>
+            <a:r>
+              <a:rPr lang="en-US" altLang="zh-CN" b="1" dirty="0"/>
+              <a:t>Microphone</a:t>
+            </a:r>
+            <a:r>
+              <a:rPr lang="zh-CN" altLang="en-US" b="1" dirty="0"/>
+              <a:t>实时输出</a:t>
+            </a:r>
+          </a:p>
+        </p:txBody>
+      </p:sp>
+      <p:sp>
+        <p:nvSpPr>
+          <p:cNvPr id="6" name="Content Placeholder 2">
+            <a:extLst>
+              <a:ext uri="{FF2B5EF4-FFF2-40B4-BE49-F238E27FC236}">
+                <a16:creationId xmlns:a16="http://schemas.microsoft.com/office/drawing/2014/main" id="{9BAEC24E-E4C8-448A-BB10-8373CA9D9500}"/>
+              </a:ext>
+            </a:extLst>
+          </p:cNvPr>
+          <p:cNvSpPr>
+            <a:spLocks noGrp="1"/>
+          </p:cNvSpPr>
+          <p:nvPr>
+            <p:ph idx="1"/>
+          </p:nvPr>
+        </p:nvSpPr>
+        <p:spPr>
+          <a:xfrm>
+            <a:off x="775335" y="7191498"/>
+            <a:ext cx="11052698" cy="2052000"/>
+          </a:xfrm>
+        </p:spPr>
+        <p:txBody>
+          <a:bodyPr/>
+          <a:lstStyle/>
+          <a:p>
+            <a:r>
+              <a:rPr lang="en-US" altLang="zh-CN" dirty="0"/>
+              <a:t>Microphone</a:t>
+            </a:r>
+            <a:r>
+              <a:rPr lang="zh-CN" altLang="en-US" dirty="0"/>
+              <a:t>实时输出</a:t>
+            </a:r>
+            <a:r>
+              <a:rPr lang="en-US" altLang="zh-CN" dirty="0"/>
+              <a:t> -》 </a:t>
+            </a:r>
+            <a:r>
+              <a:rPr lang="zh-CN" altLang="en-US" dirty="0"/>
+              <a:t>去噪 </a:t>
+            </a:r>
+            <a:r>
+              <a:rPr lang="en-US" altLang="zh-CN" dirty="0"/>
+              <a:t>-》</a:t>
+            </a:r>
+            <a:r>
+              <a:rPr lang="zh-CN" altLang="en-US" dirty="0"/>
+              <a:t>端点检测 </a:t>
+            </a:r>
+            <a:r>
+              <a:rPr lang="en-US" altLang="zh-CN" dirty="0"/>
+              <a:t>-》</a:t>
+            </a:r>
+            <a:r>
+              <a:rPr lang="zh-CN" altLang="en-US" dirty="0"/>
+              <a:t>分类器 </a:t>
+            </a:r>
+            <a:r>
+              <a:rPr lang="en-US" altLang="zh-CN" dirty="0"/>
+              <a:t>-》</a:t>
+            </a:r>
+            <a:r>
+              <a:rPr lang="zh-CN" altLang="en-US" dirty="0"/>
+              <a:t>检测结果</a:t>
+            </a:r>
+            <a:endParaRPr lang="en-US" altLang="zh-CN" dirty="0"/>
+          </a:p>
+          <a:p>
+            <a:r>
+              <a:rPr lang="en-US" altLang="zh-CN" dirty="0"/>
+              <a:t>                                 </a:t>
+            </a:r>
+            <a:r>
+              <a:rPr lang="zh-CN" altLang="en-US" dirty="0"/>
+              <a:t>现场环境声信号</a:t>
+            </a:r>
+            <a:endParaRPr lang="en-US" altLang="zh-CN" dirty="0"/>
+          </a:p>
+          <a:p>
+            <a:r>
+              <a:rPr lang="en-US" altLang="zh-CN" dirty="0"/>
+              <a:t>                                              </a:t>
+            </a:r>
+            <a:r>
+              <a:rPr lang="zh-CN" altLang="en-US" dirty="0"/>
+              <a:t>滤波器输出</a:t>
+            </a:r>
+            <a:endParaRPr lang="en-US" altLang="zh-CN" dirty="0"/>
+          </a:p>
+          <a:p>
+            <a:r>
+              <a:rPr lang="en-US" altLang="zh-CN" dirty="0"/>
+              <a:t>                                                               </a:t>
+            </a:r>
+            <a:r>
+              <a:rPr lang="zh-CN" altLang="en-US" dirty="0"/>
+              <a:t>疑似信号片段</a:t>
+            </a:r>
+          </a:p>
+        </p:txBody>
+      </p:sp>
+      <p:sp>
+        <p:nvSpPr>
+          <p:cNvPr id="5" name="Flowchart: Alternate Process 4">
+            <a:extLst>
+              <a:ext uri="{FF2B5EF4-FFF2-40B4-BE49-F238E27FC236}">
+                <a16:creationId xmlns:a16="http://schemas.microsoft.com/office/drawing/2014/main" id="{174A43D7-8F29-4BC4-ABE5-7375AFA801C9}"/>
+              </a:ext>
+            </a:extLst>
+          </p:cNvPr>
+          <p:cNvSpPr/>
+          <p:nvPr/>
+        </p:nvSpPr>
+        <p:spPr>
+          <a:xfrm>
+            <a:off x="3205006" y="2327361"/>
+            <a:ext cx="1319795" cy="523784"/>
+          </a:xfrm>
+          <a:prstGeom prst="flowChartAlternateProcess">
+            <a:avLst/>
+          </a:prstGeom>
+        </p:spPr>
+        <p:style>
+          <a:lnRef idx="3">
+            <a:schemeClr val="lt1"/>
+          </a:lnRef>
+          <a:fillRef idx="1">
+            <a:schemeClr val="accent6"/>
+          </a:fillRef>
+          <a:effectRef idx="1">
+            <a:schemeClr val="accent6"/>
+          </a:effectRef>
+          <a:fontRef idx="minor">
+            <a:schemeClr val="lt1"/>
+          </a:fontRef>
+        </p:style>
+        <p:txBody>
+          <a:bodyPr rtlCol="0" anchor="ctr"/>
+          <a:lstStyle/>
+          <a:p>
+            <a:pPr algn="ctr"/>
+            <a:r>
+              <a:rPr lang="zh-CN" altLang="en-US" b="1" dirty="0"/>
+              <a:t>滤波降噪</a:t>
+            </a:r>
+          </a:p>
+        </p:txBody>
+      </p:sp>
+      <p:sp>
+        <p:nvSpPr>
+          <p:cNvPr id="9" name="Flowchart: Alternate Process 8">
+            <a:extLst>
+              <a:ext uri="{FF2B5EF4-FFF2-40B4-BE49-F238E27FC236}">
+                <a16:creationId xmlns:a16="http://schemas.microsoft.com/office/drawing/2014/main" id="{65383301-D464-4CC1-A9B1-2FF716C1B88A}"/>
+              </a:ext>
+            </a:extLst>
+          </p:cNvPr>
+          <p:cNvSpPr/>
+          <p:nvPr/>
+        </p:nvSpPr>
+        <p:spPr>
+          <a:xfrm>
+            <a:off x="3301171" y="5111106"/>
+            <a:ext cx="1127463" cy="515784"/>
+          </a:xfrm>
+          <a:prstGeom prst="flowChartAlternateProcess">
+            <a:avLst/>
+          </a:prstGeom>
+        </p:spPr>
+        <p:style>
+          <a:lnRef idx="3">
+            <a:schemeClr val="lt1"/>
+          </a:lnRef>
+          <a:fillRef idx="1">
+            <a:schemeClr val="accent6"/>
+          </a:fillRef>
+          <a:effectRef idx="1">
+            <a:schemeClr val="accent6"/>
+          </a:effectRef>
+          <a:fontRef idx="minor">
+            <a:schemeClr val="lt1"/>
+          </a:fontRef>
+        </p:style>
+        <p:txBody>
+          <a:bodyPr rtlCol="0" anchor="ctr"/>
+          <a:lstStyle/>
+          <a:p>
+            <a:pPr algn="ctr"/>
+            <a:r>
+              <a:rPr lang="zh-CN" altLang="en-US" b="1" dirty="0"/>
+              <a:t>分类器</a:t>
+            </a:r>
+          </a:p>
+        </p:txBody>
+      </p:sp>
+      <p:sp>
+        <p:nvSpPr>
+          <p:cNvPr id="10" name="Flowchart: Terminator 9">
+            <a:extLst>
+              <a:ext uri="{FF2B5EF4-FFF2-40B4-BE49-F238E27FC236}">
+                <a16:creationId xmlns:a16="http://schemas.microsoft.com/office/drawing/2014/main" id="{713125AB-F947-460F-9D7C-B24D25ED9A9D}"/>
+              </a:ext>
+            </a:extLst>
+          </p:cNvPr>
+          <p:cNvSpPr/>
+          <p:nvPr/>
+        </p:nvSpPr>
+        <p:spPr>
+          <a:xfrm>
+            <a:off x="2545108" y="6072013"/>
+            <a:ext cx="2639590" cy="523783"/>
+          </a:xfrm>
+          <a:prstGeom prst="flowChartTerminator">
+            <a:avLst/>
+          </a:prstGeom>
+        </p:spPr>
+        <p:style>
+          <a:lnRef idx="3">
+            <a:schemeClr val="lt1"/>
+          </a:lnRef>
+          <a:fillRef idx="1">
+            <a:schemeClr val="accent1"/>
+          </a:fillRef>
+          <a:effectRef idx="1">
+            <a:schemeClr val="accent1"/>
+          </a:effectRef>
+          <a:fontRef idx="minor">
+            <a:schemeClr val="lt1"/>
+          </a:fontRef>
+        </p:style>
+        <p:txBody>
+          <a:bodyPr rtlCol="0" anchor="ctr"/>
+          <a:lstStyle/>
+          <a:p>
+            <a:pPr algn="ctr"/>
+            <a:r>
+              <a:rPr lang="zh-CN" altLang="en-US" b="1" dirty="0"/>
+              <a:t>结果输出</a:t>
+            </a:r>
+          </a:p>
+        </p:txBody>
+      </p:sp>
+      <p:cxnSp>
+        <p:nvCxnSpPr>
+          <p:cNvPr id="12" name="Straight Arrow Connector 11">
+            <a:extLst>
+              <a:ext uri="{FF2B5EF4-FFF2-40B4-BE49-F238E27FC236}">
+                <a16:creationId xmlns:a16="http://schemas.microsoft.com/office/drawing/2014/main" id="{30BD2C0F-5966-4ABB-996B-E4ECA900BB27}"/>
+              </a:ext>
+            </a:extLst>
+          </p:cNvPr>
+          <p:cNvCxnSpPr>
+            <a:cxnSpLocks/>
+            <a:stCxn id="4" idx="2"/>
+            <a:endCxn id="5" idx="0"/>
+          </p:cNvCxnSpPr>
+          <p:nvPr/>
+        </p:nvCxnSpPr>
+        <p:spPr>
+          <a:xfrm>
+            <a:off x="3864904" y="1909037"/>
+            <a:ext cx="0" cy="418324"/>
+          </a:xfrm>
+          <a:prstGeom prst="straightConnector1">
+            <a:avLst/>
+          </a:prstGeom>
+          <a:ln>
+            <a:tailEnd type="triangle"/>
+          </a:ln>
+        </p:spPr>
+        <p:style>
+          <a:lnRef idx="3">
+            <a:schemeClr val="dk1"/>
+          </a:lnRef>
+          <a:fillRef idx="0">
+            <a:schemeClr val="dk1"/>
+          </a:fillRef>
+          <a:effectRef idx="2">
+            <a:schemeClr val="dk1"/>
+          </a:effectRef>
+          <a:fontRef idx="minor">
+            <a:schemeClr val="tx1"/>
+          </a:fontRef>
+        </p:style>
+      </p:cxnSp>
+      <p:cxnSp>
+        <p:nvCxnSpPr>
+          <p:cNvPr id="16" name="Straight Arrow Connector 15">
+            <a:extLst>
+              <a:ext uri="{FF2B5EF4-FFF2-40B4-BE49-F238E27FC236}">
+                <a16:creationId xmlns:a16="http://schemas.microsoft.com/office/drawing/2014/main" id="{DD8CDFC2-2376-421F-9170-35A8D65F9A6F}"/>
+              </a:ext>
+            </a:extLst>
+          </p:cNvPr>
+          <p:cNvCxnSpPr>
+            <a:cxnSpLocks/>
+            <a:stCxn id="5" idx="2"/>
+            <a:endCxn id="45" idx="0"/>
+          </p:cNvCxnSpPr>
+          <p:nvPr/>
+        </p:nvCxnSpPr>
+        <p:spPr>
+          <a:xfrm>
+            <a:off x="3864904" y="2851145"/>
+            <a:ext cx="0" cy="418324"/>
+          </a:xfrm>
+          <a:prstGeom prst="straightConnector1">
+            <a:avLst/>
+          </a:prstGeom>
+          <a:ln>
+            <a:tailEnd type="triangle"/>
+          </a:ln>
+        </p:spPr>
+        <p:style>
+          <a:lnRef idx="3">
+            <a:schemeClr val="dk1"/>
+          </a:lnRef>
+          <a:fillRef idx="0">
+            <a:schemeClr val="dk1"/>
+          </a:fillRef>
+          <a:effectRef idx="2">
+            <a:schemeClr val="dk1"/>
+          </a:effectRef>
+          <a:fontRef idx="minor">
+            <a:schemeClr val="tx1"/>
+          </a:fontRef>
+        </p:style>
+      </p:cxnSp>
+      <p:cxnSp>
+        <p:nvCxnSpPr>
+          <p:cNvPr id="19" name="Straight Arrow Connector 18">
+            <a:extLst>
+              <a:ext uri="{FF2B5EF4-FFF2-40B4-BE49-F238E27FC236}">
+                <a16:creationId xmlns:a16="http://schemas.microsoft.com/office/drawing/2014/main" id="{DC8B8546-B1B6-4682-8AE0-681B20B03807}"/>
+              </a:ext>
+            </a:extLst>
+          </p:cNvPr>
+          <p:cNvCxnSpPr>
+            <a:cxnSpLocks/>
+            <a:stCxn id="52" idx="2"/>
+            <a:endCxn id="9" idx="0"/>
+          </p:cNvCxnSpPr>
+          <p:nvPr/>
+        </p:nvCxnSpPr>
+        <p:spPr>
+          <a:xfrm>
+            <a:off x="3864903" y="4673747"/>
+            <a:ext cx="0" cy="437359"/>
+          </a:xfrm>
+          <a:prstGeom prst="straightConnector1">
+            <a:avLst/>
+          </a:prstGeom>
+          <a:ln>
+            <a:tailEnd type="triangle"/>
+          </a:ln>
+        </p:spPr>
+        <p:style>
+          <a:lnRef idx="3">
+            <a:schemeClr val="dk1"/>
+          </a:lnRef>
+          <a:fillRef idx="0">
+            <a:schemeClr val="dk1"/>
+          </a:fillRef>
+          <a:effectRef idx="2">
+            <a:schemeClr val="dk1"/>
+          </a:effectRef>
+          <a:fontRef idx="minor">
+            <a:schemeClr val="tx1"/>
+          </a:fontRef>
+        </p:style>
+      </p:cxnSp>
+      <p:cxnSp>
+        <p:nvCxnSpPr>
+          <p:cNvPr id="22" name="Straight Arrow Connector 21">
+            <a:extLst>
+              <a:ext uri="{FF2B5EF4-FFF2-40B4-BE49-F238E27FC236}">
+                <a16:creationId xmlns:a16="http://schemas.microsoft.com/office/drawing/2014/main" id="{A2105681-D7FC-45BC-90A8-FE9A64215747}"/>
+              </a:ext>
+            </a:extLst>
+          </p:cNvPr>
+          <p:cNvCxnSpPr>
+            <a:cxnSpLocks/>
+            <a:stCxn id="9" idx="2"/>
+            <a:endCxn id="10" idx="0"/>
+          </p:cNvCxnSpPr>
+          <p:nvPr/>
+        </p:nvCxnSpPr>
+        <p:spPr>
+          <a:xfrm>
+            <a:off x="3864903" y="5626890"/>
+            <a:ext cx="0" cy="445123"/>
+          </a:xfrm>
+          <a:prstGeom prst="straightConnector1">
+            <a:avLst/>
+          </a:prstGeom>
+          <a:ln>
+            <a:tailEnd type="triangle"/>
+          </a:ln>
+        </p:spPr>
+        <p:style>
+          <a:lnRef idx="3">
+            <a:schemeClr val="dk1"/>
+          </a:lnRef>
+          <a:fillRef idx="0">
+            <a:schemeClr val="dk1"/>
+          </a:fillRef>
+          <a:effectRef idx="2">
+            <a:schemeClr val="dk1"/>
+          </a:effectRef>
+          <a:fontRef idx="minor">
+            <a:schemeClr val="tx1"/>
+          </a:fontRef>
+        </p:style>
+      </p:cxnSp>
+      <p:sp>
+        <p:nvSpPr>
+          <p:cNvPr id="35" name="TextBox 34">
+            <a:extLst>
+              <a:ext uri="{FF2B5EF4-FFF2-40B4-BE49-F238E27FC236}">
+                <a16:creationId xmlns:a16="http://schemas.microsoft.com/office/drawing/2014/main" id="{BB0EB238-5E20-40B7-B916-B6A1F0DD535E}"/>
+              </a:ext>
+            </a:extLst>
+          </p:cNvPr>
+          <p:cNvSpPr txBox="1"/>
+          <p:nvPr/>
+        </p:nvSpPr>
+        <p:spPr>
+          <a:xfrm>
+            <a:off x="1919681" y="1927389"/>
+            <a:ext cx="1818635" cy="369332"/>
+          </a:xfrm>
+          <a:prstGeom prst="rect">
+            <a:avLst/>
+          </a:prstGeom>
+          <a:noFill/>
+        </p:spPr>
+        <p:txBody>
+          <a:bodyPr wrap="square" rtlCol="0">
+            <a:spAutoFit/>
+          </a:bodyPr>
+          <a:lstStyle/>
+          <a:p>
+            <a:r>
+              <a:rPr lang="zh-CN" altLang="en-US" b="1" dirty="0">
+                <a:latin typeface="仿宋" panose="02010609060101010101" pitchFamily="49" charset="-122"/>
+                <a:ea typeface="仿宋" panose="02010609060101010101" pitchFamily="49" charset="-122"/>
+              </a:rPr>
+              <a:t>现场环境声信号</a:t>
+            </a:r>
+          </a:p>
+        </p:txBody>
+      </p:sp>
+      <p:sp>
+        <p:nvSpPr>
+          <p:cNvPr id="36" name="TextBox 35">
+            <a:extLst>
+              <a:ext uri="{FF2B5EF4-FFF2-40B4-BE49-F238E27FC236}">
+                <a16:creationId xmlns:a16="http://schemas.microsoft.com/office/drawing/2014/main" id="{C4E7EB98-5A05-463D-BBA0-C7E6981ABB84}"/>
+              </a:ext>
+            </a:extLst>
+          </p:cNvPr>
+          <p:cNvSpPr txBox="1"/>
+          <p:nvPr/>
+        </p:nvSpPr>
+        <p:spPr>
+          <a:xfrm>
+            <a:off x="2347621" y="2882547"/>
+            <a:ext cx="1390695" cy="375961"/>
+          </a:xfrm>
+          <a:prstGeom prst="rect">
+            <a:avLst/>
+          </a:prstGeom>
+          <a:noFill/>
+        </p:spPr>
+        <p:txBody>
+          <a:bodyPr wrap="square" rtlCol="0">
+            <a:spAutoFit/>
+          </a:bodyPr>
+          <a:lstStyle/>
+          <a:p>
+            <a:r>
+              <a:rPr lang="zh-CN" altLang="en-US" b="1" dirty="0">
+                <a:latin typeface="仿宋" panose="02010609060101010101" pitchFamily="49" charset="-122"/>
+                <a:ea typeface="仿宋" panose="02010609060101010101" pitchFamily="49" charset="-122"/>
+              </a:rPr>
+              <a:t>滤波器输出</a:t>
+            </a:r>
+          </a:p>
+        </p:txBody>
+      </p:sp>
+      <p:sp>
+        <p:nvSpPr>
+          <p:cNvPr id="37" name="TextBox 36">
+            <a:extLst>
+              <a:ext uri="{FF2B5EF4-FFF2-40B4-BE49-F238E27FC236}">
+                <a16:creationId xmlns:a16="http://schemas.microsoft.com/office/drawing/2014/main" id="{A91CE5D3-82A0-45BD-94DF-58564AF57097}"/>
+              </a:ext>
+            </a:extLst>
+          </p:cNvPr>
+          <p:cNvSpPr txBox="1"/>
+          <p:nvPr/>
+        </p:nvSpPr>
+        <p:spPr>
+          <a:xfrm>
+            <a:off x="2100809" y="3815852"/>
+            <a:ext cx="1594865" cy="369332"/>
+          </a:xfrm>
+          <a:prstGeom prst="rect">
+            <a:avLst/>
+          </a:prstGeom>
+          <a:noFill/>
+        </p:spPr>
+        <p:txBody>
+          <a:bodyPr wrap="square" rtlCol="0">
+            <a:spAutoFit/>
+          </a:bodyPr>
+          <a:lstStyle/>
+          <a:p>
+            <a:r>
+              <a:rPr lang="zh-CN" altLang="en-US" b="1" dirty="0">
+                <a:latin typeface="仿宋" panose="02010609060101010101" pitchFamily="49" charset="-122"/>
+                <a:ea typeface="仿宋" panose="02010609060101010101" pitchFamily="49" charset="-122"/>
+              </a:rPr>
+              <a:t>疑似信号片段</a:t>
+            </a:r>
+          </a:p>
+        </p:txBody>
+      </p:sp>
+      <p:sp>
+        <p:nvSpPr>
+          <p:cNvPr id="38" name="TextBox 37">
+            <a:extLst>
+              <a:ext uri="{FF2B5EF4-FFF2-40B4-BE49-F238E27FC236}">
+                <a16:creationId xmlns:a16="http://schemas.microsoft.com/office/drawing/2014/main" id="{67B3CF70-2DF4-4513-9748-692A3D91A302}"/>
+              </a:ext>
+            </a:extLst>
+          </p:cNvPr>
+          <p:cNvSpPr txBox="1"/>
+          <p:nvPr/>
+        </p:nvSpPr>
+        <p:spPr>
+          <a:xfrm>
+            <a:off x="2545108" y="5655657"/>
+            <a:ext cx="1111377" cy="369332"/>
+          </a:xfrm>
+          <a:prstGeom prst="rect">
+            <a:avLst/>
+          </a:prstGeom>
+          <a:noFill/>
+        </p:spPr>
+        <p:txBody>
+          <a:bodyPr wrap="square" rtlCol="0">
+            <a:spAutoFit/>
+          </a:bodyPr>
+          <a:lstStyle/>
+          <a:p>
+            <a:r>
+              <a:rPr lang="zh-CN" altLang="en-US" b="1" dirty="0">
+                <a:latin typeface="仿宋" panose="02010609060101010101" pitchFamily="49" charset="-122"/>
+                <a:ea typeface="仿宋" panose="02010609060101010101" pitchFamily="49" charset="-122"/>
+              </a:rPr>
+              <a:t>检测结果</a:t>
+            </a:r>
+          </a:p>
+        </p:txBody>
+      </p:sp>
+      <p:sp>
+        <p:nvSpPr>
+          <p:cNvPr id="45" name="Flowchart: Alternate Process 44">
+            <a:extLst>
+              <a:ext uri="{FF2B5EF4-FFF2-40B4-BE49-F238E27FC236}">
+                <a16:creationId xmlns:a16="http://schemas.microsoft.com/office/drawing/2014/main" id="{2B1AD900-B319-443C-8DAC-F0D00D6C6004}"/>
+              </a:ext>
+            </a:extLst>
+          </p:cNvPr>
+          <p:cNvSpPr/>
+          <p:nvPr/>
+        </p:nvSpPr>
+        <p:spPr>
+          <a:xfrm>
+            <a:off x="3205006" y="3269469"/>
+            <a:ext cx="1319795" cy="523784"/>
+          </a:xfrm>
+          <a:prstGeom prst="flowChartAlternateProcess">
+            <a:avLst/>
+          </a:prstGeom>
+        </p:spPr>
+        <p:style>
+          <a:lnRef idx="3">
+            <a:schemeClr val="lt1"/>
+          </a:lnRef>
+          <a:fillRef idx="1">
+            <a:schemeClr val="accent6"/>
+          </a:fillRef>
+          <a:effectRef idx="1">
+            <a:schemeClr val="accent6"/>
+          </a:effectRef>
+          <a:fontRef idx="minor">
+            <a:schemeClr val="lt1"/>
+          </a:fontRef>
+        </p:style>
+        <p:txBody>
+          <a:bodyPr rtlCol="0" anchor="ctr"/>
+          <a:lstStyle/>
+          <a:p>
+            <a:pPr algn="ctr"/>
+            <a:r>
+              <a:rPr lang="zh-CN" altLang="en-US" b="1" dirty="0"/>
+              <a:t>端点检测</a:t>
+            </a:r>
+            <a:endParaRPr lang="en-US" altLang="zh-CN" b="1" dirty="0"/>
+          </a:p>
+        </p:txBody>
+      </p:sp>
+      <p:sp>
+        <p:nvSpPr>
+          <p:cNvPr id="49" name="TextBox 48">
+            <a:extLst>
+              <a:ext uri="{FF2B5EF4-FFF2-40B4-BE49-F238E27FC236}">
+                <a16:creationId xmlns:a16="http://schemas.microsoft.com/office/drawing/2014/main" id="{6C352947-308F-4A12-951E-31E1C8EDD112}"/>
+              </a:ext>
+            </a:extLst>
+          </p:cNvPr>
+          <p:cNvSpPr txBox="1"/>
+          <p:nvPr/>
+        </p:nvSpPr>
+        <p:spPr>
+          <a:xfrm>
+            <a:off x="4721570" y="2430608"/>
+            <a:ext cx="5875875" cy="369332"/>
+          </a:xfrm>
+          <a:prstGeom prst="rect">
+            <a:avLst/>
+          </a:prstGeom>
+          <a:noFill/>
+        </p:spPr>
+        <p:txBody>
+          <a:bodyPr wrap="square" rtlCol="0">
+            <a:spAutoFit/>
+          </a:bodyPr>
+          <a:lstStyle/>
+          <a:p>
+            <a:r>
+              <a:rPr lang="zh-CN" altLang="en-US" dirty="0">
+                <a:latin typeface="仿宋" panose="02010609060101010101" pitchFamily="49" charset="-122"/>
+                <a:ea typeface="仿宋" panose="02010609060101010101" pitchFamily="49" charset="-122"/>
+              </a:rPr>
+              <a:t>高频段信号为噪声，用滤波器对信号进行初步清洗</a:t>
+            </a:r>
+          </a:p>
+        </p:txBody>
+      </p:sp>
+      <p:sp>
+        <p:nvSpPr>
+          <p:cNvPr id="52" name="Flowchart: Alternate Process 51">
+            <a:extLst>
+              <a:ext uri="{FF2B5EF4-FFF2-40B4-BE49-F238E27FC236}">
+                <a16:creationId xmlns:a16="http://schemas.microsoft.com/office/drawing/2014/main" id="{62C7BC85-42F4-4B85-BFD6-BBD547FF140D}"/>
+              </a:ext>
+            </a:extLst>
+          </p:cNvPr>
+          <p:cNvSpPr/>
+          <p:nvPr/>
+        </p:nvSpPr>
+        <p:spPr>
+          <a:xfrm>
+            <a:off x="3253088" y="4199262"/>
+            <a:ext cx="1223630" cy="474485"/>
+          </a:xfrm>
+          <a:prstGeom prst="flowChartAlternateProcess">
+            <a:avLst/>
+          </a:prstGeom>
+        </p:spPr>
+        <p:style>
+          <a:lnRef idx="3">
+            <a:schemeClr val="lt1"/>
+          </a:lnRef>
+          <a:fillRef idx="1">
+            <a:schemeClr val="accent6"/>
+          </a:fillRef>
+          <a:effectRef idx="1">
+            <a:schemeClr val="accent6"/>
+          </a:effectRef>
+          <a:fontRef idx="minor">
+            <a:schemeClr val="lt1"/>
+          </a:fontRef>
+        </p:style>
+        <p:txBody>
+          <a:bodyPr rtlCol="0" anchor="ctr"/>
+          <a:lstStyle/>
+          <a:p>
+            <a:pPr algn="ctr"/>
+            <a:r>
+              <a:rPr lang="zh-CN" altLang="en-US" b="1" dirty="0"/>
+              <a:t>特征工程</a:t>
+            </a:r>
+            <a:endParaRPr lang="en-US" altLang="zh-CN" b="1" dirty="0"/>
+          </a:p>
+        </p:txBody>
+      </p:sp>
+      <p:cxnSp>
+        <p:nvCxnSpPr>
+          <p:cNvPr id="58" name="Straight Arrow Connector 57">
+            <a:extLst>
+              <a:ext uri="{FF2B5EF4-FFF2-40B4-BE49-F238E27FC236}">
+                <a16:creationId xmlns:a16="http://schemas.microsoft.com/office/drawing/2014/main" id="{0328FBAD-5B78-4A38-A47F-D1C11CD7D818}"/>
+              </a:ext>
+            </a:extLst>
+          </p:cNvPr>
+          <p:cNvCxnSpPr>
+            <a:cxnSpLocks/>
+            <a:stCxn id="45" idx="2"/>
+            <a:endCxn id="52" idx="0"/>
+          </p:cNvCxnSpPr>
+          <p:nvPr/>
+        </p:nvCxnSpPr>
+        <p:spPr>
+          <a:xfrm flipH="1">
+            <a:off x="3864903" y="3793253"/>
+            <a:ext cx="1" cy="406009"/>
+          </a:xfrm>
+          <a:prstGeom prst="straightConnector1">
+            <a:avLst/>
+          </a:prstGeom>
+          <a:ln>
+            <a:tailEnd type="triangle"/>
+          </a:ln>
+        </p:spPr>
+        <p:style>
+          <a:lnRef idx="3">
+            <a:schemeClr val="dk1"/>
+          </a:lnRef>
+          <a:fillRef idx="0">
+            <a:schemeClr val="dk1"/>
+          </a:fillRef>
+          <a:effectRef idx="2">
+            <a:schemeClr val="dk1"/>
+          </a:effectRef>
+          <a:fontRef idx="minor">
+            <a:schemeClr val="tx1"/>
+          </a:fontRef>
+        </p:style>
+      </p:cxnSp>
+      <p:sp>
+        <p:nvSpPr>
+          <p:cNvPr id="70" name="TextBox 69">
+            <a:extLst>
+              <a:ext uri="{FF2B5EF4-FFF2-40B4-BE49-F238E27FC236}">
+                <a16:creationId xmlns:a16="http://schemas.microsoft.com/office/drawing/2014/main" id="{BE25D9CF-3FBE-4107-BDA9-C91B95F48DD2}"/>
+              </a:ext>
+            </a:extLst>
+          </p:cNvPr>
+          <p:cNvSpPr txBox="1"/>
+          <p:nvPr/>
+        </p:nvSpPr>
+        <p:spPr>
+          <a:xfrm>
+            <a:off x="1850186" y="4720771"/>
+            <a:ext cx="1818635" cy="369332"/>
+          </a:xfrm>
+          <a:prstGeom prst="rect">
+            <a:avLst/>
+          </a:prstGeom>
+          <a:noFill/>
+        </p:spPr>
+        <p:txBody>
+          <a:bodyPr wrap="square" rtlCol="0">
+            <a:spAutoFit/>
+          </a:bodyPr>
+          <a:lstStyle/>
+          <a:p>
+            <a:r>
+              <a:rPr lang="zh-CN" altLang="en-US" b="1" dirty="0">
+                <a:latin typeface="仿宋" panose="02010609060101010101" pitchFamily="49" charset="-122"/>
+                <a:ea typeface="仿宋" panose="02010609060101010101" pitchFamily="49" charset="-122"/>
+              </a:rPr>
+              <a:t>信号片段的特征</a:t>
+            </a:r>
+          </a:p>
+        </p:txBody>
+      </p:sp>
+      <p:sp>
+        <p:nvSpPr>
+          <p:cNvPr id="71" name="TextBox 70">
+            <a:extLst>
+              <a:ext uri="{FF2B5EF4-FFF2-40B4-BE49-F238E27FC236}">
+                <a16:creationId xmlns:a16="http://schemas.microsoft.com/office/drawing/2014/main" id="{DA634E4D-AEFB-40F5-81E2-8457EC59AA71}"/>
+              </a:ext>
+            </a:extLst>
+          </p:cNvPr>
+          <p:cNvSpPr txBox="1"/>
+          <p:nvPr/>
+        </p:nvSpPr>
+        <p:spPr>
+          <a:xfrm>
+            <a:off x="4721570" y="3344671"/>
+            <a:ext cx="7368187" cy="369332"/>
+          </a:xfrm>
+          <a:prstGeom prst="rect">
+            <a:avLst/>
+          </a:prstGeom>
+          <a:noFill/>
+        </p:spPr>
+        <p:txBody>
+          <a:bodyPr wrap="square" rtlCol="0">
+            <a:spAutoFit/>
+          </a:bodyPr>
+          <a:lstStyle/>
+          <a:p>
+            <a:r>
+              <a:rPr lang="zh-CN" altLang="en-US" dirty="0">
+                <a:latin typeface="仿宋" panose="02010609060101010101" pitchFamily="49" charset="-122"/>
+                <a:ea typeface="仿宋" panose="02010609060101010101" pitchFamily="49" charset="-122"/>
+              </a:rPr>
+              <a:t>根据疑似信号的特点，检测出疑似信号片段，并从声音序列中抽取出来</a:t>
+            </a:r>
+          </a:p>
+        </p:txBody>
+      </p:sp>
+      <p:sp>
+        <p:nvSpPr>
+          <p:cNvPr id="72" name="TextBox 71">
+            <a:extLst>
+              <a:ext uri="{FF2B5EF4-FFF2-40B4-BE49-F238E27FC236}">
+                <a16:creationId xmlns:a16="http://schemas.microsoft.com/office/drawing/2014/main" id="{4A1F08C3-2561-4E4A-A637-548A62F9DABD}"/>
+              </a:ext>
+            </a:extLst>
+          </p:cNvPr>
+          <p:cNvSpPr txBox="1"/>
+          <p:nvPr/>
+        </p:nvSpPr>
+        <p:spPr>
+          <a:xfrm>
+            <a:off x="4777346" y="4251311"/>
+            <a:ext cx="5875875" cy="369332"/>
+          </a:xfrm>
+          <a:prstGeom prst="rect">
+            <a:avLst/>
+          </a:prstGeom>
+          <a:noFill/>
+        </p:spPr>
+        <p:txBody>
+          <a:bodyPr wrap="square" rtlCol="0">
+            <a:spAutoFit/>
+          </a:bodyPr>
+          <a:lstStyle/>
+          <a:p>
+            <a:r>
+              <a:rPr lang="zh-CN" altLang="en-US" dirty="0">
+                <a:latin typeface="仿宋" panose="02010609060101010101" pitchFamily="49" charset="-122"/>
+                <a:ea typeface="仿宋" panose="02010609060101010101" pitchFamily="49" charset="-122"/>
+              </a:rPr>
+              <a:t>提取每个疑似信号片段的特征</a:t>
+            </a:r>
+          </a:p>
+        </p:txBody>
+      </p:sp>
+      <p:sp>
+        <p:nvSpPr>
+          <p:cNvPr id="73" name="TextBox 72">
+            <a:extLst>
+              <a:ext uri="{FF2B5EF4-FFF2-40B4-BE49-F238E27FC236}">
+                <a16:creationId xmlns:a16="http://schemas.microsoft.com/office/drawing/2014/main" id="{907B1904-0CC7-4C5E-B679-3831324DEC61}"/>
+              </a:ext>
+            </a:extLst>
+          </p:cNvPr>
+          <p:cNvSpPr txBox="1"/>
+          <p:nvPr/>
+        </p:nvSpPr>
+        <p:spPr>
+          <a:xfrm>
+            <a:off x="4777345" y="5132589"/>
+            <a:ext cx="6439295" cy="646331"/>
+          </a:xfrm>
+          <a:prstGeom prst="rect">
+            <a:avLst/>
+          </a:prstGeom>
+          <a:noFill/>
+        </p:spPr>
+        <p:txBody>
+          <a:bodyPr wrap="square" rtlCol="0">
+            <a:spAutoFit/>
+          </a:bodyPr>
+          <a:lstStyle/>
+          <a:p>
+            <a:r>
+              <a:rPr lang="zh-CN" altLang="en-US" dirty="0">
+                <a:latin typeface="仿宋" panose="02010609060101010101" pitchFamily="49" charset="-122"/>
+                <a:ea typeface="仿宋" panose="02010609060101010101" pitchFamily="49" charset="-122"/>
+              </a:rPr>
+              <a:t>特征作为分类器的输入，用事先训练好的分类器进行分类</a:t>
+            </a:r>
+            <a:endParaRPr lang="en-US" altLang="zh-CN" dirty="0">
+              <a:latin typeface="仿宋" panose="02010609060101010101" pitchFamily="49" charset="-122"/>
+              <a:ea typeface="仿宋" panose="02010609060101010101" pitchFamily="49" charset="-122"/>
+            </a:endParaRPr>
+          </a:p>
+          <a:p>
+            <a:r>
+              <a:rPr lang="zh-CN" altLang="en-US" dirty="0">
+                <a:latin typeface="仿宋" panose="02010609060101010101" pitchFamily="49" charset="-122"/>
+                <a:ea typeface="仿宋" panose="02010609060101010101" pitchFamily="49" charset="-122"/>
+              </a:rPr>
+              <a:t>（枪声</a:t>
+            </a:r>
+            <a:r>
+              <a:rPr lang="en-US" altLang="zh-CN" dirty="0">
+                <a:latin typeface="仿宋" panose="02010609060101010101" pitchFamily="49" charset="-122"/>
+                <a:ea typeface="仿宋" panose="02010609060101010101" pitchFamily="49" charset="-122"/>
+              </a:rPr>
+              <a:t>/</a:t>
+            </a:r>
+            <a:r>
+              <a:rPr lang="zh-CN" altLang="en-US" dirty="0">
+                <a:latin typeface="仿宋" panose="02010609060101010101" pitchFamily="49" charset="-122"/>
+                <a:ea typeface="仿宋" panose="02010609060101010101" pitchFamily="49" charset="-122"/>
+              </a:rPr>
+              <a:t>爆炸声</a:t>
+            </a:r>
+            <a:r>
+              <a:rPr lang="en-US" altLang="zh-CN" dirty="0">
+                <a:latin typeface="仿宋" panose="02010609060101010101" pitchFamily="49" charset="-122"/>
+                <a:ea typeface="仿宋" panose="02010609060101010101" pitchFamily="49" charset="-122"/>
+              </a:rPr>
+              <a:t>/</a:t>
+            </a:r>
+            <a:r>
+              <a:rPr lang="zh-CN" altLang="en-US" dirty="0">
+                <a:latin typeface="仿宋" panose="02010609060101010101" pitchFamily="49" charset="-122"/>
+                <a:ea typeface="仿宋" panose="02010609060101010101" pitchFamily="49" charset="-122"/>
+              </a:rPr>
+              <a:t>车喇叭），从而实现目标信号的检测</a:t>
+            </a:r>
+            <a:endParaRPr lang="en-US" altLang="zh-CN" dirty="0">
+              <a:latin typeface="仿宋" panose="02010609060101010101" pitchFamily="49" charset="-122"/>
+              <a:ea typeface="仿宋" panose="02010609060101010101" pitchFamily="49" charset="-122"/>
+            </a:endParaRPr>
+          </a:p>
+        </p:txBody>
+      </p:sp>
+      <p:sp>
+        <p:nvSpPr>
+          <p:cNvPr id="25" name="Rectangle 24">
+            <a:extLst>
+              <a:ext uri="{FF2B5EF4-FFF2-40B4-BE49-F238E27FC236}">
+                <a16:creationId xmlns:a16="http://schemas.microsoft.com/office/drawing/2014/main" id="{6DD5CF61-6A0A-4127-9AB5-4EEB9EB85FD9}"/>
+              </a:ext>
+            </a:extLst>
+          </p:cNvPr>
+          <p:cNvSpPr/>
+          <p:nvPr/>
+        </p:nvSpPr>
+        <p:spPr>
+          <a:xfrm>
+            <a:off x="2224124" y="5951219"/>
+            <a:ext cx="3285124" cy="750327"/>
+          </a:xfrm>
+          <a:prstGeom prst="rect">
+            <a:avLst/>
+          </a:prstGeom>
+          <a:noFill/>
+          <a:ln w="38100">
+            <a:solidFill>
+              <a:srgbClr val="FF0000"/>
+            </a:solidFill>
+          </a:ln>
+        </p:spPr>
+        <p:style>
+          <a:lnRef idx="2">
+            <a:schemeClr val="accent2"/>
+          </a:lnRef>
+          <a:fillRef idx="1">
+            <a:schemeClr val="lt1"/>
+          </a:fillRef>
+          <a:effectRef idx="0">
+            <a:schemeClr val="accent2"/>
+          </a:effectRef>
+          <a:fontRef idx="minor">
+            <a:schemeClr val="dk1"/>
+          </a:fontRef>
+        </p:style>
+        <p:txBody>
+          <a:bodyPr rtlCol="0" anchor="ctr"/>
+          <a:lstStyle/>
+          <a:p>
+            <a:pPr algn="ctr"/>
+            <a:endParaRPr lang="zh-CN" altLang="en-US"/>
+          </a:p>
+        </p:txBody>
+      </p:sp>
+    </p:spTree>
+    <p:extLst>
+      <p:ext uri="{BB962C8B-B14F-4D97-AF65-F5344CB8AC3E}">
+        <p14:creationId xmlns:p14="http://schemas.microsoft.com/office/powerpoint/2010/main" val="4097575625"/>
+      </p:ext>
+    </p:extLst>
+  </p:cSld>
+  <p:clrMapOvr>
+    <a:masterClrMapping/>
+  </p:clrMapOvr>
+</p:sld>
+</file>
+
+<file path=ppt/slides/slide23.xml><?xml version="1.0" encoding="utf-8"?>
+<p:sld xmlns:a="http://schemas.openxmlformats.org/drawingml/2006/main" xmlns:r="http://schemas.openxmlformats.org/officeDocument/2006/relationships" xmlns:p="http://schemas.openxmlformats.org/presentationml/2006/main">
+  <p:cSld>
+    <p:spTree>
+      <p:nvGrpSpPr>
+        <p:cNvPr id="1" name=""/>
+        <p:cNvGrpSpPr/>
+        <p:nvPr/>
+      </p:nvGrpSpPr>
+      <p:grpSpPr>
+        <a:xfrm>
+          <a:off x="0" y="0"/>
+          <a:ext cx="0" cy="0"/>
+          <a:chOff x="0" y="0"/>
+          <a:chExt cx="0" cy="0"/>
+        </a:xfrm>
+      </p:grpSpPr>
+      <p:sp>
+        <p:nvSpPr>
+          <p:cNvPr id="3" name="Content Placeholder 2">
+            <a:extLst>
+              <a:ext uri="{FF2B5EF4-FFF2-40B4-BE49-F238E27FC236}">
+                <a16:creationId xmlns:a16="http://schemas.microsoft.com/office/drawing/2014/main" id="{C307C99A-7957-4E1D-9E4D-26FE26CCE030}"/>
+              </a:ext>
+            </a:extLst>
+          </p:cNvPr>
+          <p:cNvSpPr>
+            <a:spLocks noGrp="1"/>
+          </p:cNvSpPr>
+          <p:nvPr>
+            <p:ph idx="1"/>
+          </p:nvPr>
+        </p:nvSpPr>
+        <p:spPr/>
+        <p:txBody>
+          <a:bodyPr/>
+          <a:lstStyle/>
+          <a:p>
+            <a:pPr marL="0" indent="0">
+              <a:buNone/>
+            </a:pPr>
+            <a:endParaRPr lang="zh-CN" altLang="en-US" dirty="0"/>
+          </a:p>
+        </p:txBody>
+      </p:sp>
+      <p:sp>
+        <p:nvSpPr>
+          <p:cNvPr id="4" name="Slide Number Placeholder 3">
+            <a:extLst>
+              <a:ext uri="{FF2B5EF4-FFF2-40B4-BE49-F238E27FC236}">
+                <a16:creationId xmlns:a16="http://schemas.microsoft.com/office/drawing/2014/main" id="{59A1C320-10E8-488D-B62D-73FE9A1348E9}"/>
+              </a:ext>
+            </a:extLst>
+          </p:cNvPr>
+          <p:cNvSpPr>
+            <a:spLocks noGrp="1"/>
+          </p:cNvSpPr>
+          <p:nvPr>
+            <p:ph type="sldNum" sz="quarter" idx="12"/>
+          </p:nvPr>
+        </p:nvSpPr>
+        <p:spPr/>
+        <p:txBody>
+          <a:bodyPr/>
+          <a:lstStyle/>
+          <a:p>
+            <a:fld id="{2BB362F8-89DF-415A-B93E-F967FB14F09D}" type="slidenum">
+              <a:rPr lang="zh-CN" altLang="en-US" smtClean="0"/>
+              <a:t>23</a:t>
+            </a:fld>
+            <a:endParaRPr lang="zh-CN" altLang="en-US"/>
+          </a:p>
+        </p:txBody>
+      </p:sp>
+      <p:sp>
+        <p:nvSpPr>
+          <p:cNvPr id="9" name="Title 1">
+            <a:extLst>
+              <a:ext uri="{FF2B5EF4-FFF2-40B4-BE49-F238E27FC236}">
+                <a16:creationId xmlns:a16="http://schemas.microsoft.com/office/drawing/2014/main" id="{E2BBFDD7-1210-42FA-B9DC-061F6E5F81CB}"/>
+              </a:ext>
+            </a:extLst>
+          </p:cNvPr>
+          <p:cNvSpPr>
+            <a:spLocks noGrp="1"/>
+          </p:cNvSpPr>
+          <p:nvPr>
+            <p:ph type="title"/>
+          </p:nvPr>
+        </p:nvSpPr>
+        <p:spPr>
+          <a:xfrm>
+            <a:off x="838200" y="174763"/>
+            <a:ext cx="10515600" cy="1325563"/>
+          </a:xfrm>
+        </p:spPr>
+        <p:txBody>
+          <a:bodyPr/>
+          <a:lstStyle/>
+          <a:p>
+            <a:r>
+              <a:rPr lang="zh-CN" altLang="en-US" dirty="0">
+                <a:latin typeface="仿宋" panose="02010609060101010101" pitchFamily="49" charset="-122"/>
+                <a:ea typeface="仿宋" panose="02010609060101010101" pitchFamily="49" charset="-122"/>
+              </a:rPr>
+              <a:t>参考文献</a:t>
+            </a:r>
+            <a:br>
+              <a:rPr lang="en-US" altLang="zh-CN" dirty="0">
+                <a:latin typeface="仿宋" panose="02010609060101010101" pitchFamily="49" charset="-122"/>
+                <a:ea typeface="仿宋" panose="02010609060101010101" pitchFamily="49" charset="-122"/>
+              </a:rPr>
+            </a:br>
+            <a:r>
+              <a:rPr lang="en-US" altLang="zh-CN" sz="3000" dirty="0">
+                <a:latin typeface="Times New Roman" panose="02020603050405020304" pitchFamily="18" charset="0"/>
+                <a:ea typeface="仿宋" panose="02010609060101010101" pitchFamily="49" charset="-122"/>
+                <a:cs typeface="Times New Roman" panose="02020603050405020304" pitchFamily="18" charset="0"/>
+              </a:rPr>
+              <a:t>Reference</a:t>
+            </a:r>
+            <a:endParaRPr lang="zh-CN" altLang="en-US" sz="3000" dirty="0">
+              <a:latin typeface="Times New Roman" panose="02020603050405020304" pitchFamily="18" charset="0"/>
+              <a:ea typeface="仿宋" panose="02010609060101010101" pitchFamily="49" charset="-122"/>
+              <a:cs typeface="Times New Roman" panose="02020603050405020304" pitchFamily="18" charset="0"/>
+            </a:endParaRPr>
+          </a:p>
+        </p:txBody>
+      </p:sp>
+    </p:spTree>
+    <p:extLst>
+      <p:ext uri="{BB962C8B-B14F-4D97-AF65-F5344CB8AC3E}">
+        <p14:creationId xmlns:p14="http://schemas.microsoft.com/office/powerpoint/2010/main" val="4098803284"/>
       </p:ext>
     </p:extLst>
   </p:cSld>
@@ -13416,57 +16714,6 @@
           </a:p>
         </p:txBody>
       </p:sp>
-      <p:sp>
-        <p:nvSpPr>
-          <p:cNvPr id="10" name="Flowchart: Terminator 9">
-            <a:extLst>
-              <a:ext uri="{FF2B5EF4-FFF2-40B4-BE49-F238E27FC236}">
-                <a16:creationId xmlns:a16="http://schemas.microsoft.com/office/drawing/2014/main" id="{713125AB-F947-460F-9D7C-B24D25ED9A9D}"/>
-              </a:ext>
-            </a:extLst>
-          </p:cNvPr>
-          <p:cNvSpPr/>
-          <p:nvPr/>
-        </p:nvSpPr>
-        <p:spPr>
-          <a:xfrm>
-            <a:off x="2545108" y="6072013"/>
-            <a:ext cx="2639590" cy="523783"/>
-          </a:xfrm>
-          <a:prstGeom prst="flowChartTerminator">
-            <a:avLst/>
-          </a:prstGeom>
-        </p:spPr>
-        <p:style>
-          <a:lnRef idx="3">
-            <a:schemeClr val="lt1"/>
-          </a:lnRef>
-          <a:fillRef idx="1">
-            <a:schemeClr val="accent1"/>
-          </a:fillRef>
-          <a:effectRef idx="1">
-            <a:schemeClr val="accent1"/>
-          </a:effectRef>
-          <a:fontRef idx="minor">
-            <a:schemeClr val="lt1"/>
-          </a:fontRef>
-        </p:style>
-        <p:txBody>
-          <a:bodyPr rtlCol="0" anchor="ctr"/>
-          <a:lstStyle/>
-          <a:p>
-            <a:pPr algn="ctr"/>
-            <a:r>
-              <a:rPr lang="en-US" altLang="zh-CN" b="1" dirty="0"/>
-              <a:t>Microphone</a:t>
-            </a:r>
-            <a:r>
-              <a:rPr lang="zh-CN" altLang="en-US" b="1" dirty="0"/>
-              <a:t>实时输出</a:t>
-            </a:r>
-          </a:p>
-        </p:txBody>
-      </p:sp>
       <p:cxnSp>
         <p:nvCxnSpPr>
           <p:cNvPr id="12" name="Straight Arrow Connector 11">
@@ -13608,7 +16855,6 @@
           <p:cNvCxnSpPr>
             <a:cxnSpLocks/>
             <a:stCxn id="9" idx="2"/>
-            <a:endCxn id="10" idx="0"/>
           </p:cNvCxnSpPr>
           <p:nvPr/>
         </p:nvCxnSpPr>
@@ -14212,6 +17458,53 @@
           <a:p>
             <a:pPr algn="ctr"/>
             <a:endParaRPr lang="zh-CN" altLang="en-US"/>
+          </a:p>
+        </p:txBody>
+      </p:sp>
+      <p:sp>
+        <p:nvSpPr>
+          <p:cNvPr id="26" name="Flowchart: Terminator 25">
+            <a:extLst>
+              <a:ext uri="{FF2B5EF4-FFF2-40B4-BE49-F238E27FC236}">
+                <a16:creationId xmlns:a16="http://schemas.microsoft.com/office/drawing/2014/main" id="{E67BA803-AAE4-4A79-9C89-5BFEFAFC6DF4}"/>
+              </a:ext>
+            </a:extLst>
+          </p:cNvPr>
+          <p:cNvSpPr/>
+          <p:nvPr/>
+        </p:nvSpPr>
+        <p:spPr>
+          <a:xfrm>
+            <a:off x="2545108" y="6072013"/>
+            <a:ext cx="2639590" cy="523783"/>
+          </a:xfrm>
+          <a:prstGeom prst="flowChartTerminator">
+            <a:avLst/>
+          </a:prstGeom>
+        </p:spPr>
+        <p:style>
+          <a:lnRef idx="3">
+            <a:schemeClr val="lt1"/>
+          </a:lnRef>
+          <a:fillRef idx="1">
+            <a:schemeClr val="accent1"/>
+          </a:fillRef>
+          <a:effectRef idx="1">
+            <a:schemeClr val="accent1"/>
+          </a:effectRef>
+          <a:fontRef idx="minor">
+            <a:schemeClr val="lt1"/>
+          </a:fontRef>
+        </p:style>
+        <p:txBody>
+          <a:bodyPr rtlCol="0" anchor="ctr"/>
+          <a:lstStyle/>
+          <a:p>
+            <a:pPr algn="ctr"/>
+            <a:r>
+              <a:rPr lang="zh-CN" altLang="en-US" b="1" dirty="0"/>
+              <a:t>结果输出</a:t>
+            </a:r>
           </a:p>
         </p:txBody>
       </p:sp>
@@ -14503,7 +17796,30 @@
                 <a:latin typeface="仿宋" panose="02010609060101010101" pitchFamily="49" charset="-122"/>
                 <a:ea typeface="仿宋" panose="02010609060101010101" pitchFamily="49" charset="-122"/>
               </a:rPr>
-              <a:t>，跟语音识别有异曲同工的地方，语音识别将语音信号按语音片段进行分割，从而对每个片段分别做识别；声学事件检测同样需要先把可疑的声学信号片段分割出来，然后再进一步对每个可疑片段进行检测。</a:t>
+              <a:t>，跟语音识别有异曲同工的地方，语音识别将语音信号按语音片段进行分割，从而对每个片段分别做识别；声学事件检测同样需要先把可疑的声学信号片段分割出来，然后再进一步对每个可疑片段进行检测</a:t>
+            </a:r>
+            <a:r>
+              <a:rPr lang="en-US" altLang="zh-CN" sz="2500" dirty="0">
+                <a:latin typeface="仿宋" panose="02010609060101010101" pitchFamily="49" charset="-122"/>
+                <a:ea typeface="仿宋" panose="02010609060101010101" pitchFamily="49" charset="-122"/>
+              </a:rPr>
+              <a:t>【8】</a:t>
+            </a:r>
+          </a:p>
+          <a:p>
+            <a:r>
+              <a:rPr lang="en-US" altLang="zh-CN" sz="2500" dirty="0">
+                <a:latin typeface="仿宋" panose="02010609060101010101" pitchFamily="49" charset="-122"/>
+                <a:ea typeface="仿宋" panose="02010609060101010101" pitchFamily="49" charset="-122"/>
+              </a:rPr>
+              <a:t>	</a:t>
+            </a:r>
+            <a:r>
+              <a:rPr lang="zh-CN" altLang="en-US" sz="2500" dirty="0">
+                <a:latin typeface="仿宋" panose="02010609060101010101" pitchFamily="49" charset="-122"/>
+                <a:ea typeface="仿宋" panose="02010609060101010101" pitchFamily="49" charset="-122"/>
+              </a:rPr>
+              <a:t>语音识别：怎么找到人声的开始点和结束点？</a:t>
             </a:r>
             <a:endParaRPr lang="en-US" altLang="zh-CN" sz="2500" dirty="0">
               <a:latin typeface="仿宋" panose="02010609060101010101" pitchFamily="49" charset="-122"/>
@@ -14523,7 +17839,49 @@
                 <a:latin typeface="仿宋" panose="02010609060101010101" pitchFamily="49" charset="-122"/>
                 <a:ea typeface="仿宋" panose="02010609060101010101" pitchFamily="49" charset="-122"/>
               </a:rPr>
-              <a:t>语音识别：怎么找到人声的开始点和结束点？</a:t>
+              <a:t>声学事件检测：怎么找到声学事件（枪声</a:t>
+            </a:r>
+            <a:r>
+              <a:rPr lang="en-US" altLang="zh-CN" sz="2500" dirty="0">
+                <a:latin typeface="仿宋" panose="02010609060101010101" pitchFamily="49" charset="-122"/>
+                <a:ea typeface="仿宋" panose="02010609060101010101" pitchFamily="49" charset="-122"/>
+              </a:rPr>
+              <a:t>/</a:t>
+            </a:r>
+            <a:r>
+              <a:rPr lang="zh-CN" altLang="en-US" sz="2500" dirty="0">
+                <a:latin typeface="仿宋" panose="02010609060101010101" pitchFamily="49" charset="-122"/>
+                <a:ea typeface="仿宋" panose="02010609060101010101" pitchFamily="49" charset="-122"/>
+              </a:rPr>
+              <a:t>爆炸声</a:t>
+            </a:r>
+            <a:r>
+              <a:rPr lang="en-US" altLang="zh-CN" sz="2500" dirty="0">
+                <a:latin typeface="仿宋" panose="02010609060101010101" pitchFamily="49" charset="-122"/>
+                <a:ea typeface="仿宋" panose="02010609060101010101" pitchFamily="49" charset="-122"/>
+              </a:rPr>
+              <a:t>/</a:t>
+            </a:r>
+            <a:r>
+              <a:rPr lang="zh-CN" altLang="en-US" sz="2500" dirty="0">
+                <a:latin typeface="仿宋" panose="02010609060101010101" pitchFamily="49" charset="-122"/>
+                <a:ea typeface="仿宋" panose="02010609060101010101" pitchFamily="49" charset="-122"/>
+              </a:rPr>
+              <a:t>喇叭声）的开始点</a:t>
+            </a:r>
+            <a:r>
+              <a:rPr lang="en-US" altLang="zh-CN" sz="2500" dirty="0">
+                <a:latin typeface="仿宋" panose="02010609060101010101" pitchFamily="49" charset="-122"/>
+                <a:ea typeface="仿宋" panose="02010609060101010101" pitchFamily="49" charset="-122"/>
+              </a:rPr>
+              <a:t>			   </a:t>
+            </a:r>
+            <a:r>
+              <a:rPr lang="zh-CN" altLang="en-US" sz="2500" dirty="0">
+                <a:latin typeface="仿宋" panose="02010609060101010101" pitchFamily="49" charset="-122"/>
+                <a:ea typeface="仿宋" panose="02010609060101010101" pitchFamily="49" charset="-122"/>
+              </a:rPr>
+              <a:t>和结束点？</a:t>
             </a:r>
             <a:endParaRPr lang="en-US" altLang="zh-CN" sz="2500" dirty="0">
               <a:latin typeface="仿宋" panose="02010609060101010101" pitchFamily="49" charset="-122"/>
@@ -14538,68 +17896,6 @@
               </a:rPr>
               <a:t>	</a:t>
             </a:r>
-            <a:r>
-              <a:rPr lang="zh-CN" altLang="en-US" sz="2500" dirty="0">
-                <a:latin typeface="仿宋" panose="02010609060101010101" pitchFamily="49" charset="-122"/>
-                <a:ea typeface="仿宋" panose="02010609060101010101" pitchFamily="49" charset="-122"/>
-              </a:rPr>
-              <a:t>声学事件检测：怎么找到声学事件（枪声</a:t>
-            </a:r>
-            <a:r>
-              <a:rPr lang="en-US" altLang="zh-CN" sz="2500" dirty="0">
-                <a:latin typeface="仿宋" panose="02010609060101010101" pitchFamily="49" charset="-122"/>
-                <a:ea typeface="仿宋" panose="02010609060101010101" pitchFamily="49" charset="-122"/>
-              </a:rPr>
-              <a:t>/</a:t>
-            </a:r>
-            <a:r>
-              <a:rPr lang="zh-CN" altLang="en-US" sz="2500" dirty="0">
-                <a:latin typeface="仿宋" panose="02010609060101010101" pitchFamily="49" charset="-122"/>
-                <a:ea typeface="仿宋" panose="02010609060101010101" pitchFamily="49" charset="-122"/>
-              </a:rPr>
-              <a:t>爆炸声</a:t>
-            </a:r>
-            <a:r>
-              <a:rPr lang="en-US" altLang="zh-CN" sz="2500" dirty="0">
-                <a:latin typeface="仿宋" panose="02010609060101010101" pitchFamily="49" charset="-122"/>
-                <a:ea typeface="仿宋" panose="02010609060101010101" pitchFamily="49" charset="-122"/>
-              </a:rPr>
-              <a:t>/</a:t>
-            </a:r>
-            <a:r>
-              <a:rPr lang="zh-CN" altLang="en-US" sz="2500" dirty="0">
-                <a:latin typeface="仿宋" panose="02010609060101010101" pitchFamily="49" charset="-122"/>
-                <a:ea typeface="仿宋" panose="02010609060101010101" pitchFamily="49" charset="-122"/>
-              </a:rPr>
-              <a:t>喇叭声）的开始点</a:t>
-            </a:r>
-            <a:r>
-              <a:rPr lang="en-US" altLang="zh-CN" sz="2500" dirty="0">
-                <a:latin typeface="仿宋" panose="02010609060101010101" pitchFamily="49" charset="-122"/>
-                <a:ea typeface="仿宋" panose="02010609060101010101" pitchFamily="49" charset="-122"/>
-              </a:rPr>
-              <a:t>			   </a:t>
-            </a:r>
-            <a:r>
-              <a:rPr lang="zh-CN" altLang="en-US" sz="2500" dirty="0">
-                <a:latin typeface="仿宋" panose="02010609060101010101" pitchFamily="49" charset="-122"/>
-                <a:ea typeface="仿宋" panose="02010609060101010101" pitchFamily="49" charset="-122"/>
-              </a:rPr>
-              <a:t>和结束点？</a:t>
-            </a:r>
-            <a:endParaRPr lang="en-US" altLang="zh-CN" sz="2500" dirty="0">
-              <a:latin typeface="仿宋" panose="02010609060101010101" pitchFamily="49" charset="-122"/>
-              <a:ea typeface="仿宋" panose="02010609060101010101" pitchFamily="49" charset="-122"/>
-            </a:endParaRPr>
-          </a:p>
-          <a:p>
-            <a:r>
-              <a:rPr lang="en-US" altLang="zh-CN" sz="2500" dirty="0">
-                <a:latin typeface="仿宋" panose="02010609060101010101" pitchFamily="49" charset="-122"/>
-                <a:ea typeface="仿宋" panose="02010609060101010101" pitchFamily="49" charset="-122"/>
-              </a:rPr>
-              <a:t>	</a:t>
-            </a:r>
           </a:p>
         </p:txBody>
       </p:sp>
@@ -14617,8 +17913,8 @@
         </p:nvSpPr>
         <p:spPr>
           <a:xfrm>
-            <a:off x="967740" y="6560126"/>
-            <a:ext cx="3817620" cy="246221"/>
+            <a:off x="967739" y="6439678"/>
+            <a:ext cx="5684851" cy="400110"/>
           </a:xfrm>
           <a:prstGeom prst="rect">
             <a:avLst/>
@@ -14638,6 +17934,25 @@
             <a:r>
               <a:rPr lang="zh-CN" altLang="en-US" sz="1000" dirty="0"/>
               <a:t>语音信号处理，机械工业出版社，赵力等</a:t>
+            </a:r>
+            <a:endParaRPr lang="en-US" altLang="zh-CN" sz="1000" dirty="0"/>
+          </a:p>
+          <a:p>
+            <a:r>
+              <a:rPr lang="en-US" altLang="zh-CN" sz="1000" dirty="0"/>
+              <a:t>【8】</a:t>
+            </a:r>
+            <a:r>
+              <a:rPr lang="zh-CN" altLang="en-US" sz="1000" dirty="0"/>
+              <a:t>声学事件检测技术的发展历程与研究进展，</a:t>
+            </a:r>
+            <a:r>
+              <a:rPr lang="en-US" altLang="zh-CN" sz="1000" dirty="0"/>
+              <a:t>Journal of Data Acquisition and Processing, </a:t>
+            </a:r>
+            <a:r>
+              <a:rPr lang="zh-CN" altLang="en-US" sz="1000" dirty="0"/>
+              <a:t>韩纪庆</a:t>
             </a:r>
           </a:p>
         </p:txBody>

</xml_diff>

<commit_message>
2020-05-02 edition 2 / PPT
</commit_message>
<xml_diff>
--- a/Presentation.pptx
+++ b/Presentation.pptx
@@ -746,7 +746,7 @@
           <a:p>
             <a:fld id="{3D705E91-C7E4-4164-B291-E20CD00EA241}" type="slidenum">
               <a:rPr lang="zh-CN" altLang="en-US" smtClean="0"/>
-              <a:t>9</a:t>
+              <a:t>5</a:t>
             </a:fld>
             <a:endParaRPr lang="zh-CN" altLang="en-US"/>
           </a:p>
@@ -755,7 +755,7 @@
     </p:spTree>
     <p:extLst>
       <p:ext uri="{BB962C8B-B14F-4D97-AF65-F5344CB8AC3E}">
-        <p14:creationId xmlns:p14="http://schemas.microsoft.com/office/powerpoint/2010/main" val="3813289509"/>
+        <p14:creationId xmlns:p14="http://schemas.microsoft.com/office/powerpoint/2010/main" val="3475182007"/>
       </p:ext>
     </p:extLst>
   </p:cSld>
@@ -830,6 +830,90 @@
           <a:p>
             <a:fld id="{3D705E91-C7E4-4164-B291-E20CD00EA241}" type="slidenum">
               <a:rPr lang="zh-CN" altLang="en-US" smtClean="0"/>
+              <a:t>9</a:t>
+            </a:fld>
+            <a:endParaRPr lang="zh-CN" altLang="en-US"/>
+          </a:p>
+        </p:txBody>
+      </p:sp>
+    </p:spTree>
+    <p:extLst>
+      <p:ext uri="{BB962C8B-B14F-4D97-AF65-F5344CB8AC3E}">
+        <p14:creationId xmlns:p14="http://schemas.microsoft.com/office/powerpoint/2010/main" val="3813289509"/>
+      </p:ext>
+    </p:extLst>
+  </p:cSld>
+  <p:clrMapOvr>
+    <a:masterClrMapping/>
+  </p:clrMapOvr>
+</p:notes>
+</file>
+
+<file path=ppt/notesSlides/notesSlide3.xml><?xml version="1.0" encoding="utf-8"?>
+<p:notes xmlns:a="http://schemas.openxmlformats.org/drawingml/2006/main" xmlns:r="http://schemas.openxmlformats.org/officeDocument/2006/relationships" xmlns:p="http://schemas.openxmlformats.org/presentationml/2006/main">
+  <p:cSld>
+    <p:spTree>
+      <p:nvGrpSpPr>
+        <p:cNvPr id="1" name=""/>
+        <p:cNvGrpSpPr/>
+        <p:nvPr/>
+      </p:nvGrpSpPr>
+      <p:grpSpPr>
+        <a:xfrm>
+          <a:off x="0" y="0"/>
+          <a:ext cx="0" cy="0"/>
+          <a:chOff x="0" y="0"/>
+          <a:chExt cx="0" cy="0"/>
+        </a:xfrm>
+      </p:grpSpPr>
+      <p:sp>
+        <p:nvSpPr>
+          <p:cNvPr id="2" name="Slide Image Placeholder 1"/>
+          <p:cNvSpPr>
+            <a:spLocks noGrp="1" noRot="1" noChangeAspect="1"/>
+          </p:cNvSpPr>
+          <p:nvPr>
+            <p:ph type="sldImg"/>
+          </p:nvPr>
+        </p:nvSpPr>
+        <p:spPr/>
+      </p:sp>
+      <p:sp>
+        <p:nvSpPr>
+          <p:cNvPr id="3" name="Notes Placeholder 2"/>
+          <p:cNvSpPr>
+            <a:spLocks noGrp="1"/>
+          </p:cNvSpPr>
+          <p:nvPr>
+            <p:ph type="body" idx="1"/>
+          </p:nvPr>
+        </p:nvSpPr>
+        <p:spPr/>
+        <p:txBody>
+          <a:bodyPr/>
+          <a:lstStyle/>
+          <a:p>
+            <a:endParaRPr lang="zh-CN" altLang="en-US" dirty="0"/>
+          </a:p>
+        </p:txBody>
+      </p:sp>
+      <p:sp>
+        <p:nvSpPr>
+          <p:cNvPr id="4" name="Slide Number Placeholder 3"/>
+          <p:cNvSpPr>
+            <a:spLocks noGrp="1"/>
+          </p:cNvSpPr>
+          <p:nvPr>
+            <p:ph type="sldNum" sz="quarter" idx="5"/>
+          </p:nvPr>
+        </p:nvSpPr>
+        <p:spPr/>
+        <p:txBody>
+          <a:bodyPr/>
+          <a:lstStyle/>
+          <a:p>
+            <a:fld id="{3D705E91-C7E4-4164-B291-E20CD00EA241}" type="slidenum">
+              <a:rPr lang="zh-CN" altLang="en-US" smtClean="0"/>
               <a:t>19</a:t>
             </a:fld>
             <a:endParaRPr lang="zh-CN" altLang="en-US"/>
@@ -849,7 +933,7 @@
 </p:notes>
 </file>
 
-<file path=ppt/notesSlides/notesSlide3.xml><?xml version="1.0" encoding="utf-8"?>
+<file path=ppt/notesSlides/notesSlide4.xml><?xml version="1.0" encoding="utf-8"?>
 <p:notes xmlns:a="http://schemas.openxmlformats.org/drawingml/2006/main" xmlns:r="http://schemas.openxmlformats.org/officeDocument/2006/relationships" xmlns:p="http://schemas.openxmlformats.org/presentationml/2006/main">
   <p:cSld>
     <p:spTree>
@@ -2332,6 +2416,48 @@
           </a:prstGeom>
         </p:spPr>
       </p:pic>
+      <p:sp>
+        <p:nvSpPr>
+          <p:cNvPr id="11" name="TextBox 10">
+            <a:extLst>
+              <a:ext uri="{FF2B5EF4-FFF2-40B4-BE49-F238E27FC236}">
+                <a16:creationId xmlns:a16="http://schemas.microsoft.com/office/drawing/2014/main" id="{45D76462-C687-4204-AAC2-61A36E8C02D5}"/>
+              </a:ext>
+            </a:extLst>
+          </p:cNvPr>
+          <p:cNvSpPr txBox="1"/>
+          <p:nvPr/>
+        </p:nvSpPr>
+        <p:spPr>
+          <a:xfrm>
+            <a:off x="9274671" y="6338999"/>
+            <a:ext cx="969080" cy="400110"/>
+          </a:xfrm>
+          <a:prstGeom prst="rect">
+            <a:avLst/>
+          </a:prstGeom>
+          <a:noFill/>
+        </p:spPr>
+        <p:txBody>
+          <a:bodyPr wrap="square" rtlCol="0">
+            <a:spAutoFit/>
+          </a:bodyPr>
+          <a:lstStyle/>
+          <a:p>
+            <a:r>
+              <a:rPr lang="zh-CN" altLang="en-US" sz="1000" dirty="0"/>
+              <a:t>报告人：</a:t>
+            </a:r>
+            <a:endParaRPr lang="en-US" altLang="zh-CN" sz="1000" dirty="0"/>
+          </a:p>
+          <a:p>
+            <a:r>
+              <a:rPr lang="zh-CN" altLang="en-US" sz="1000" dirty="0"/>
+              <a:t>招梓枫，林涵</a:t>
+            </a:r>
+          </a:p>
+        </p:txBody>
+      </p:sp>
     </p:spTree>
     <p:extLst>
       <p:ext uri="{BB962C8B-B14F-4D97-AF65-F5344CB8AC3E}">
@@ -7044,6 +7170,48 @@
           </a:p>
         </p:txBody>
       </p:sp>
+      <p:sp>
+        <p:nvSpPr>
+          <p:cNvPr id="27" name="TextBox 26">
+            <a:extLst>
+              <a:ext uri="{FF2B5EF4-FFF2-40B4-BE49-F238E27FC236}">
+                <a16:creationId xmlns:a16="http://schemas.microsoft.com/office/drawing/2014/main" id="{B4D6B137-88A9-40EB-9ED5-DE0B0B9C7ACA}"/>
+              </a:ext>
+            </a:extLst>
+          </p:cNvPr>
+          <p:cNvSpPr txBox="1"/>
+          <p:nvPr/>
+        </p:nvSpPr>
+        <p:spPr>
+          <a:xfrm>
+            <a:off x="9274671" y="6338999"/>
+            <a:ext cx="969080" cy="400110"/>
+          </a:xfrm>
+          <a:prstGeom prst="rect">
+            <a:avLst/>
+          </a:prstGeom>
+          <a:noFill/>
+        </p:spPr>
+        <p:txBody>
+          <a:bodyPr wrap="square" rtlCol="0">
+            <a:spAutoFit/>
+          </a:bodyPr>
+          <a:lstStyle/>
+          <a:p>
+            <a:r>
+              <a:rPr lang="zh-CN" altLang="en-US" sz="1000" dirty="0"/>
+              <a:t>报告人：</a:t>
+            </a:r>
+            <a:endParaRPr lang="en-US" altLang="zh-CN" sz="1000" dirty="0"/>
+          </a:p>
+          <a:p>
+            <a:r>
+              <a:rPr lang="zh-CN" altLang="en-US" sz="1000" dirty="0"/>
+              <a:t>招梓枫，林涵</a:t>
+            </a:r>
+          </a:p>
+        </p:txBody>
+      </p:sp>
     </p:spTree>
     <p:extLst>
       <p:ext uri="{BB962C8B-B14F-4D97-AF65-F5344CB8AC3E}">
@@ -7576,6 +7744,48 @@
           </a:prstGeom>
         </p:spPr>
       </p:pic>
+      <p:sp>
+        <p:nvSpPr>
+          <p:cNvPr id="7" name="TextBox 6">
+            <a:extLst>
+              <a:ext uri="{FF2B5EF4-FFF2-40B4-BE49-F238E27FC236}">
+                <a16:creationId xmlns:a16="http://schemas.microsoft.com/office/drawing/2014/main" id="{72CA4EC4-CC1A-4287-A10D-F1451F214B89}"/>
+              </a:ext>
+            </a:extLst>
+          </p:cNvPr>
+          <p:cNvSpPr txBox="1"/>
+          <p:nvPr/>
+        </p:nvSpPr>
+        <p:spPr>
+          <a:xfrm>
+            <a:off x="9274671" y="6338999"/>
+            <a:ext cx="969080" cy="400110"/>
+          </a:xfrm>
+          <a:prstGeom prst="rect">
+            <a:avLst/>
+          </a:prstGeom>
+          <a:noFill/>
+        </p:spPr>
+        <p:txBody>
+          <a:bodyPr wrap="square" rtlCol="0">
+            <a:spAutoFit/>
+          </a:bodyPr>
+          <a:lstStyle/>
+          <a:p>
+            <a:r>
+              <a:rPr lang="zh-CN" altLang="en-US" sz="1000" dirty="0"/>
+              <a:t>报告人：</a:t>
+            </a:r>
+            <a:endParaRPr lang="en-US" altLang="zh-CN" sz="1000" dirty="0"/>
+          </a:p>
+          <a:p>
+            <a:r>
+              <a:rPr lang="zh-CN" altLang="en-US" sz="1000" dirty="0"/>
+              <a:t>招梓枫，林涵</a:t>
+            </a:r>
+          </a:p>
+        </p:txBody>
+      </p:sp>
     </p:spTree>
     <p:extLst>
       <p:ext uri="{BB962C8B-B14F-4D97-AF65-F5344CB8AC3E}">
@@ -8589,6 +8799,48 @@
           </a:p>
         </p:txBody>
       </p:sp>
+      <p:sp>
+        <p:nvSpPr>
+          <p:cNvPr id="26" name="TextBox 25">
+            <a:extLst>
+              <a:ext uri="{FF2B5EF4-FFF2-40B4-BE49-F238E27FC236}">
+                <a16:creationId xmlns:a16="http://schemas.microsoft.com/office/drawing/2014/main" id="{D0270747-A6FB-482B-8237-A4E9E2CC319B}"/>
+              </a:ext>
+            </a:extLst>
+          </p:cNvPr>
+          <p:cNvSpPr txBox="1"/>
+          <p:nvPr/>
+        </p:nvSpPr>
+        <p:spPr>
+          <a:xfrm>
+            <a:off x="9274671" y="6338999"/>
+            <a:ext cx="969080" cy="400110"/>
+          </a:xfrm>
+          <a:prstGeom prst="rect">
+            <a:avLst/>
+          </a:prstGeom>
+          <a:noFill/>
+        </p:spPr>
+        <p:txBody>
+          <a:bodyPr wrap="square" rtlCol="0">
+            <a:spAutoFit/>
+          </a:bodyPr>
+          <a:lstStyle/>
+          <a:p>
+            <a:r>
+              <a:rPr lang="zh-CN" altLang="en-US" sz="1000" dirty="0"/>
+              <a:t>报告人：</a:t>
+            </a:r>
+            <a:endParaRPr lang="en-US" altLang="zh-CN" sz="1000" dirty="0"/>
+          </a:p>
+          <a:p>
+            <a:r>
+              <a:rPr lang="zh-CN" altLang="en-US" sz="1000" dirty="0"/>
+              <a:t>招梓枫，林涵</a:t>
+            </a:r>
+          </a:p>
+        </p:txBody>
+      </p:sp>
     </p:spTree>
     <p:extLst>
       <p:ext uri="{BB962C8B-B14F-4D97-AF65-F5344CB8AC3E}">
@@ -9744,6 +9996,48 @@
           </a:p>
         </p:txBody>
       </p:sp>
+      <p:sp>
+        <p:nvSpPr>
+          <p:cNvPr id="28" name="TextBox 27">
+            <a:extLst>
+              <a:ext uri="{FF2B5EF4-FFF2-40B4-BE49-F238E27FC236}">
+                <a16:creationId xmlns:a16="http://schemas.microsoft.com/office/drawing/2014/main" id="{F8289C53-11D9-4C6F-99FF-E6E09A4B09C7}"/>
+              </a:ext>
+            </a:extLst>
+          </p:cNvPr>
+          <p:cNvSpPr txBox="1"/>
+          <p:nvPr/>
+        </p:nvSpPr>
+        <p:spPr>
+          <a:xfrm>
+            <a:off x="9274671" y="6338999"/>
+            <a:ext cx="969080" cy="400110"/>
+          </a:xfrm>
+          <a:prstGeom prst="rect">
+            <a:avLst/>
+          </a:prstGeom>
+          <a:noFill/>
+        </p:spPr>
+        <p:txBody>
+          <a:bodyPr wrap="square" rtlCol="0">
+            <a:spAutoFit/>
+          </a:bodyPr>
+          <a:lstStyle/>
+          <a:p>
+            <a:r>
+              <a:rPr lang="zh-CN" altLang="en-US" sz="1000" dirty="0"/>
+              <a:t>报告人：</a:t>
+            </a:r>
+            <a:endParaRPr lang="en-US" altLang="zh-CN" sz="1000" dirty="0"/>
+          </a:p>
+          <a:p>
+            <a:r>
+              <a:rPr lang="zh-CN" altLang="en-US" sz="1000" dirty="0"/>
+              <a:t>招梓枫，林涵</a:t>
+            </a:r>
+          </a:p>
+        </p:txBody>
+      </p:sp>
     </p:spTree>
     <p:extLst>
       <p:ext uri="{BB962C8B-B14F-4D97-AF65-F5344CB8AC3E}">
@@ -10335,6 +10629,48 @@
           </a:p>
         </p:txBody>
       </p:sp>
+      <p:sp>
+        <p:nvSpPr>
+          <p:cNvPr id="7" name="TextBox 6">
+            <a:extLst>
+              <a:ext uri="{FF2B5EF4-FFF2-40B4-BE49-F238E27FC236}">
+                <a16:creationId xmlns:a16="http://schemas.microsoft.com/office/drawing/2014/main" id="{4489914E-0EFF-4687-BCF9-77508A61C1F9}"/>
+              </a:ext>
+            </a:extLst>
+          </p:cNvPr>
+          <p:cNvSpPr txBox="1"/>
+          <p:nvPr/>
+        </p:nvSpPr>
+        <p:spPr>
+          <a:xfrm>
+            <a:off x="9274671" y="6338999"/>
+            <a:ext cx="969080" cy="400110"/>
+          </a:xfrm>
+          <a:prstGeom prst="rect">
+            <a:avLst/>
+          </a:prstGeom>
+          <a:noFill/>
+        </p:spPr>
+        <p:txBody>
+          <a:bodyPr wrap="square" rtlCol="0">
+            <a:spAutoFit/>
+          </a:bodyPr>
+          <a:lstStyle/>
+          <a:p>
+            <a:r>
+              <a:rPr lang="zh-CN" altLang="en-US" sz="1000" dirty="0"/>
+              <a:t>报告人：</a:t>
+            </a:r>
+            <a:endParaRPr lang="en-US" altLang="zh-CN" sz="1000" dirty="0"/>
+          </a:p>
+          <a:p>
+            <a:r>
+              <a:rPr lang="zh-CN" altLang="en-US" sz="1000" dirty="0"/>
+              <a:t>招梓枫，林涵</a:t>
+            </a:r>
+          </a:p>
+        </p:txBody>
+      </p:sp>
     </p:spTree>
     <p:extLst>
       <p:ext uri="{BB962C8B-B14F-4D97-AF65-F5344CB8AC3E}">
@@ -10748,6 +11084,48 @@
           </a:p>
         </p:txBody>
       </p:sp>
+      <p:sp>
+        <p:nvSpPr>
+          <p:cNvPr id="10" name="TextBox 9">
+            <a:extLst>
+              <a:ext uri="{FF2B5EF4-FFF2-40B4-BE49-F238E27FC236}">
+                <a16:creationId xmlns:a16="http://schemas.microsoft.com/office/drawing/2014/main" id="{466A8418-1C2D-4900-924B-8C7EE68FC177}"/>
+              </a:ext>
+            </a:extLst>
+          </p:cNvPr>
+          <p:cNvSpPr txBox="1"/>
+          <p:nvPr/>
+        </p:nvSpPr>
+        <p:spPr>
+          <a:xfrm>
+            <a:off x="9274671" y="6338999"/>
+            <a:ext cx="969080" cy="400110"/>
+          </a:xfrm>
+          <a:prstGeom prst="rect">
+            <a:avLst/>
+          </a:prstGeom>
+          <a:noFill/>
+        </p:spPr>
+        <p:txBody>
+          <a:bodyPr wrap="square" rtlCol="0">
+            <a:spAutoFit/>
+          </a:bodyPr>
+          <a:lstStyle/>
+          <a:p>
+            <a:r>
+              <a:rPr lang="zh-CN" altLang="en-US" sz="1000" dirty="0"/>
+              <a:t>报告人：</a:t>
+            </a:r>
+            <a:endParaRPr lang="en-US" altLang="zh-CN" sz="1000" dirty="0"/>
+          </a:p>
+          <a:p>
+            <a:r>
+              <a:rPr lang="zh-CN" altLang="en-US" sz="1000" dirty="0"/>
+              <a:t>招梓枫，林涵</a:t>
+            </a:r>
+          </a:p>
+        </p:txBody>
+      </p:sp>
     </p:spTree>
     <p:extLst>
       <p:ext uri="{BB962C8B-B14F-4D97-AF65-F5344CB8AC3E}">
@@ -11899,6 +12277,48 @@
             <a:r>
               <a:rPr lang="zh-CN" altLang="en-US" b="1" dirty="0"/>
               <a:t>结果输出</a:t>
+            </a:r>
+          </a:p>
+        </p:txBody>
+      </p:sp>
+      <p:sp>
+        <p:nvSpPr>
+          <p:cNvPr id="27" name="TextBox 26">
+            <a:extLst>
+              <a:ext uri="{FF2B5EF4-FFF2-40B4-BE49-F238E27FC236}">
+                <a16:creationId xmlns:a16="http://schemas.microsoft.com/office/drawing/2014/main" id="{AC25F543-C9ED-4989-86A5-18029F5CC315}"/>
+              </a:ext>
+            </a:extLst>
+          </p:cNvPr>
+          <p:cNvSpPr txBox="1"/>
+          <p:nvPr/>
+        </p:nvSpPr>
+        <p:spPr>
+          <a:xfrm>
+            <a:off x="9274671" y="6338999"/>
+            <a:ext cx="969080" cy="400110"/>
+          </a:xfrm>
+          <a:prstGeom prst="rect">
+            <a:avLst/>
+          </a:prstGeom>
+          <a:noFill/>
+        </p:spPr>
+        <p:txBody>
+          <a:bodyPr wrap="square" rtlCol="0">
+            <a:spAutoFit/>
+          </a:bodyPr>
+          <a:lstStyle/>
+          <a:p>
+            <a:r>
+              <a:rPr lang="zh-CN" altLang="en-US" sz="1000" dirty="0"/>
+              <a:t>报告人：</a:t>
+            </a:r>
+            <a:endParaRPr lang="en-US" altLang="zh-CN" sz="1000" dirty="0"/>
+          </a:p>
+          <a:p>
+            <a:r>
+              <a:rPr lang="zh-CN" altLang="en-US" sz="1000" dirty="0"/>
+              <a:t>招梓枫，林涵</a:t>
             </a:r>
           </a:p>
         </p:txBody>
@@ -12447,6 +12867,48 @@
           </a:p>
         </p:txBody>
       </p:sp>
+      <p:sp>
+        <p:nvSpPr>
+          <p:cNvPr id="13" name="TextBox 12">
+            <a:extLst>
+              <a:ext uri="{FF2B5EF4-FFF2-40B4-BE49-F238E27FC236}">
+                <a16:creationId xmlns:a16="http://schemas.microsoft.com/office/drawing/2014/main" id="{04416354-0A27-4EAE-A679-F00D15D9A82B}"/>
+              </a:ext>
+            </a:extLst>
+          </p:cNvPr>
+          <p:cNvSpPr txBox="1"/>
+          <p:nvPr/>
+        </p:nvSpPr>
+        <p:spPr>
+          <a:xfrm>
+            <a:off x="9274671" y="6338999"/>
+            <a:ext cx="969080" cy="400110"/>
+          </a:xfrm>
+          <a:prstGeom prst="rect">
+            <a:avLst/>
+          </a:prstGeom>
+          <a:noFill/>
+        </p:spPr>
+        <p:txBody>
+          <a:bodyPr wrap="square" rtlCol="0">
+            <a:spAutoFit/>
+          </a:bodyPr>
+          <a:lstStyle/>
+          <a:p>
+            <a:r>
+              <a:rPr lang="zh-CN" altLang="en-US" sz="1000" dirty="0"/>
+              <a:t>报告人：</a:t>
+            </a:r>
+            <a:endParaRPr lang="en-US" altLang="zh-CN" sz="1000" dirty="0"/>
+          </a:p>
+          <a:p>
+            <a:r>
+              <a:rPr lang="zh-CN" altLang="en-US" sz="1000" dirty="0"/>
+              <a:t>招梓枫，林涵</a:t>
+            </a:r>
+          </a:p>
+        </p:txBody>
+      </p:sp>
     </p:spTree>
     <p:extLst>
       <p:ext uri="{BB962C8B-B14F-4D97-AF65-F5344CB8AC3E}">
@@ -12883,6 +13345,48 @@
           </a:prstGeom>
         </p:spPr>
       </p:pic>
+      <p:sp>
+        <p:nvSpPr>
+          <p:cNvPr id="7" name="TextBox 6">
+            <a:extLst>
+              <a:ext uri="{FF2B5EF4-FFF2-40B4-BE49-F238E27FC236}">
+                <a16:creationId xmlns:a16="http://schemas.microsoft.com/office/drawing/2014/main" id="{9E5B744E-5268-4B5E-9802-160320B7077C}"/>
+              </a:ext>
+            </a:extLst>
+          </p:cNvPr>
+          <p:cNvSpPr txBox="1"/>
+          <p:nvPr/>
+        </p:nvSpPr>
+        <p:spPr>
+          <a:xfrm>
+            <a:off x="9274671" y="6338999"/>
+            <a:ext cx="969080" cy="400110"/>
+          </a:xfrm>
+          <a:prstGeom prst="rect">
+            <a:avLst/>
+          </a:prstGeom>
+          <a:noFill/>
+        </p:spPr>
+        <p:txBody>
+          <a:bodyPr wrap="square" rtlCol="0">
+            <a:spAutoFit/>
+          </a:bodyPr>
+          <a:lstStyle/>
+          <a:p>
+            <a:r>
+              <a:rPr lang="zh-CN" altLang="en-US" sz="1000" dirty="0"/>
+              <a:t>报告人：</a:t>
+            </a:r>
+            <a:endParaRPr lang="en-US" altLang="zh-CN" sz="1000" dirty="0"/>
+          </a:p>
+          <a:p>
+            <a:r>
+              <a:rPr lang="zh-CN" altLang="en-US" sz="1000" dirty="0"/>
+              <a:t>招梓枫，林涵</a:t>
+            </a:r>
+          </a:p>
+        </p:txBody>
+      </p:sp>
     </p:spTree>
     <p:extLst>
       <p:ext uri="{BB962C8B-B14F-4D97-AF65-F5344CB8AC3E}">
@@ -14036,6 +14540,48 @@
           <a:p>
             <a:pPr algn="ctr"/>
             <a:endParaRPr lang="zh-CN" altLang="en-US"/>
+          </a:p>
+        </p:txBody>
+      </p:sp>
+      <p:sp>
+        <p:nvSpPr>
+          <p:cNvPr id="26" name="TextBox 25">
+            <a:extLst>
+              <a:ext uri="{FF2B5EF4-FFF2-40B4-BE49-F238E27FC236}">
+                <a16:creationId xmlns:a16="http://schemas.microsoft.com/office/drawing/2014/main" id="{76E12C13-6D31-4CB2-93ED-D3C838963449}"/>
+              </a:ext>
+            </a:extLst>
+          </p:cNvPr>
+          <p:cNvSpPr txBox="1"/>
+          <p:nvPr/>
+        </p:nvSpPr>
+        <p:spPr>
+          <a:xfrm>
+            <a:off x="9274671" y="6338999"/>
+            <a:ext cx="969080" cy="400110"/>
+          </a:xfrm>
+          <a:prstGeom prst="rect">
+            <a:avLst/>
+          </a:prstGeom>
+          <a:noFill/>
+        </p:spPr>
+        <p:txBody>
+          <a:bodyPr wrap="square" rtlCol="0">
+            <a:spAutoFit/>
+          </a:bodyPr>
+          <a:lstStyle/>
+          <a:p>
+            <a:r>
+              <a:rPr lang="zh-CN" altLang="en-US" sz="1000" dirty="0"/>
+              <a:t>报告人：</a:t>
+            </a:r>
+            <a:endParaRPr lang="en-US" altLang="zh-CN" sz="1000" dirty="0"/>
+          </a:p>
+          <a:p>
+            <a:r>
+              <a:rPr lang="zh-CN" altLang="en-US" sz="1000" dirty="0"/>
+              <a:t>招梓枫，林涵</a:t>
+            </a:r>
           </a:p>
         </p:txBody>
       </p:sp>
@@ -14213,6 +14759,36 @@
       </p:grpSpPr>
       <p:pic>
         <p:nvPicPr>
+          <p:cNvPr id="8" name="Picture 7">
+            <a:extLst>
+              <a:ext uri="{FF2B5EF4-FFF2-40B4-BE49-F238E27FC236}">
+                <a16:creationId xmlns:a16="http://schemas.microsoft.com/office/drawing/2014/main" id="{CB4B622E-7837-4358-B993-2B708C797A61}"/>
+              </a:ext>
+            </a:extLst>
+          </p:cNvPr>
+          <p:cNvPicPr>
+            <a:picLocks noChangeAspect="1"/>
+          </p:cNvPicPr>
+          <p:nvPr/>
+        </p:nvPicPr>
+        <p:blipFill>
+          <a:blip r:embed="rId4"/>
+          <a:stretch>
+            <a:fillRect/>
+          </a:stretch>
+        </p:blipFill>
+        <p:spPr>
+          <a:xfrm>
+            <a:off x="1555713" y="4299372"/>
+            <a:ext cx="3944340" cy="2162729"/>
+          </a:xfrm>
+          <a:prstGeom prst="rect">
+            <a:avLst/>
+          </a:prstGeom>
+        </p:spPr>
+      </p:pic>
+      <p:pic>
+        <p:nvPicPr>
           <p:cNvPr id="6" name="gun2">
             <a:hlinkClick r:id="" action="ppaction://media"/>
             <a:extLst>
@@ -14235,14 +14811,14 @@
           </p:nvPr>
         </p:nvPicPr>
         <p:blipFill>
-          <a:blip r:embed="rId4"/>
+          <a:blip r:embed="rId5"/>
           <a:stretch>
             <a:fillRect/>
           </a:stretch>
         </p:blipFill>
         <p:spPr>
           <a:xfrm>
-            <a:off x="653097" y="1950336"/>
+            <a:off x="157138" y="1752628"/>
             <a:ext cx="244475" cy="244475"/>
           </a:xfrm>
         </p:spPr>
@@ -14359,8 +14935,8 @@
         </p:nvSpPr>
         <p:spPr>
           <a:xfrm>
-            <a:off x="1072515" y="1309558"/>
-            <a:ext cx="10408920" cy="1631216"/>
+            <a:off x="477813" y="1238183"/>
+            <a:ext cx="11075755" cy="1785104"/>
           </a:xfrm>
           <a:prstGeom prst="rect">
             <a:avLst/>
@@ -14398,93 +14974,170 @@
               <a:t>  </a:t>
             </a:r>
             <a:r>
-              <a:rPr lang="zh-CN" altLang="en-US" sz="2500" dirty="0">
+              <a:rPr lang="zh-CN" altLang="en-US" sz="2000" dirty="0">
                 <a:latin typeface="仿宋" panose="02010609060101010101" pitchFamily="49" charset="-122"/>
                 <a:ea typeface="仿宋" panose="02010609060101010101" pitchFamily="49" charset="-122"/>
               </a:rPr>
               <a:t>先来听一段典型的枪声信号</a:t>
             </a:r>
-            <a:endParaRPr lang="en-US" altLang="zh-CN" sz="2500" dirty="0">
+            <a:endParaRPr lang="en-US" altLang="zh-CN" sz="2000" dirty="0">
               <a:latin typeface="仿宋" panose="02010609060101010101" pitchFamily="49" charset="-122"/>
               <a:ea typeface="仿宋" panose="02010609060101010101" pitchFamily="49" charset="-122"/>
             </a:endParaRPr>
           </a:p>
           <a:p>
             <a:r>
-              <a:rPr lang="en-US" altLang="zh-CN" sz="2500" dirty="0">
+              <a:rPr lang="en-US" altLang="zh-CN" sz="2000" dirty="0">
                 <a:latin typeface="仿宋" panose="02010609060101010101" pitchFamily="49" charset="-122"/>
                 <a:ea typeface="仿宋" panose="02010609060101010101" pitchFamily="49" charset="-122"/>
               </a:rPr>
               <a:t>  </a:t>
             </a:r>
             <a:r>
-              <a:rPr lang="zh-CN" altLang="en-US" sz="2500" dirty="0">
-                <a:latin typeface="仿宋" panose="02010609060101010101" pitchFamily="49" charset="-122"/>
-                <a:ea typeface="仿宋" panose="02010609060101010101" pitchFamily="49" charset="-122"/>
-              </a:rPr>
-              <a:t>典型的枪声信号是一个</a:t>
-            </a:r>
-            <a:r>
-              <a:rPr lang="zh-CN" altLang="en-US" sz="2500" b="1" dirty="0">
+              <a:rPr lang="zh-CN" altLang="en-US" sz="2000" dirty="0">
+                <a:latin typeface="仿宋" panose="02010609060101010101" pitchFamily="49" charset="-122"/>
+                <a:ea typeface="仿宋" panose="02010609060101010101" pitchFamily="49" charset="-122"/>
+              </a:rPr>
+              <a:t>仅考虑</a:t>
+            </a:r>
+            <a:r>
+              <a:rPr lang="zh-CN" altLang="en-US" sz="2000" b="1" dirty="0">
+                <a:latin typeface="仿宋" panose="02010609060101010101" pitchFamily="49" charset="-122"/>
+                <a:ea typeface="仿宋" panose="02010609060101010101" pitchFamily="49" charset="-122"/>
+              </a:rPr>
+              <a:t>膛口波</a:t>
+            </a:r>
+            <a:r>
+              <a:rPr lang="en-US" altLang="zh-CN" sz="2000" b="1" dirty="0">
+                <a:latin typeface="仿宋" panose="02010609060101010101" pitchFamily="49" charset="-122"/>
+                <a:ea typeface="仿宋" panose="02010609060101010101" pitchFamily="49" charset="-122"/>
+              </a:rPr>
+              <a:t>(muzzle blast)</a:t>
+            </a:r>
+            <a:r>
+              <a:rPr lang="zh-CN" altLang="en-US" sz="2000" dirty="0">
+                <a:latin typeface="仿宋" panose="02010609060101010101" pitchFamily="49" charset="-122"/>
+                <a:ea typeface="仿宋" panose="02010609060101010101" pitchFamily="49" charset="-122"/>
+              </a:rPr>
+              <a:t>，典型的枪声信号是一个</a:t>
+            </a:r>
+            <a:r>
+              <a:rPr lang="zh-CN" altLang="en-US" sz="2000" b="1" dirty="0">
                 <a:latin typeface="仿宋" panose="02010609060101010101" pitchFamily="49" charset="-122"/>
                 <a:ea typeface="仿宋" panose="02010609060101010101" pitchFamily="49" charset="-122"/>
               </a:rPr>
               <a:t>负压</a:t>
             </a:r>
             <a:r>
-              <a:rPr lang="en-US" altLang="zh-CN" sz="2500" b="1" dirty="0">
+              <a:rPr lang="en-US" altLang="zh-CN" sz="2000" b="1" dirty="0">
                 <a:latin typeface="仿宋" panose="02010609060101010101" pitchFamily="49" charset="-122"/>
                 <a:ea typeface="仿宋" panose="02010609060101010101" pitchFamily="49" charset="-122"/>
               </a:rPr>
               <a:t>-</a:t>
             </a:r>
             <a:r>
-              <a:rPr lang="zh-CN" altLang="en-US" sz="2500" b="1" dirty="0">
+              <a:rPr lang="zh-CN" altLang="en-US" sz="2000" b="1" dirty="0">
                 <a:latin typeface="仿宋" panose="02010609060101010101" pitchFamily="49" charset="-122"/>
                 <a:ea typeface="仿宋" panose="02010609060101010101" pitchFamily="49" charset="-122"/>
               </a:rPr>
               <a:t>正压</a:t>
             </a:r>
             <a:r>
-              <a:rPr lang="zh-CN" altLang="en-US" sz="2500" dirty="0">
-                <a:latin typeface="仿宋" panose="02010609060101010101" pitchFamily="49" charset="-122"/>
-                <a:ea typeface="仿宋" panose="02010609060101010101" pitchFamily="49" charset="-122"/>
-              </a:rPr>
-              <a:t>的一个过程</a:t>
-            </a:r>
-            <a:endParaRPr lang="en-US" altLang="zh-CN" sz="2500" dirty="0">
+              <a:rPr lang="zh-CN" altLang="en-US" sz="2000" dirty="0">
+                <a:latin typeface="仿宋" panose="02010609060101010101" pitchFamily="49" charset="-122"/>
+                <a:ea typeface="仿宋" panose="02010609060101010101" pitchFamily="49" charset="-122"/>
+              </a:rPr>
+              <a:t>的过程</a:t>
+            </a:r>
+            <a:endParaRPr lang="en-US" altLang="zh-CN" sz="2000" dirty="0">
               <a:latin typeface="仿宋" panose="02010609060101010101" pitchFamily="49" charset="-122"/>
               <a:ea typeface="仿宋" panose="02010609060101010101" pitchFamily="49" charset="-122"/>
             </a:endParaRPr>
           </a:p>
           <a:p>
             <a:r>
-              <a:rPr lang="en-US" altLang="zh-CN" sz="2500" dirty="0">
+              <a:rPr lang="en-US" altLang="zh-CN" sz="2000" dirty="0">
                 <a:latin typeface="仿宋" panose="02010609060101010101" pitchFamily="49" charset="-122"/>
                 <a:ea typeface="仿宋" panose="02010609060101010101" pitchFamily="49" charset="-122"/>
               </a:rPr>
               <a:t>  </a:t>
             </a:r>
             <a:r>
-              <a:rPr lang="zh-CN" altLang="en-US" sz="2500" dirty="0">
+              <a:rPr lang="zh-CN" altLang="en-US" sz="2000" dirty="0">
                 <a:latin typeface="仿宋" panose="02010609060101010101" pitchFamily="49" charset="-122"/>
                 <a:ea typeface="仿宋" panose="02010609060101010101" pitchFamily="49" charset="-122"/>
               </a:rPr>
               <a:t>理论波形的的频率集中在</a:t>
             </a:r>
             <a:r>
-              <a:rPr lang="zh-CN" altLang="en-US" sz="2500" b="1" dirty="0">
+              <a:rPr lang="zh-CN" altLang="en-US" sz="2000" b="1" dirty="0">
                 <a:latin typeface="仿宋" panose="02010609060101010101" pitchFamily="49" charset="-122"/>
                 <a:ea typeface="仿宋" panose="02010609060101010101" pitchFamily="49" charset="-122"/>
               </a:rPr>
               <a:t>低频</a:t>
             </a:r>
             <a:r>
-              <a:rPr lang="en-US" altLang="zh-CN" sz="2500" dirty="0">
+              <a:rPr lang="en-US" altLang="zh-CN" sz="2000" dirty="0">
                 <a:latin typeface="仿宋" panose="02010609060101010101" pitchFamily="49" charset="-122"/>
                 <a:ea typeface="仿宋" panose="02010609060101010101" pitchFamily="49" charset="-122"/>
               </a:rPr>
               <a:t>【1】【2】</a:t>
+            </a:r>
+            <a:r>
+              <a:rPr lang="zh-CN" altLang="en-US" sz="2000" dirty="0">
+                <a:latin typeface="仿宋" panose="02010609060101010101" pitchFamily="49" charset="-122"/>
+                <a:ea typeface="仿宋" panose="02010609060101010101" pitchFamily="49" charset="-122"/>
+              </a:rPr>
+              <a:t>，若要在检测的基础上做进精确定位可以综合</a:t>
+            </a:r>
+            <a:r>
+              <a:rPr lang="zh-CN" altLang="en-US" sz="2000" b="1" dirty="0">
+                <a:latin typeface="仿宋" panose="02010609060101010101" pitchFamily="49" charset="-122"/>
+                <a:ea typeface="仿宋" panose="02010609060101010101" pitchFamily="49" charset="-122"/>
+              </a:rPr>
+              <a:t>膛口波</a:t>
+            </a:r>
+            <a:r>
+              <a:rPr lang="en-US" altLang="zh-CN" sz="2000" b="1" dirty="0">
+                <a:latin typeface="仿宋" panose="02010609060101010101" pitchFamily="49" charset="-122"/>
+                <a:ea typeface="仿宋" panose="02010609060101010101" pitchFamily="49" charset="-122"/>
+              </a:rPr>
+              <a:t>						</a:t>
+            </a:r>
+            <a:r>
+              <a:rPr lang="zh-CN" altLang="en-US" sz="2000" dirty="0">
+                <a:latin typeface="仿宋" panose="02010609060101010101" pitchFamily="49" charset="-122"/>
+                <a:ea typeface="仿宋" panose="02010609060101010101" pitchFamily="49" charset="-122"/>
+              </a:rPr>
+              <a:t>与</a:t>
+            </a:r>
+            <a:r>
+              <a:rPr lang="zh-CN" altLang="en-US" sz="2000" b="1" dirty="0">
+                <a:latin typeface="仿宋" panose="02010609060101010101" pitchFamily="49" charset="-122"/>
+                <a:ea typeface="仿宋" panose="02010609060101010101" pitchFamily="49" charset="-122"/>
+              </a:rPr>
+              <a:t>马赫波</a:t>
+            </a:r>
+            <a:r>
+              <a:rPr lang="en-US" altLang="zh-CN" sz="2000" b="1" dirty="0">
+                <a:latin typeface="仿宋" panose="02010609060101010101" pitchFamily="49" charset="-122"/>
+                <a:ea typeface="仿宋" panose="02010609060101010101" pitchFamily="49" charset="-122"/>
+              </a:rPr>
+              <a:t>(shock wave)</a:t>
+            </a:r>
+            <a:r>
+              <a:rPr lang="zh-CN" altLang="en-US" sz="2000" dirty="0">
+                <a:latin typeface="仿宋" panose="02010609060101010101" pitchFamily="49" charset="-122"/>
+                <a:ea typeface="仿宋" panose="02010609060101010101" pitchFamily="49" charset="-122"/>
+              </a:rPr>
+              <a:t>做分析</a:t>
+            </a:r>
+            <a:r>
+              <a:rPr lang="en-US" altLang="zh-CN" sz="2000" dirty="0">
+                <a:latin typeface="仿宋" panose="02010609060101010101" pitchFamily="49" charset="-122"/>
+                <a:ea typeface="仿宋" panose="02010609060101010101" pitchFamily="49" charset="-122"/>
+              </a:rPr>
+              <a:t>【12】</a:t>
             </a:r>
           </a:p>
         </p:txBody>
@@ -14504,7 +15157,7 @@
           <p:nvPr/>
         </p:nvPicPr>
         <p:blipFill>
-          <a:blip r:embed="rId5">
+          <a:blip r:embed="rId6">
             <a:extLst>
               <a:ext uri="{28A0092B-C50C-407E-A947-70E740481C1C}">
                 <a14:useLocalDpi xmlns:a14="http://schemas.microsoft.com/office/drawing/2010/main" val="0"/>
@@ -14531,36 +15184,6 @@
             <a:extLst>
               <a:ext uri="{FF2B5EF4-FFF2-40B4-BE49-F238E27FC236}">
                 <a16:creationId xmlns:a16="http://schemas.microsoft.com/office/drawing/2014/main" id="{EABAB9A6-6F3C-4EEE-BC86-F731E809617E}"/>
-              </a:ext>
-            </a:extLst>
-          </p:cNvPr>
-          <p:cNvPicPr>
-            <a:picLocks noChangeAspect="1"/>
-          </p:cNvPicPr>
-          <p:nvPr/>
-        </p:nvPicPr>
-        <p:blipFill>
-          <a:blip r:embed="rId6"/>
-          <a:stretch>
-            <a:fillRect/>
-          </a:stretch>
-        </p:blipFill>
-        <p:spPr>
-          <a:xfrm>
-            <a:off x="3857466" y="2873252"/>
-            <a:ext cx="1828088" cy="1456149"/>
-          </a:xfrm>
-          <a:prstGeom prst="rect">
-            <a:avLst/>
-          </a:prstGeom>
-        </p:spPr>
-      </p:pic>
-      <p:pic>
-        <p:nvPicPr>
-          <p:cNvPr id="7" name="Picture 6">
-            <a:extLst>
-              <a:ext uri="{FF2B5EF4-FFF2-40B4-BE49-F238E27FC236}">
-                <a16:creationId xmlns:a16="http://schemas.microsoft.com/office/drawing/2014/main" id="{A12445DB-8E02-4478-AFC6-1154CC564B28}"/>
               </a:ext>
             </a:extLst>
           </p:cNvPr>
@@ -14577,8 +15200,8 @@
         </p:blipFill>
         <p:spPr>
           <a:xfrm>
-            <a:off x="1887839" y="3095273"/>
-            <a:ext cx="1451576" cy="1012108"/>
+            <a:off x="3857465" y="2706130"/>
+            <a:ext cx="2111119" cy="1681595"/>
           </a:xfrm>
           <a:prstGeom prst="rect">
             <a:avLst/>
@@ -14587,10 +15210,10 @@
       </p:pic>
       <p:pic>
         <p:nvPicPr>
-          <p:cNvPr id="8" name="Picture 7">
-            <a:extLst>
-              <a:ext uri="{FF2B5EF4-FFF2-40B4-BE49-F238E27FC236}">
-                <a16:creationId xmlns:a16="http://schemas.microsoft.com/office/drawing/2014/main" id="{CB4B622E-7837-4358-B993-2B708C797A61}"/>
+          <p:cNvPr id="7" name="Picture 6">
+            <a:extLst>
+              <a:ext uri="{FF2B5EF4-FFF2-40B4-BE49-F238E27FC236}">
+                <a16:creationId xmlns:a16="http://schemas.microsoft.com/office/drawing/2014/main" id="{A12445DB-8E02-4478-AFC6-1154CC564B28}"/>
               </a:ext>
             </a:extLst>
           </p:cNvPr>
@@ -14607,8 +15230,8 @@
         </p:blipFill>
         <p:spPr>
           <a:xfrm>
-            <a:off x="1555713" y="4299372"/>
-            <a:ext cx="3944340" cy="2162729"/>
+            <a:off x="1878228" y="2836476"/>
+            <a:ext cx="1622350" cy="1131180"/>
           </a:xfrm>
           <a:prstGeom prst="rect">
             <a:avLst/>
@@ -14729,7 +15352,7 @@
         </p:nvCxnSpPr>
         <p:spPr>
           <a:xfrm>
-            <a:off x="1905566" y="3407504"/>
+            <a:off x="1878228" y="3196584"/>
             <a:ext cx="389238" cy="667265"/>
           </a:xfrm>
           <a:prstGeom prst="line">
@@ -14767,7 +15390,7 @@
         </p:nvCxnSpPr>
         <p:spPr>
           <a:xfrm flipH="1">
-            <a:off x="2073340" y="3321007"/>
+            <a:off x="2046002" y="3110087"/>
             <a:ext cx="88973" cy="825274"/>
           </a:xfrm>
           <a:prstGeom prst="line">
@@ -14803,8 +15426,8 @@
         </p:nvSpPr>
         <p:spPr>
           <a:xfrm>
-            <a:off x="967740" y="6462101"/>
-            <a:ext cx="3817620" cy="400110"/>
+            <a:off x="994394" y="6454037"/>
+            <a:ext cx="4320158" cy="400110"/>
           </a:xfrm>
           <a:prstGeom prst="rect">
             <a:avLst/>
@@ -14834,8 +15457,62 @@
             </a:r>
             <a:r>
               <a:rPr lang="zh-CN" altLang="en-US" sz="1000" dirty="0"/>
-              <a:t>枪声定位系统的研究与设计，硕士学位论文，卢慧洋</a:t>
-            </a:r>
+              <a:t>枪声定位系统的研究与设计，西安科技大学硕士学位论文，卢慧洋</a:t>
+            </a:r>
+          </a:p>
+        </p:txBody>
+      </p:sp>
+      <p:sp>
+        <p:nvSpPr>
+          <p:cNvPr id="16" name="TextBox 15">
+            <a:extLst>
+              <a:ext uri="{FF2B5EF4-FFF2-40B4-BE49-F238E27FC236}">
+                <a16:creationId xmlns:a16="http://schemas.microsoft.com/office/drawing/2014/main" id="{9856D06A-FD03-4622-8DE5-437F430DFFEF}"/>
+              </a:ext>
+            </a:extLst>
+          </p:cNvPr>
+          <p:cNvSpPr txBox="1"/>
+          <p:nvPr/>
+        </p:nvSpPr>
+        <p:spPr>
+          <a:xfrm>
+            <a:off x="5033457" y="6477723"/>
+            <a:ext cx="5364754" cy="400110"/>
+          </a:xfrm>
+          <a:prstGeom prst="rect">
+            <a:avLst/>
+          </a:prstGeom>
+          <a:noFill/>
+        </p:spPr>
+        <p:txBody>
+          <a:bodyPr wrap="square" rtlCol="0">
+            <a:spAutoFit/>
+          </a:bodyPr>
+          <a:lstStyle/>
+          <a:p>
+            <a:r>
+              <a:rPr lang="en-US" altLang="zh-CN" sz="1000" dirty="0"/>
+              <a:t>【12】</a:t>
+            </a:r>
+            <a:r>
+              <a:rPr lang="zh-CN" altLang="en-US" sz="1000" dirty="0">
+                <a:hlinkClick r:id="rId9" tooltip="基于多组麦克风阵列的枪声定位算法研究">
+                  <a:extLst>
+                    <a:ext uri="{A12FA001-AC4F-418D-AE19-62706E023703}">
+                      <ahyp:hlinkClr xmlns:ahyp="http://schemas.microsoft.com/office/drawing/2018/hyperlinkcolor" val="tx"/>
+                    </a:ext>
+                  </a:extLst>
+                </a:hlinkClick>
+              </a:rPr>
+              <a:t>基于多组麦克风阵列的枪声定位算法研究</a:t>
+            </a:r>
+            <a:r>
+              <a:rPr lang="zh-CN" altLang="en-US" sz="1000" dirty="0"/>
+              <a:t>，国防科技大学硕士学位论文，佘大鹏</a:t>
+            </a:r>
+          </a:p>
+          <a:p>
+            <a:endParaRPr lang="zh-CN" altLang="en-US" sz="1000" dirty="0"/>
           </a:p>
         </p:txBody>
       </p:sp>
@@ -15628,6 +16305,48 @@
           </a:p>
         </p:txBody>
       </p:sp>
+      <p:sp>
+        <p:nvSpPr>
+          <p:cNvPr id="25" name="TextBox 24">
+            <a:extLst>
+              <a:ext uri="{FF2B5EF4-FFF2-40B4-BE49-F238E27FC236}">
+                <a16:creationId xmlns:a16="http://schemas.microsoft.com/office/drawing/2014/main" id="{966AC8A9-6450-4471-947D-74DD26E41A1A}"/>
+              </a:ext>
+            </a:extLst>
+          </p:cNvPr>
+          <p:cNvSpPr txBox="1"/>
+          <p:nvPr/>
+        </p:nvSpPr>
+        <p:spPr>
+          <a:xfrm>
+            <a:off x="9274671" y="6338999"/>
+            <a:ext cx="969080" cy="400110"/>
+          </a:xfrm>
+          <a:prstGeom prst="rect">
+            <a:avLst/>
+          </a:prstGeom>
+          <a:noFill/>
+        </p:spPr>
+        <p:txBody>
+          <a:bodyPr wrap="square" rtlCol="0">
+            <a:spAutoFit/>
+          </a:bodyPr>
+          <a:lstStyle/>
+          <a:p>
+            <a:r>
+              <a:rPr lang="zh-CN" altLang="en-US" sz="1000" dirty="0"/>
+              <a:t>报告人：</a:t>
+            </a:r>
+            <a:endParaRPr lang="en-US" altLang="zh-CN" sz="1000" dirty="0"/>
+          </a:p>
+          <a:p>
+            <a:r>
+              <a:rPr lang="zh-CN" altLang="en-US" sz="1000" dirty="0"/>
+              <a:t>招梓枫，林涵</a:t>
+            </a:r>
+          </a:p>
+        </p:txBody>
+      </p:sp>
     </p:spTree>
     <p:extLst>
       <p:ext uri="{BB962C8B-B14F-4D97-AF65-F5344CB8AC3E}">
@@ -16023,7 +16742,7 @@
           <p:nvPr/>
         </p:nvPicPr>
         <p:blipFill>
-          <a:blip r:embed="rId2"/>
+          <a:blip r:embed="rId3"/>
           <a:stretch>
             <a:fillRect/>
           </a:stretch>
@@ -16053,7 +16772,7 @@
           <p:nvPr/>
         </p:nvPicPr>
         <p:blipFill>
-          <a:blip r:embed="rId3"/>
+          <a:blip r:embed="rId4"/>
           <a:stretch>
             <a:fillRect/>
           </a:stretch>
@@ -16353,6 +17072,48 @@
           </a:fontRef>
         </p:style>
       </p:cxnSp>
+      <p:sp>
+        <p:nvSpPr>
+          <p:cNvPr id="16" name="TextBox 15">
+            <a:extLst>
+              <a:ext uri="{FF2B5EF4-FFF2-40B4-BE49-F238E27FC236}">
+                <a16:creationId xmlns:a16="http://schemas.microsoft.com/office/drawing/2014/main" id="{F279E499-2C7B-4331-8029-08A2EEF8880A}"/>
+              </a:ext>
+            </a:extLst>
+          </p:cNvPr>
+          <p:cNvSpPr txBox="1"/>
+          <p:nvPr/>
+        </p:nvSpPr>
+        <p:spPr>
+          <a:xfrm>
+            <a:off x="9274671" y="6338999"/>
+            <a:ext cx="969080" cy="400110"/>
+          </a:xfrm>
+          <a:prstGeom prst="rect">
+            <a:avLst/>
+          </a:prstGeom>
+          <a:noFill/>
+        </p:spPr>
+        <p:txBody>
+          <a:bodyPr wrap="square" rtlCol="0">
+            <a:spAutoFit/>
+          </a:bodyPr>
+          <a:lstStyle/>
+          <a:p>
+            <a:r>
+              <a:rPr lang="zh-CN" altLang="en-US" sz="1000" dirty="0"/>
+              <a:t>报告人：</a:t>
+            </a:r>
+            <a:endParaRPr lang="en-US" altLang="zh-CN" sz="1000" dirty="0"/>
+          </a:p>
+          <a:p>
+            <a:r>
+              <a:rPr lang="zh-CN" altLang="en-US" sz="1000" dirty="0"/>
+              <a:t>招梓枫，林涵</a:t>
+            </a:r>
+          </a:p>
+        </p:txBody>
+      </p:sp>
     </p:spTree>
     <p:extLst>
       <p:ext uri="{BB962C8B-B14F-4D97-AF65-F5344CB8AC3E}">
@@ -17508,6 +18269,48 @@
           </a:p>
         </p:txBody>
       </p:sp>
+      <p:sp>
+        <p:nvSpPr>
+          <p:cNvPr id="27" name="TextBox 26">
+            <a:extLst>
+              <a:ext uri="{FF2B5EF4-FFF2-40B4-BE49-F238E27FC236}">
+                <a16:creationId xmlns:a16="http://schemas.microsoft.com/office/drawing/2014/main" id="{805AF512-8E64-4E6A-85B2-7A89DD54C91A}"/>
+              </a:ext>
+            </a:extLst>
+          </p:cNvPr>
+          <p:cNvSpPr txBox="1"/>
+          <p:nvPr/>
+        </p:nvSpPr>
+        <p:spPr>
+          <a:xfrm>
+            <a:off x="9274671" y="6338999"/>
+            <a:ext cx="969080" cy="400110"/>
+          </a:xfrm>
+          <a:prstGeom prst="rect">
+            <a:avLst/>
+          </a:prstGeom>
+          <a:noFill/>
+        </p:spPr>
+        <p:txBody>
+          <a:bodyPr wrap="square" rtlCol="0">
+            <a:spAutoFit/>
+          </a:bodyPr>
+          <a:lstStyle/>
+          <a:p>
+            <a:r>
+              <a:rPr lang="zh-CN" altLang="en-US" sz="1000" dirty="0"/>
+              <a:t>报告人：</a:t>
+            </a:r>
+            <a:endParaRPr lang="en-US" altLang="zh-CN" sz="1000" dirty="0"/>
+          </a:p>
+          <a:p>
+            <a:r>
+              <a:rPr lang="zh-CN" altLang="en-US" sz="1000" dirty="0"/>
+              <a:t>招梓枫，林涵</a:t>
+            </a:r>
+          </a:p>
+        </p:txBody>
+      </p:sp>
     </p:spTree>
     <p:extLst>
       <p:ext uri="{BB962C8B-B14F-4D97-AF65-F5344CB8AC3E}">
@@ -17957,6 +18760,48 @@
           </a:p>
         </p:txBody>
       </p:sp>
+      <p:sp>
+        <p:nvSpPr>
+          <p:cNvPr id="7" name="TextBox 6">
+            <a:extLst>
+              <a:ext uri="{FF2B5EF4-FFF2-40B4-BE49-F238E27FC236}">
+                <a16:creationId xmlns:a16="http://schemas.microsoft.com/office/drawing/2014/main" id="{F2E15021-FDFF-47E6-BD0D-283A8105BA91}"/>
+              </a:ext>
+            </a:extLst>
+          </p:cNvPr>
+          <p:cNvSpPr txBox="1"/>
+          <p:nvPr/>
+        </p:nvSpPr>
+        <p:spPr>
+          <a:xfrm>
+            <a:off x="9274671" y="6338999"/>
+            <a:ext cx="969080" cy="400110"/>
+          </a:xfrm>
+          <a:prstGeom prst="rect">
+            <a:avLst/>
+          </a:prstGeom>
+          <a:noFill/>
+        </p:spPr>
+        <p:txBody>
+          <a:bodyPr wrap="square" rtlCol="0">
+            <a:spAutoFit/>
+          </a:bodyPr>
+          <a:lstStyle/>
+          <a:p>
+            <a:r>
+              <a:rPr lang="zh-CN" altLang="en-US" sz="1000" dirty="0"/>
+              <a:t>报告人：</a:t>
+            </a:r>
+            <a:endParaRPr lang="en-US" altLang="zh-CN" sz="1000" dirty="0"/>
+          </a:p>
+          <a:p>
+            <a:r>
+              <a:rPr lang="zh-CN" altLang="en-US" sz="1000" dirty="0"/>
+              <a:t>招梓枫，林涵</a:t>
+            </a:r>
+          </a:p>
+        </p:txBody>
+      </p:sp>
     </p:spTree>
     <p:extLst>
       <p:ext uri="{BB962C8B-B14F-4D97-AF65-F5344CB8AC3E}">
@@ -18478,6 +19323,48 @@
           </a:prstGeom>
         </p:spPr>
       </p:pic>
+      <p:sp>
+        <p:nvSpPr>
+          <p:cNvPr id="8" name="TextBox 7">
+            <a:extLst>
+              <a:ext uri="{FF2B5EF4-FFF2-40B4-BE49-F238E27FC236}">
+                <a16:creationId xmlns:a16="http://schemas.microsoft.com/office/drawing/2014/main" id="{A64C84A4-678A-444B-B5E8-0446FF21C912}"/>
+              </a:ext>
+            </a:extLst>
+          </p:cNvPr>
+          <p:cNvSpPr txBox="1"/>
+          <p:nvPr/>
+        </p:nvSpPr>
+        <p:spPr>
+          <a:xfrm>
+            <a:off x="9274671" y="6338999"/>
+            <a:ext cx="969080" cy="400110"/>
+          </a:xfrm>
+          <a:prstGeom prst="rect">
+            <a:avLst/>
+          </a:prstGeom>
+          <a:noFill/>
+        </p:spPr>
+        <p:txBody>
+          <a:bodyPr wrap="square" rtlCol="0">
+            <a:spAutoFit/>
+          </a:bodyPr>
+          <a:lstStyle/>
+          <a:p>
+            <a:r>
+              <a:rPr lang="zh-CN" altLang="en-US" sz="1000" dirty="0"/>
+              <a:t>报告人：</a:t>
+            </a:r>
+            <a:endParaRPr lang="en-US" altLang="zh-CN" sz="1000" dirty="0"/>
+          </a:p>
+          <a:p>
+            <a:r>
+              <a:rPr lang="zh-CN" altLang="en-US" sz="1000" dirty="0"/>
+              <a:t>招梓枫，林涵</a:t>
+            </a:r>
+          </a:p>
+        </p:txBody>
+      </p:sp>
     </p:spTree>
     <p:extLst>
       <p:ext uri="{BB962C8B-B14F-4D97-AF65-F5344CB8AC3E}">
@@ -19021,6 +19908,48 @@
               <a:latin typeface="仿宋" panose="02010609060101010101" pitchFamily="49" charset="-122"/>
               <a:ea typeface="仿宋" panose="02010609060101010101" pitchFamily="49" charset="-122"/>
             </a:endParaRPr>
+          </a:p>
+        </p:txBody>
+      </p:sp>
+      <p:sp>
+        <p:nvSpPr>
+          <p:cNvPr id="13" name="TextBox 12">
+            <a:extLst>
+              <a:ext uri="{FF2B5EF4-FFF2-40B4-BE49-F238E27FC236}">
+                <a16:creationId xmlns:a16="http://schemas.microsoft.com/office/drawing/2014/main" id="{446F6D73-FFD8-4EB1-8D38-6C28E40DAE21}"/>
+              </a:ext>
+            </a:extLst>
+          </p:cNvPr>
+          <p:cNvSpPr txBox="1"/>
+          <p:nvPr/>
+        </p:nvSpPr>
+        <p:spPr>
+          <a:xfrm>
+            <a:off x="9274671" y="6338999"/>
+            <a:ext cx="969080" cy="400110"/>
+          </a:xfrm>
+          <a:prstGeom prst="rect">
+            <a:avLst/>
+          </a:prstGeom>
+          <a:noFill/>
+        </p:spPr>
+        <p:txBody>
+          <a:bodyPr wrap="square" rtlCol="0">
+            <a:spAutoFit/>
+          </a:bodyPr>
+          <a:lstStyle/>
+          <a:p>
+            <a:r>
+              <a:rPr lang="zh-CN" altLang="en-US" sz="1000" dirty="0"/>
+              <a:t>报告人：</a:t>
+            </a:r>
+            <a:endParaRPr lang="en-US" altLang="zh-CN" sz="1000" dirty="0"/>
+          </a:p>
+          <a:p>
+            <a:r>
+              <a:rPr lang="zh-CN" altLang="en-US" sz="1000" dirty="0"/>
+              <a:t>招梓枫，林涵</a:t>
+            </a:r>
           </a:p>
         </p:txBody>
       </p:sp>

</xml_diff>